<commit_message>
First draft of presentation done. Woot woot
</commit_message>
<xml_diff>
--- a/Defense.pptx
+++ b/Defense.pptx
@@ -12,16 +12,44 @@
     <p:sldId id="261" r:id="rId6"/>
     <p:sldId id="262" r:id="rId7"/>
     <p:sldId id="263" r:id="rId8"/>
-    <p:sldId id="264" r:id="rId9"/>
-    <p:sldId id="265" r:id="rId10"/>
-    <p:sldId id="266" r:id="rId11"/>
-    <p:sldId id="267" r:id="rId12"/>
-    <p:sldId id="268" r:id="rId13"/>
-    <p:sldId id="269" r:id="rId14"/>
-    <p:sldId id="271" r:id="rId15"/>
-    <p:sldId id="270" r:id="rId16"/>
-    <p:sldId id="272" r:id="rId17"/>
-    <p:sldId id="273" r:id="rId18"/>
+    <p:sldId id="281" r:id="rId9"/>
+    <p:sldId id="264" r:id="rId10"/>
+    <p:sldId id="265" r:id="rId11"/>
+    <p:sldId id="266" r:id="rId12"/>
+    <p:sldId id="267" r:id="rId13"/>
+    <p:sldId id="268" r:id="rId14"/>
+    <p:sldId id="269" r:id="rId15"/>
+    <p:sldId id="271" r:id="rId16"/>
+    <p:sldId id="270" r:id="rId17"/>
+    <p:sldId id="272" r:id="rId18"/>
+    <p:sldId id="273" r:id="rId19"/>
+    <p:sldId id="299" r:id="rId20"/>
+    <p:sldId id="274" r:id="rId21"/>
+    <p:sldId id="275" r:id="rId22"/>
+    <p:sldId id="276" r:id="rId23"/>
+    <p:sldId id="277" r:id="rId24"/>
+    <p:sldId id="278" r:id="rId25"/>
+    <p:sldId id="279" r:id="rId26"/>
+    <p:sldId id="280" r:id="rId27"/>
+    <p:sldId id="298" r:id="rId28"/>
+    <p:sldId id="282" r:id="rId29"/>
+    <p:sldId id="283" r:id="rId30"/>
+    <p:sldId id="284" r:id="rId31"/>
+    <p:sldId id="285" r:id="rId32"/>
+    <p:sldId id="286" r:id="rId33"/>
+    <p:sldId id="287" r:id="rId34"/>
+    <p:sldId id="290" r:id="rId35"/>
+    <p:sldId id="288" r:id="rId36"/>
+    <p:sldId id="289" r:id="rId37"/>
+    <p:sldId id="291" r:id="rId38"/>
+    <p:sldId id="295" r:id="rId39"/>
+    <p:sldId id="296" r:id="rId40"/>
+    <p:sldId id="294" r:id="rId41"/>
+    <p:sldId id="297" r:id="rId42"/>
+    <p:sldId id="300" r:id="rId43"/>
+    <p:sldId id="301" r:id="rId44"/>
+    <p:sldId id="302" r:id="rId45"/>
+    <p:sldId id="303" r:id="rId46"/>
   </p:sldIdLst>
   <p:sldSz cx="9144000" cy="6858000" type="screen4x3"/>
   <p:notesSz cx="6858000" cy="9144000"/>
@@ -3297,7 +3325,7 @@
             </a:br>
             <a:r>
               <a:rPr lang="en-CA" dirty="0" smtClean="0"/>
-              <a:t>Motivation</a:t>
+              <a:t>Goals and Objectives</a:t>
             </a:r>
             <a:endParaRPr lang="en-US" dirty="0"/>
           </a:p>
@@ -3320,27 +3348,7 @@
           <a:p>
             <a:r>
               <a:rPr lang="en-CA" dirty="0" smtClean="0"/>
-              <a:t>DNS tunnels are used in malware as </a:t>
-            </a:r>
-            <a:r>
-              <a:rPr lang="en-CA" dirty="0" err="1" smtClean="0"/>
-              <a:t>botnet</a:t>
-            </a:r>
-            <a:r>
-              <a:rPr lang="en-CA" dirty="0" smtClean="0"/>
-              <a:t> command-and-control channels</a:t>
-            </a:r>
-          </a:p>
-          <a:p>
-            <a:r>
-              <a:rPr lang="en-CA" dirty="0" smtClean="0"/>
-              <a:t>DNS tunnels are used to in/ex-filtrate data through corporate security layers</a:t>
-            </a:r>
-          </a:p>
-          <a:p>
-            <a:r>
-              <a:rPr lang="en-CA" dirty="0" smtClean="0"/>
-              <a:t>The ability to monitor the existence of these channels is important when securing a network.</a:t>
+              <a:t>Be able to identify DNS tunnels that do not violate DNS RFCs or specifications in near real time with high accuracy.</a:t>
             </a:r>
             <a:endParaRPr lang="en-US" dirty="0"/>
           </a:p>
@@ -3390,14 +3398,14 @@
           <a:p>
             <a:r>
               <a:rPr lang="en-CA" dirty="0" smtClean="0"/>
-              <a:t>Proposed Approach:</a:t>
+              <a:t>Context:</a:t>
             </a:r>
             <a:br>
               <a:rPr lang="en-CA" dirty="0" smtClean="0"/>
             </a:br>
             <a:r>
               <a:rPr lang="en-CA" dirty="0" smtClean="0"/>
-              <a:t>Assumptions</a:t>
+              <a:t>Motivation</a:t>
             </a:r>
             <a:endParaRPr lang="en-US" dirty="0"/>
           </a:p>
@@ -3420,19 +3428,28 @@
           <a:p>
             <a:r>
               <a:rPr lang="en-CA" dirty="0" smtClean="0"/>
-              <a:t>DNS tunnels move more data than benign traffic</a:t>
-            </a:r>
-          </a:p>
-          <a:p>
-            <a:endParaRPr lang="en-CA" dirty="0"/>
-          </a:p>
-          <a:p>
-            <a:r>
-              <a:rPr lang="en-CA" dirty="0" smtClean="0"/>
-              <a:t>Attempt to detect this increase in data transmission volume</a:t>
-            </a:r>
-          </a:p>
-          <a:p>
+              <a:t>DNS tunnels are used in malware as </a:t>
+            </a:r>
+            <a:r>
+              <a:rPr lang="en-CA" dirty="0" err="1" smtClean="0"/>
+              <a:t>botnet</a:t>
+            </a:r>
+            <a:r>
+              <a:rPr lang="en-CA" dirty="0" smtClean="0"/>
+              <a:t> command-and-control channels</a:t>
+            </a:r>
+          </a:p>
+          <a:p>
+            <a:r>
+              <a:rPr lang="en-CA" dirty="0" smtClean="0"/>
+              <a:t>DNS tunnels are used to in/ex-filtrate data through corporate security layers</a:t>
+            </a:r>
+          </a:p>
+          <a:p>
+            <a:r>
+              <a:rPr lang="en-CA" dirty="0" smtClean="0"/>
+              <a:t>The ability to monitor the existence of these channels is important when securing a network.</a:t>
+            </a:r>
             <a:endParaRPr lang="en-US" dirty="0"/>
           </a:p>
         </p:txBody>
@@ -3488,7 +3505,7 @@
             </a:br>
             <a:r>
               <a:rPr lang="en-CA" dirty="0" smtClean="0"/>
-              <a:t>Theory</a:t>
+              <a:t>Assumptions</a:t>
             </a:r>
             <a:endParaRPr lang="en-US" dirty="0"/>
           </a:p>
@@ -3506,59 +3523,24 @@
         </p:nvSpPr>
         <p:spPr/>
         <p:txBody>
-          <a:bodyPr>
-            <a:normAutofit fontScale="92500"/>
-          </a:bodyPr>
-          <a:lstStyle/>
-          <a:p>
-            <a:r>
-              <a:rPr lang="en-CA" dirty="0" smtClean="0"/>
-              <a:t>Collect DNS queries into temporal buckets</a:t>
-            </a:r>
-          </a:p>
-          <a:p>
-            <a:pPr lvl="1"/>
-            <a:r>
-              <a:rPr lang="en-CA" dirty="0" smtClean="0"/>
-              <a:t>Ten-second windows were used in the analysis</a:t>
-            </a:r>
-          </a:p>
-          <a:p>
-            <a:r>
-              <a:rPr lang="en-CA" dirty="0" smtClean="0"/>
-              <a:t>Further group queries by top-level domain (TLD)</a:t>
-            </a:r>
-          </a:p>
-          <a:p>
-            <a:pPr lvl="1"/>
-            <a:r>
-              <a:rPr lang="en-CA" dirty="0"/>
-              <a:t>g</a:t>
-            </a:r>
-            <a:r>
-              <a:rPr lang="en-CA" dirty="0" smtClean="0"/>
-              <a:t>oogle.com</a:t>
-            </a:r>
-          </a:p>
-          <a:p>
-            <a:pPr lvl="1"/>
-            <a:r>
-              <a:rPr lang="en-CA" dirty="0" smtClean="0"/>
-              <a:t>cbc.ca</a:t>
-            </a:r>
-          </a:p>
-          <a:p>
-            <a:pPr lvl="1"/>
-            <a:r>
-              <a:rPr lang="en-CA" dirty="0" smtClean="0"/>
-              <a:t>Etc…</a:t>
-            </a:r>
-          </a:p>
-          <a:p>
-            <a:r>
-              <a:rPr lang="en-CA" dirty="0" smtClean="0"/>
-              <a:t>For each TLD (in the current window), compute a measure of how much data was transmitted</a:t>
-            </a:r>
+          <a:bodyPr/>
+          <a:lstStyle/>
+          <a:p>
+            <a:r>
+              <a:rPr lang="en-CA" dirty="0" smtClean="0"/>
+              <a:t>DNS tunnels move more data than benign traffic</a:t>
+            </a:r>
+          </a:p>
+          <a:p>
+            <a:endParaRPr lang="en-CA" dirty="0"/>
+          </a:p>
+          <a:p>
+            <a:r>
+              <a:rPr lang="en-CA" dirty="0" smtClean="0"/>
+              <a:t>Attempt to detect this increase in data transmission volume</a:t>
+            </a:r>
+          </a:p>
+          <a:p>
             <a:endParaRPr lang="en-US" dirty="0"/>
           </a:p>
         </p:txBody>
@@ -3614,7 +3596,7 @@
             </a:br>
             <a:r>
               <a:rPr lang="en-CA" dirty="0" smtClean="0"/>
-              <a:t>Measuring Data Volume</a:t>
+              <a:t>Theory</a:t>
             </a:r>
             <a:endParaRPr lang="en-US" dirty="0"/>
           </a:p>
@@ -3632,32 +3614,58 @@
         </p:nvSpPr>
         <p:spPr/>
         <p:txBody>
-          <a:bodyPr/>
-          <a:lstStyle/>
-          <a:p>
-            <a:r>
-              <a:rPr lang="en-CA" dirty="0" smtClean="0"/>
-              <a:t>Since common domains may appear more than uncommon, simple character count is insufficient</a:t>
+          <a:bodyPr>
+            <a:normAutofit fontScale="92500"/>
+          </a:bodyPr>
+          <a:lstStyle/>
+          <a:p>
+            <a:r>
+              <a:rPr lang="en-CA" dirty="0" smtClean="0"/>
+              <a:t>Collect DNS queries into temporal buckets</a:t>
             </a:r>
           </a:p>
           <a:p>
             <a:pPr lvl="1"/>
             <a:r>
               <a:rPr lang="en-CA" dirty="0" smtClean="0"/>
-              <a:t>Modulo caching effects as described in section 5.1.3</a:t>
-            </a:r>
-          </a:p>
-          <a:p>
-            <a:r>
-              <a:rPr lang="en-CA" dirty="0" smtClean="0"/>
-              <a:t>Average character count is similarly uninformative</a:t>
+              <a:t>Ten-second windows were used in the analysis</a:t>
+            </a:r>
+          </a:p>
+          <a:p>
+            <a:r>
+              <a:rPr lang="en-CA" dirty="0" smtClean="0"/>
+              <a:t>Further group queries by top-level domain (TLD)</a:t>
             </a:r>
           </a:p>
           <a:p>
             <a:pPr lvl="1"/>
             <a:r>
-              <a:rPr lang="en-CA" dirty="0" smtClean="0"/>
-              <a:t>Tunnels can use any length queries, including modelling a length distribution of legitimate traffic</a:t>
+              <a:rPr lang="en-CA" dirty="0"/>
+              <a:t>g</a:t>
+            </a:r>
+            <a:r>
+              <a:rPr lang="en-CA" dirty="0" smtClean="0"/>
+              <a:t>oogle.com</a:t>
+            </a:r>
+          </a:p>
+          <a:p>
+            <a:pPr lvl="1"/>
+            <a:r>
+              <a:rPr lang="en-CA" dirty="0" smtClean="0"/>
+              <a:t>cbc.ca</a:t>
+            </a:r>
+          </a:p>
+          <a:p>
+            <a:pPr lvl="1"/>
+            <a:r>
+              <a:rPr lang="en-CA" dirty="0" smtClean="0"/>
+              <a:t>Etc…</a:t>
+            </a:r>
+          </a:p>
+          <a:p>
+            <a:r>
+              <a:rPr lang="en-CA" dirty="0" smtClean="0"/>
+              <a:t>For each TLD (in the current window), compute a measure of how much data was transmitted</a:t>
             </a:r>
             <a:endParaRPr lang="en-US" dirty="0"/>
           </a:p>
@@ -3737,33 +3745,27 @@
           <a:p>
             <a:r>
               <a:rPr lang="en-CA" dirty="0" smtClean="0"/>
-              <a:t>DNS tunnels can be expected to have very few queries that appear more than once</a:t>
+              <a:t>Since common domains may appear more than uncommon, simple character count is insufficient</a:t>
             </a:r>
           </a:p>
           <a:p>
             <a:pPr lvl="1"/>
             <a:r>
               <a:rPr lang="en-CA" dirty="0" smtClean="0"/>
-              <a:t>Since they are transmitting arbitrary data</a:t>
-            </a:r>
-          </a:p>
-          <a:p>
-            <a:r>
-              <a:rPr lang="en-CA" dirty="0" smtClean="0"/>
-              <a:t>Benign domains can have many queries that appear a great number of times</a:t>
+              <a:t>Modulo caching effects as described in section 5.1.3</a:t>
+            </a:r>
+          </a:p>
+          <a:p>
+            <a:r>
+              <a:rPr lang="en-CA" dirty="0" smtClean="0"/>
+              <a:t>Average character count is similarly uninformative</a:t>
             </a:r>
           </a:p>
           <a:p>
             <a:pPr lvl="1"/>
             <a:r>
               <a:rPr lang="en-CA" dirty="0" smtClean="0"/>
-              <a:t>Such as </a:t>
-            </a:r>
-            <a:r>
-              <a:rPr lang="en-CA" dirty="0" smtClean="0">
-                <a:hlinkClick r:id="rId2"/>
-              </a:rPr>
-              <a:t>www.google.com</a:t>
+              <a:t>Tunnels can use any length queries, including modelling a length distribution of legitimate traffic</a:t>
             </a:r>
             <a:endParaRPr lang="en-US" dirty="0"/>
           </a:p>
@@ -3807,22 +3809,22 @@
         <p:spPr/>
         <p:txBody>
           <a:bodyPr>
-            <a:noAutofit/>
+            <a:normAutofit fontScale="90000"/>
           </a:bodyPr>
           <a:lstStyle/>
           <a:p>
             <a:r>
-              <a:rPr lang="en-CA" sz="3600" dirty="0" smtClean="0"/>
+              <a:rPr lang="en-CA" dirty="0" smtClean="0"/>
               <a:t>Proposed Approach:</a:t>
             </a:r>
             <a:br>
-              <a:rPr lang="en-CA" sz="3600" dirty="0" smtClean="0"/>
+              <a:rPr lang="en-CA" dirty="0" smtClean="0"/>
             </a:br>
             <a:r>
-              <a:rPr lang="en-CA" sz="3600" dirty="0" smtClean="0"/>
-              <a:t>Domain Length-Weighted Entropy (DLWE)</a:t>
-            </a:r>
-            <a:endParaRPr lang="en-US" sz="3600" dirty="0"/>
+              <a:rPr lang="en-CA" dirty="0" smtClean="0"/>
+              <a:t>Measuring Data Volume</a:t>
+            </a:r>
+            <a:endParaRPr lang="en-US" dirty="0"/>
           </a:p>
         </p:txBody>
       </p:sp>
@@ -3838,43 +3840,38 @@
         </p:nvSpPr>
         <p:spPr/>
         <p:txBody>
-          <a:bodyPr>
-            <a:normAutofit lnSpcReduction="10000"/>
-          </a:bodyPr>
-          <a:lstStyle/>
-          <a:p>
-            <a:r>
-              <a:rPr lang="en-CA" dirty="0" smtClean="0"/>
-              <a:t>Consider the collection of queries to a TLD in an interval</a:t>
-            </a:r>
-          </a:p>
-          <a:p>
-            <a:r>
-              <a:rPr lang="en-CA" dirty="0" smtClean="0"/>
-              <a:t>Treat each query as a symbol, and compute the entropy of the collection.</a:t>
-            </a:r>
-          </a:p>
-          <a:p>
-            <a:r>
-              <a:rPr lang="en-CA" dirty="0" smtClean="0"/>
-              <a:t>Multiply the result by the average query length for the TLD in the interval.</a:t>
-            </a:r>
-          </a:p>
-          <a:p>
-            <a:endParaRPr lang="en-CA" dirty="0" smtClean="0"/>
-          </a:p>
-          <a:p>
-            <a:r>
-              <a:rPr lang="en-CA" dirty="0" smtClean="0"/>
-              <a:t>Expect large values for tunnel domains, small values for benign </a:t>
-            </a:r>
-            <a:r>
-              <a:rPr lang="en-CA" dirty="0"/>
-              <a:t>d</a:t>
-            </a:r>
-            <a:r>
-              <a:rPr lang="en-CA" dirty="0" smtClean="0"/>
-              <a:t>omains.</a:t>
+          <a:bodyPr/>
+          <a:lstStyle/>
+          <a:p>
+            <a:r>
+              <a:rPr lang="en-CA" dirty="0" smtClean="0"/>
+              <a:t>DNS tunnels can be expected to have very few queries that appear more than once</a:t>
+            </a:r>
+          </a:p>
+          <a:p>
+            <a:pPr lvl="1"/>
+            <a:r>
+              <a:rPr lang="en-CA" dirty="0" smtClean="0"/>
+              <a:t>Since they are transmitting arbitrary data</a:t>
+            </a:r>
+          </a:p>
+          <a:p>
+            <a:r>
+              <a:rPr lang="en-CA" dirty="0" smtClean="0"/>
+              <a:t>Benign domains can have many queries that appear a great number of times</a:t>
+            </a:r>
+          </a:p>
+          <a:p>
+            <a:pPr lvl="1"/>
+            <a:r>
+              <a:rPr lang="en-CA" dirty="0" smtClean="0"/>
+              <a:t>Such as </a:t>
+            </a:r>
+            <a:r>
+              <a:rPr lang="en-CA" dirty="0" smtClean="0">
+                <a:hlinkClick r:id="rId2"/>
+              </a:rPr>
+              <a:t>www.google.com</a:t>
             </a:r>
             <a:endParaRPr lang="en-US" dirty="0"/>
           </a:p>
@@ -3918,102 +3915,76 @@
         <p:spPr/>
         <p:txBody>
           <a:bodyPr>
-            <a:normAutofit fontScale="90000"/>
+            <a:noAutofit/>
           </a:bodyPr>
           <a:lstStyle/>
           <a:p>
             <a:r>
-              <a:rPr lang="en-CA" dirty="0" smtClean="0"/>
-              <a:t>Evaluation:</a:t>
+              <a:rPr lang="en-CA" sz="3600" dirty="0" smtClean="0"/>
+              <a:t>Proposed Approach:</a:t>
             </a:r>
             <a:br>
-              <a:rPr lang="en-CA" dirty="0" smtClean="0"/>
+              <a:rPr lang="en-CA" sz="3600" dirty="0" smtClean="0"/>
             </a:br>
             <a:r>
-              <a:rPr lang="en-CA" dirty="0" smtClean="0"/>
-              <a:t>Literature Candidates and Test Data</a:t>
+              <a:rPr lang="en-CA" sz="3600" dirty="0" smtClean="0"/>
+              <a:t>Domain Length-Weighted Entropy (DLWE)</a:t>
+            </a:r>
+            <a:endParaRPr lang="en-US" sz="3600" dirty="0"/>
+          </a:p>
+        </p:txBody>
+      </p:sp>
+      <p:sp>
+        <p:nvSpPr>
+          <p:cNvPr id="3" name="Content Placeholder 2"/>
+          <p:cNvSpPr>
+            <a:spLocks noGrp="1"/>
+          </p:cNvSpPr>
+          <p:nvPr>
+            <p:ph idx="1"/>
+          </p:nvPr>
+        </p:nvSpPr>
+        <p:spPr/>
+        <p:txBody>
+          <a:bodyPr>
+            <a:normAutofit lnSpcReduction="10000"/>
+          </a:bodyPr>
+          <a:lstStyle/>
+          <a:p>
+            <a:r>
+              <a:rPr lang="en-CA" dirty="0" smtClean="0"/>
+              <a:t>Consider the collection of queries to a TLD in an interval</a:t>
+            </a:r>
+          </a:p>
+          <a:p>
+            <a:r>
+              <a:rPr lang="en-CA" dirty="0" smtClean="0"/>
+              <a:t>Treat each query as a symbol, and compute the entropy of the collection.</a:t>
+            </a:r>
+          </a:p>
+          <a:p>
+            <a:r>
+              <a:rPr lang="en-CA" dirty="0" smtClean="0"/>
+              <a:t>Multiply the result by the average query length for the TLD in the interval.</a:t>
+            </a:r>
+          </a:p>
+          <a:p>
+            <a:endParaRPr lang="en-CA" dirty="0" smtClean="0"/>
+          </a:p>
+          <a:p>
+            <a:r>
+              <a:rPr lang="en-CA" dirty="0" smtClean="0"/>
+              <a:t>Expect large values for tunnel domains, small values for benign </a:t>
+            </a:r>
+            <a:r>
+              <a:rPr lang="en-CA" dirty="0"/>
+              <a:t>d</a:t>
+            </a:r>
+            <a:r>
+              <a:rPr lang="en-CA" dirty="0" smtClean="0"/>
+              <a:t>omains.</a:t>
             </a:r>
             <a:endParaRPr lang="en-US" dirty="0"/>
-          </a:p>
-        </p:txBody>
-      </p:sp>
-      <p:sp>
-        <p:nvSpPr>
-          <p:cNvPr id="3" name="Content Placeholder 2"/>
-          <p:cNvSpPr>
-            <a:spLocks noGrp="1"/>
-          </p:cNvSpPr>
-          <p:nvPr>
-            <p:ph idx="1"/>
-          </p:nvPr>
-        </p:nvSpPr>
-        <p:spPr/>
-        <p:txBody>
-          <a:bodyPr>
-            <a:normAutofit fontScale="92500" lnSpcReduction="20000"/>
-          </a:bodyPr>
-          <a:lstStyle/>
-          <a:p>
-            <a:r>
-              <a:rPr lang="en-CA" dirty="0" smtClean="0"/>
-              <a:t>Proposed approach was tested against candidates from the literature</a:t>
-            </a:r>
-          </a:p>
-          <a:p>
-            <a:pPr lvl="1"/>
-            <a:r>
-              <a:rPr lang="en-CA" i="1" dirty="0" smtClean="0"/>
-              <a:t>N</a:t>
-            </a:r>
-            <a:r>
-              <a:rPr lang="en-CA" dirty="0" smtClean="0"/>
-              <a:t>-gram detection proposed by Born</a:t>
-            </a:r>
-          </a:p>
-          <a:p>
-            <a:pPr lvl="1"/>
-            <a:r>
-              <a:rPr lang="en-CA" i="1" dirty="0" err="1" smtClean="0"/>
-              <a:t>Gzip</a:t>
-            </a:r>
-            <a:r>
-              <a:rPr lang="en-CA" dirty="0" smtClean="0"/>
-              <a:t> compression detection proposed by </a:t>
-            </a:r>
-            <a:r>
-              <a:rPr lang="en-CA" dirty="0" err="1" smtClean="0"/>
-              <a:t>Paxson</a:t>
-            </a:r>
-            <a:endParaRPr lang="en-CA" dirty="0" smtClean="0"/>
-          </a:p>
-          <a:p>
-            <a:pPr lvl="1"/>
-            <a:r>
-              <a:rPr lang="en-CA" dirty="0" smtClean="0"/>
-              <a:t>Naïve counting of characters</a:t>
-            </a:r>
-          </a:p>
-          <a:p>
-            <a:pPr lvl="1"/>
-            <a:endParaRPr lang="en-CA" dirty="0"/>
-          </a:p>
-          <a:p>
-            <a:r>
-              <a:rPr lang="en-CA" dirty="0" smtClean="0"/>
-              <a:t>All approaches were implemented on a common Python framework</a:t>
-            </a:r>
-          </a:p>
-          <a:p>
-            <a:pPr lvl="1"/>
-            <a:r>
-              <a:rPr lang="en-CA" dirty="0" smtClean="0"/>
-              <a:t>Analysis was done on approximately one billion UDP port 53 packets from a live ISP network</a:t>
-            </a:r>
-            <a:r>
-              <a:rPr lang="en-US" dirty="0" smtClean="0"/>
-              <a:t> as well as intentionally generated tunnel traffic</a:t>
-            </a:r>
-            <a:endParaRPr lang="en-CA" dirty="0" smtClean="0"/>
           </a:p>
         </p:txBody>
       </p:sp>
@@ -4054,6 +4025,143 @@
         </p:nvSpPr>
         <p:spPr/>
         <p:txBody>
+          <a:bodyPr>
+            <a:normAutofit fontScale="90000"/>
+          </a:bodyPr>
+          <a:lstStyle/>
+          <a:p>
+            <a:r>
+              <a:rPr lang="en-CA" dirty="0" smtClean="0"/>
+              <a:t>Evaluation:</a:t>
+            </a:r>
+            <a:br>
+              <a:rPr lang="en-CA" dirty="0" smtClean="0"/>
+            </a:br>
+            <a:r>
+              <a:rPr lang="en-CA" dirty="0" smtClean="0"/>
+              <a:t>Literature Candidates and Test Data</a:t>
+            </a:r>
+            <a:endParaRPr lang="en-US" dirty="0"/>
+          </a:p>
+        </p:txBody>
+      </p:sp>
+      <p:sp>
+        <p:nvSpPr>
+          <p:cNvPr id="3" name="Content Placeholder 2"/>
+          <p:cNvSpPr>
+            <a:spLocks noGrp="1"/>
+          </p:cNvSpPr>
+          <p:nvPr>
+            <p:ph idx="1"/>
+          </p:nvPr>
+        </p:nvSpPr>
+        <p:spPr/>
+        <p:txBody>
+          <a:bodyPr>
+            <a:normAutofit fontScale="92500" lnSpcReduction="20000"/>
+          </a:bodyPr>
+          <a:lstStyle/>
+          <a:p>
+            <a:r>
+              <a:rPr lang="en-CA" dirty="0" smtClean="0"/>
+              <a:t>Proposed approach was tested against candidates from the literature</a:t>
+            </a:r>
+          </a:p>
+          <a:p>
+            <a:pPr lvl="1"/>
+            <a:r>
+              <a:rPr lang="en-CA" i="1" dirty="0" smtClean="0"/>
+              <a:t>N</a:t>
+            </a:r>
+            <a:r>
+              <a:rPr lang="en-CA" dirty="0" smtClean="0"/>
+              <a:t>-gram detection proposed by Born</a:t>
+            </a:r>
+          </a:p>
+          <a:p>
+            <a:pPr lvl="1"/>
+            <a:r>
+              <a:rPr lang="en-CA" i="1" dirty="0" err="1" smtClean="0"/>
+              <a:t>Gzip</a:t>
+            </a:r>
+            <a:r>
+              <a:rPr lang="en-CA" dirty="0" smtClean="0"/>
+              <a:t> compression detection proposed by </a:t>
+            </a:r>
+            <a:r>
+              <a:rPr lang="en-CA" dirty="0" err="1" smtClean="0"/>
+              <a:t>Paxson</a:t>
+            </a:r>
+            <a:endParaRPr lang="en-CA" dirty="0" smtClean="0"/>
+          </a:p>
+          <a:p>
+            <a:pPr lvl="1"/>
+            <a:r>
+              <a:rPr lang="en-CA" dirty="0" smtClean="0"/>
+              <a:t>Naïve counting of characters</a:t>
+            </a:r>
+          </a:p>
+          <a:p>
+            <a:pPr lvl="1"/>
+            <a:endParaRPr lang="en-CA" dirty="0"/>
+          </a:p>
+          <a:p>
+            <a:r>
+              <a:rPr lang="en-CA" dirty="0" smtClean="0"/>
+              <a:t>All approaches were implemented on a common Python framework</a:t>
+            </a:r>
+          </a:p>
+          <a:p>
+            <a:pPr lvl="1"/>
+            <a:r>
+              <a:rPr lang="en-CA" dirty="0" smtClean="0"/>
+              <a:t>Analysis was done on approximately one billion UDP port 53 packets from a live ISP network</a:t>
+            </a:r>
+            <a:r>
+              <a:rPr lang="en-US" dirty="0" smtClean="0"/>
+              <a:t> as well as intentionally generated tunnel traffic</a:t>
+            </a:r>
+            <a:endParaRPr lang="en-CA" dirty="0" smtClean="0"/>
+          </a:p>
+        </p:txBody>
+      </p:sp>
+    </p:spTree>
+  </p:cSld>
+  <p:clrMapOvr>
+    <a:masterClrMapping/>
+  </p:clrMapOvr>
+</p:sld>
+</file>
+
+<file path=ppt/slides/slide18.xml><?xml version="1.0" encoding="utf-8"?>
+<p:sld xmlns:a="http://schemas.openxmlformats.org/drawingml/2006/main" xmlns:r="http://schemas.openxmlformats.org/officeDocument/2006/relationships" xmlns:p="http://schemas.openxmlformats.org/presentationml/2006/main">
+  <p:cSld>
+    <p:spTree>
+      <p:nvGrpSpPr>
+        <p:cNvPr id="1" name=""/>
+        <p:cNvGrpSpPr/>
+        <p:nvPr/>
+      </p:nvGrpSpPr>
+      <p:grpSpPr>
+        <a:xfrm>
+          <a:off x="0" y="0"/>
+          <a:ext cx="0" cy="0"/>
+          <a:chOff x="0" y="0"/>
+          <a:chExt cx="0" cy="0"/>
+        </a:xfrm>
+      </p:grpSpPr>
+      <p:sp>
+        <p:nvSpPr>
+          <p:cNvPr id="2" name="Title 1"/>
+          <p:cNvSpPr>
+            <a:spLocks noGrp="1"/>
+          </p:cNvSpPr>
+          <p:nvPr>
+            <p:ph type="title"/>
+          </p:nvPr>
+        </p:nvSpPr>
+        <p:spPr/>
+        <p:txBody>
           <a:bodyPr/>
           <a:lstStyle/>
           <a:p>
@@ -4086,11 +4194,110 @@
             </a:r>
           </a:p>
           <a:p>
-            <a:r>
-              <a:rPr lang="en-CA" smtClean="0"/>
+            <a:pPr lvl="1"/>
+            <a:r>
+              <a:rPr lang="en-CA" dirty="0" smtClean="0"/>
+              <a:t>A relative comparison, due to lack of optimized implementations no absolute target is chosen</a:t>
+            </a:r>
+          </a:p>
+          <a:p>
+            <a:r>
+              <a:rPr lang="en-CA" dirty="0" smtClean="0"/>
               <a:t>False positive rate</a:t>
             </a:r>
-            <a:endParaRPr lang="en-US"/>
+          </a:p>
+          <a:p>
+            <a:pPr lvl="1"/>
+            <a:r>
+              <a:rPr lang="en-CA" dirty="0" smtClean="0"/>
+              <a:t>A relative ranking is employed </a:t>
+            </a:r>
+          </a:p>
+          <a:p>
+            <a:pPr lvl="1"/>
+            <a:r>
+              <a:rPr lang="en-CA" dirty="0" smtClean="0"/>
+              <a:t>Intuitively, a false-positive rate of 1% will result in up to fifty alerts per second during average daytime traffic of the captured sample.</a:t>
+            </a:r>
+            <a:endParaRPr lang="en-US" dirty="0"/>
+          </a:p>
+        </p:txBody>
+      </p:sp>
+    </p:spTree>
+  </p:cSld>
+  <p:clrMapOvr>
+    <a:masterClrMapping/>
+  </p:clrMapOvr>
+</p:sld>
+</file>
+
+<file path=ppt/slides/slide19.xml><?xml version="1.0" encoding="utf-8"?>
+<p:sld xmlns:a="http://schemas.openxmlformats.org/drawingml/2006/main" xmlns:r="http://schemas.openxmlformats.org/officeDocument/2006/relationships" xmlns:p="http://schemas.openxmlformats.org/presentationml/2006/main">
+  <p:cSld>
+    <p:spTree>
+      <p:nvGrpSpPr>
+        <p:cNvPr id="1" name=""/>
+        <p:cNvGrpSpPr/>
+        <p:nvPr/>
+      </p:nvGrpSpPr>
+      <p:grpSpPr>
+        <a:xfrm>
+          <a:off x="0" y="0"/>
+          <a:ext cx="0" cy="0"/>
+          <a:chOff x="0" y="0"/>
+          <a:chExt cx="0" cy="0"/>
+        </a:xfrm>
+      </p:grpSpPr>
+      <p:sp>
+        <p:nvSpPr>
+          <p:cNvPr id="2" name="Title 1"/>
+          <p:cNvSpPr>
+            <a:spLocks noGrp="1"/>
+          </p:cNvSpPr>
+          <p:nvPr>
+            <p:ph type="title"/>
+          </p:nvPr>
+        </p:nvSpPr>
+        <p:spPr/>
+        <p:txBody>
+          <a:bodyPr/>
+          <a:lstStyle/>
+          <a:p>
+            <a:r>
+              <a:rPr lang="en-CA" dirty="0" smtClean="0"/>
+              <a:t>Sample Data</a:t>
+            </a:r>
+            <a:endParaRPr lang="en-US" dirty="0"/>
+          </a:p>
+        </p:txBody>
+      </p:sp>
+      <p:sp>
+        <p:nvSpPr>
+          <p:cNvPr id="3" name="Content Placeholder 2"/>
+          <p:cNvSpPr>
+            <a:spLocks noGrp="1"/>
+          </p:cNvSpPr>
+          <p:nvPr>
+            <p:ph idx="1"/>
+          </p:nvPr>
+        </p:nvSpPr>
+        <p:spPr/>
+        <p:txBody>
+          <a:bodyPr/>
+          <a:lstStyle/>
+          <a:p>
+            <a:r>
+              <a:rPr lang="en-CA" dirty="0" smtClean="0"/>
+              <a:t>May contain malicious traffic</a:t>
+            </a:r>
+          </a:p>
+          <a:p>
+            <a:pPr lvl="1"/>
+            <a:r>
+              <a:rPr lang="en-CA" dirty="0" smtClean="0"/>
+              <a:t>In particular, DNS tunnels which will affect the false-positive rates of the detection methods.</a:t>
+            </a:r>
+            <a:endParaRPr lang="en-US" dirty="0"/>
           </a:p>
         </p:txBody>
       </p:sp>
@@ -4220,6 +4427,847 @@
 </p:sld>
 </file>
 
+<file path=ppt/slides/slide20.xml><?xml version="1.0" encoding="utf-8"?>
+<p:sld xmlns:a="http://schemas.openxmlformats.org/drawingml/2006/main" xmlns:r="http://schemas.openxmlformats.org/officeDocument/2006/relationships" xmlns:p="http://schemas.openxmlformats.org/presentationml/2006/main">
+  <p:cSld>
+    <p:spTree>
+      <p:nvGrpSpPr>
+        <p:cNvPr id="1" name=""/>
+        <p:cNvGrpSpPr/>
+        <p:nvPr/>
+      </p:nvGrpSpPr>
+      <p:grpSpPr>
+        <a:xfrm>
+          <a:off x="0" y="0"/>
+          <a:ext cx="0" cy="0"/>
+          <a:chOff x="0" y="0"/>
+          <a:chExt cx="0" cy="0"/>
+        </a:xfrm>
+      </p:grpSpPr>
+      <p:sp>
+        <p:nvSpPr>
+          <p:cNvPr id="2" name="Title 1"/>
+          <p:cNvSpPr>
+            <a:spLocks noGrp="1"/>
+          </p:cNvSpPr>
+          <p:nvPr>
+            <p:ph type="title"/>
+          </p:nvPr>
+        </p:nvSpPr>
+        <p:spPr/>
+        <p:txBody>
+          <a:bodyPr>
+            <a:normAutofit fontScale="90000"/>
+          </a:bodyPr>
+          <a:lstStyle/>
+          <a:p>
+            <a:r>
+              <a:rPr lang="en-CA" dirty="0" smtClean="0"/>
+              <a:t>Confounding Factor:</a:t>
+            </a:r>
+            <a:br>
+              <a:rPr lang="en-CA" dirty="0" smtClean="0"/>
+            </a:br>
+            <a:r>
+              <a:rPr lang="en-CA" dirty="0" smtClean="0"/>
+              <a:t>Effect of DNS Caching</a:t>
+            </a:r>
+            <a:endParaRPr lang="en-US" dirty="0"/>
+          </a:p>
+        </p:txBody>
+      </p:sp>
+      <p:pic>
+        <p:nvPicPr>
+          <p:cNvPr id="4100" name="Picture 4" descr="D:\Documents\Projects\Thesis\Proposal\figures\caching.eps"/>
+          <p:cNvPicPr>
+            <a:picLocks noChangeAspect="1" noChangeArrowheads="1"/>
+          </p:cNvPicPr>
+          <p:nvPr/>
+        </p:nvPicPr>
+        <p:blipFill>
+          <a:blip r:embed="rId2" cstate="print"/>
+          <a:srcRect/>
+          <a:stretch>
+            <a:fillRect/>
+          </a:stretch>
+        </p:blipFill>
+        <p:spPr bwMode="auto">
+          <a:xfrm>
+            <a:off x="134959" y="1628800"/>
+            <a:ext cx="9009041" cy="4318868"/>
+          </a:xfrm>
+          <a:prstGeom prst="rect">
+            <a:avLst/>
+          </a:prstGeom>
+          <a:noFill/>
+        </p:spPr>
+      </p:pic>
+    </p:spTree>
+  </p:cSld>
+  <p:clrMapOvr>
+    <a:masterClrMapping/>
+  </p:clrMapOvr>
+</p:sld>
+</file>
+
+<file path=ppt/slides/slide21.xml><?xml version="1.0" encoding="utf-8"?>
+<p:sld xmlns:a="http://schemas.openxmlformats.org/drawingml/2006/main" xmlns:r="http://schemas.openxmlformats.org/officeDocument/2006/relationships" xmlns:p="http://schemas.openxmlformats.org/presentationml/2006/main">
+  <p:cSld>
+    <p:spTree>
+      <p:nvGrpSpPr>
+        <p:cNvPr id="1" name=""/>
+        <p:cNvGrpSpPr/>
+        <p:nvPr/>
+      </p:nvGrpSpPr>
+      <p:grpSpPr>
+        <a:xfrm>
+          <a:off x="0" y="0"/>
+          <a:ext cx="0" cy="0"/>
+          <a:chOff x="0" y="0"/>
+          <a:chExt cx="0" cy="0"/>
+        </a:xfrm>
+      </p:grpSpPr>
+      <p:sp>
+        <p:nvSpPr>
+          <p:cNvPr id="2" name="Title 1"/>
+          <p:cNvSpPr>
+            <a:spLocks noGrp="1"/>
+          </p:cNvSpPr>
+          <p:nvPr>
+            <p:ph type="title"/>
+          </p:nvPr>
+        </p:nvSpPr>
+        <p:spPr/>
+        <p:txBody>
+          <a:bodyPr>
+            <a:normAutofit/>
+          </a:bodyPr>
+          <a:lstStyle/>
+          <a:p>
+            <a:r>
+              <a:rPr lang="en-CA" dirty="0" smtClean="0"/>
+              <a:t>Processing Performance</a:t>
+            </a:r>
+            <a:endParaRPr lang="en-US" dirty="0"/>
+          </a:p>
+        </p:txBody>
+      </p:sp>
+      <p:pic>
+        <p:nvPicPr>
+          <p:cNvPr id="5122" name="Picture 2" descr="D:\Documents\Projects\Thesis\Proposal\figures\pmqr.eps"/>
+          <p:cNvPicPr>
+            <a:picLocks noChangeAspect="1" noChangeArrowheads="1"/>
+          </p:cNvPicPr>
+          <p:nvPr/>
+        </p:nvPicPr>
+        <p:blipFill>
+          <a:blip r:embed="rId2" cstate="print"/>
+          <a:srcRect/>
+          <a:stretch>
+            <a:fillRect/>
+          </a:stretch>
+        </p:blipFill>
+        <p:spPr bwMode="auto">
+          <a:xfrm>
+            <a:off x="0" y="1244009"/>
+            <a:ext cx="9144000" cy="5613991"/>
+          </a:xfrm>
+          <a:prstGeom prst="rect">
+            <a:avLst/>
+          </a:prstGeom>
+          <a:noFill/>
+        </p:spPr>
+      </p:pic>
+    </p:spTree>
+  </p:cSld>
+  <p:clrMapOvr>
+    <a:masterClrMapping/>
+  </p:clrMapOvr>
+</p:sld>
+</file>
+
+<file path=ppt/slides/slide22.xml><?xml version="1.0" encoding="utf-8"?>
+<p:sld xmlns:a="http://schemas.openxmlformats.org/drawingml/2006/main" xmlns:r="http://schemas.openxmlformats.org/officeDocument/2006/relationships" xmlns:p="http://schemas.openxmlformats.org/presentationml/2006/main">
+  <p:cSld>
+    <p:spTree>
+      <p:nvGrpSpPr>
+        <p:cNvPr id="1" name=""/>
+        <p:cNvGrpSpPr/>
+        <p:nvPr/>
+      </p:nvGrpSpPr>
+      <p:grpSpPr>
+        <a:xfrm>
+          <a:off x="0" y="0"/>
+          <a:ext cx="0" cy="0"/>
+          <a:chOff x="0" y="0"/>
+          <a:chExt cx="0" cy="0"/>
+        </a:xfrm>
+      </p:grpSpPr>
+      <p:sp>
+        <p:nvSpPr>
+          <p:cNvPr id="2" name="Title 1"/>
+          <p:cNvSpPr>
+            <a:spLocks noGrp="1"/>
+          </p:cNvSpPr>
+          <p:nvPr>
+            <p:ph type="title"/>
+          </p:nvPr>
+        </p:nvSpPr>
+        <p:spPr/>
+        <p:txBody>
+          <a:bodyPr>
+            <a:normAutofit/>
+          </a:bodyPr>
+          <a:lstStyle/>
+          <a:p>
+            <a:r>
+              <a:rPr lang="en-CA" dirty="0" smtClean="0"/>
+              <a:t>Processing Performance</a:t>
+            </a:r>
+            <a:endParaRPr lang="en-US" dirty="0"/>
+          </a:p>
+        </p:txBody>
+      </p:sp>
+      <p:pic>
+        <p:nvPicPr>
+          <p:cNvPr id="6147" name="Picture 3" descr="D:\Documents\Projects\Thesis\Proposal\figures\pmqr-100k.eps"/>
+          <p:cNvPicPr>
+            <a:picLocks noChangeAspect="1" noChangeArrowheads="1"/>
+          </p:cNvPicPr>
+          <p:nvPr/>
+        </p:nvPicPr>
+        <p:blipFill>
+          <a:blip r:embed="rId2" cstate="print"/>
+          <a:srcRect/>
+          <a:stretch>
+            <a:fillRect/>
+          </a:stretch>
+        </p:blipFill>
+        <p:spPr bwMode="auto">
+          <a:xfrm>
+            <a:off x="0" y="1244009"/>
+            <a:ext cx="9144000" cy="5613991"/>
+          </a:xfrm>
+          <a:prstGeom prst="rect">
+            <a:avLst/>
+          </a:prstGeom>
+          <a:noFill/>
+        </p:spPr>
+      </p:pic>
+    </p:spTree>
+  </p:cSld>
+  <p:clrMapOvr>
+    <a:masterClrMapping/>
+  </p:clrMapOvr>
+</p:sld>
+</file>
+
+<file path=ppt/slides/slide23.xml><?xml version="1.0" encoding="utf-8"?>
+<p:sld xmlns:a="http://schemas.openxmlformats.org/drawingml/2006/main" xmlns:r="http://schemas.openxmlformats.org/officeDocument/2006/relationships" xmlns:p="http://schemas.openxmlformats.org/presentationml/2006/main">
+  <p:cSld>
+    <p:spTree>
+      <p:nvGrpSpPr>
+        <p:cNvPr id="1" name=""/>
+        <p:cNvGrpSpPr/>
+        <p:nvPr/>
+      </p:nvGrpSpPr>
+      <p:grpSpPr>
+        <a:xfrm>
+          <a:off x="0" y="0"/>
+          <a:ext cx="0" cy="0"/>
+          <a:chOff x="0" y="0"/>
+          <a:chExt cx="0" cy="0"/>
+        </a:xfrm>
+      </p:grpSpPr>
+      <p:sp>
+        <p:nvSpPr>
+          <p:cNvPr id="2" name="Title 1"/>
+          <p:cNvSpPr>
+            <a:spLocks noGrp="1"/>
+          </p:cNvSpPr>
+          <p:nvPr>
+            <p:ph type="title"/>
+          </p:nvPr>
+        </p:nvSpPr>
+        <p:spPr/>
+        <p:txBody>
+          <a:bodyPr>
+            <a:normAutofit fontScale="90000"/>
+          </a:bodyPr>
+          <a:lstStyle/>
+          <a:p>
+            <a:r>
+              <a:rPr lang="en-CA" dirty="0" smtClean="0"/>
+              <a:t>Processing Performance:</a:t>
+            </a:r>
+            <a:br>
+              <a:rPr lang="en-CA" dirty="0" smtClean="0"/>
+            </a:br>
+            <a:r>
+              <a:rPr lang="en-CA" dirty="0" smtClean="0"/>
+              <a:t>Naïve Method</a:t>
+            </a:r>
+            <a:endParaRPr lang="en-US" dirty="0"/>
+          </a:p>
+        </p:txBody>
+      </p:sp>
+      <p:pic>
+        <p:nvPicPr>
+          <p:cNvPr id="7173" name="Picture 5" descr="D:\Documents\Projects\Thesis\Proposal\figures\ppia-naive.eps"/>
+          <p:cNvPicPr>
+            <a:picLocks noChangeAspect="1" noChangeArrowheads="1"/>
+          </p:cNvPicPr>
+          <p:nvPr/>
+        </p:nvPicPr>
+        <p:blipFill>
+          <a:blip r:embed="rId2" cstate="print"/>
+          <a:srcRect/>
+          <a:stretch>
+            <a:fillRect/>
+          </a:stretch>
+        </p:blipFill>
+        <p:spPr bwMode="auto">
+          <a:xfrm>
+            <a:off x="0" y="1628800"/>
+            <a:ext cx="9144000" cy="4580676"/>
+          </a:xfrm>
+          <a:prstGeom prst="rect">
+            <a:avLst/>
+          </a:prstGeom>
+          <a:noFill/>
+        </p:spPr>
+      </p:pic>
+    </p:spTree>
+  </p:cSld>
+  <p:clrMapOvr>
+    <a:masterClrMapping/>
+  </p:clrMapOvr>
+</p:sld>
+</file>
+
+<file path=ppt/slides/slide24.xml><?xml version="1.0" encoding="utf-8"?>
+<p:sld xmlns:a="http://schemas.openxmlformats.org/drawingml/2006/main" xmlns:r="http://schemas.openxmlformats.org/officeDocument/2006/relationships" xmlns:p="http://schemas.openxmlformats.org/presentationml/2006/main">
+  <p:cSld>
+    <p:spTree>
+      <p:nvGrpSpPr>
+        <p:cNvPr id="1" name=""/>
+        <p:cNvGrpSpPr/>
+        <p:nvPr/>
+      </p:nvGrpSpPr>
+      <p:grpSpPr>
+        <a:xfrm>
+          <a:off x="0" y="0"/>
+          <a:ext cx="0" cy="0"/>
+          <a:chOff x="0" y="0"/>
+          <a:chExt cx="0" cy="0"/>
+        </a:xfrm>
+      </p:grpSpPr>
+      <p:sp>
+        <p:nvSpPr>
+          <p:cNvPr id="2" name="Title 1"/>
+          <p:cNvSpPr>
+            <a:spLocks noGrp="1"/>
+          </p:cNvSpPr>
+          <p:nvPr>
+            <p:ph type="title"/>
+          </p:nvPr>
+        </p:nvSpPr>
+        <p:spPr/>
+        <p:txBody>
+          <a:bodyPr>
+            <a:normAutofit fontScale="90000"/>
+          </a:bodyPr>
+          <a:lstStyle/>
+          <a:p>
+            <a:r>
+              <a:rPr lang="en-CA" dirty="0" smtClean="0"/>
+              <a:t>Processing Performance</a:t>
+            </a:r>
+            <a:r>
+              <a:rPr lang="en-CA" dirty="0" smtClean="0"/>
+              <a:t> :</a:t>
+            </a:r>
+            <a:br>
+              <a:rPr lang="en-CA" dirty="0" smtClean="0"/>
+            </a:br>
+            <a:r>
+              <a:rPr lang="en-CA" dirty="0" smtClean="0"/>
+              <a:t>Born Method</a:t>
+            </a:r>
+            <a:endParaRPr lang="en-US" dirty="0"/>
+          </a:p>
+        </p:txBody>
+      </p:sp>
+      <p:pic>
+        <p:nvPicPr>
+          <p:cNvPr id="7173" name="Picture 5" descr="D:\Documents\Projects\Thesis\Proposal\figures\ppia-naive.eps"/>
+          <p:cNvPicPr>
+            <a:picLocks noChangeAspect="1" noChangeArrowheads="1"/>
+          </p:cNvPicPr>
+          <p:nvPr/>
+        </p:nvPicPr>
+        <p:blipFill>
+          <a:blip r:embed="rId2" cstate="print"/>
+          <a:stretch>
+            <a:fillRect/>
+          </a:stretch>
+        </p:blipFill>
+        <p:spPr bwMode="auto">
+          <a:xfrm>
+            <a:off x="0" y="1629886"/>
+            <a:ext cx="9144000" cy="4578503"/>
+          </a:xfrm>
+          <a:prstGeom prst="rect">
+            <a:avLst/>
+          </a:prstGeom>
+          <a:noFill/>
+        </p:spPr>
+      </p:pic>
+    </p:spTree>
+  </p:cSld>
+  <p:clrMapOvr>
+    <a:masterClrMapping/>
+  </p:clrMapOvr>
+</p:sld>
+</file>
+
+<file path=ppt/slides/slide25.xml><?xml version="1.0" encoding="utf-8"?>
+<p:sld xmlns:a="http://schemas.openxmlformats.org/drawingml/2006/main" xmlns:r="http://schemas.openxmlformats.org/officeDocument/2006/relationships" xmlns:p="http://schemas.openxmlformats.org/presentationml/2006/main">
+  <p:cSld>
+    <p:spTree>
+      <p:nvGrpSpPr>
+        <p:cNvPr id="1" name=""/>
+        <p:cNvGrpSpPr/>
+        <p:nvPr/>
+      </p:nvGrpSpPr>
+      <p:grpSpPr>
+        <a:xfrm>
+          <a:off x="0" y="0"/>
+          <a:ext cx="0" cy="0"/>
+          <a:chOff x="0" y="0"/>
+          <a:chExt cx="0" cy="0"/>
+        </a:xfrm>
+      </p:grpSpPr>
+      <p:sp>
+        <p:nvSpPr>
+          <p:cNvPr id="2" name="Title 1"/>
+          <p:cNvSpPr>
+            <a:spLocks noGrp="1"/>
+          </p:cNvSpPr>
+          <p:nvPr>
+            <p:ph type="title"/>
+          </p:nvPr>
+        </p:nvSpPr>
+        <p:spPr/>
+        <p:txBody>
+          <a:bodyPr>
+            <a:normAutofit fontScale="90000"/>
+          </a:bodyPr>
+          <a:lstStyle/>
+          <a:p>
+            <a:r>
+              <a:rPr lang="en-CA" dirty="0" smtClean="0"/>
+              <a:t>Processing Performance</a:t>
+            </a:r>
+            <a:r>
+              <a:rPr lang="en-CA" dirty="0" smtClean="0"/>
+              <a:t> :</a:t>
+            </a:r>
+            <a:br>
+              <a:rPr lang="en-CA" dirty="0" smtClean="0"/>
+            </a:br>
+            <a:r>
+              <a:rPr lang="en-CA" dirty="0" err="1" smtClean="0"/>
+              <a:t>Paxson</a:t>
+            </a:r>
+            <a:r>
+              <a:rPr lang="en-CA" dirty="0" smtClean="0"/>
+              <a:t> Method</a:t>
+            </a:r>
+            <a:endParaRPr lang="en-US" dirty="0"/>
+          </a:p>
+        </p:txBody>
+      </p:sp>
+      <p:pic>
+        <p:nvPicPr>
+          <p:cNvPr id="7173" name="Picture 5" descr="D:\Documents\Projects\Thesis\Proposal\figures\ppia-naive.eps"/>
+          <p:cNvPicPr>
+            <a:picLocks noChangeAspect="1" noChangeArrowheads="1"/>
+          </p:cNvPicPr>
+          <p:nvPr/>
+        </p:nvPicPr>
+        <p:blipFill>
+          <a:blip r:embed="rId2" cstate="print"/>
+          <a:stretch>
+            <a:fillRect/>
+          </a:stretch>
+        </p:blipFill>
+        <p:spPr bwMode="auto">
+          <a:xfrm>
+            <a:off x="0" y="1629886"/>
+            <a:ext cx="9144000" cy="4578503"/>
+          </a:xfrm>
+          <a:prstGeom prst="rect">
+            <a:avLst/>
+          </a:prstGeom>
+          <a:noFill/>
+        </p:spPr>
+      </p:pic>
+    </p:spTree>
+  </p:cSld>
+  <p:clrMapOvr>
+    <a:masterClrMapping/>
+  </p:clrMapOvr>
+</p:sld>
+</file>
+
+<file path=ppt/slides/slide26.xml><?xml version="1.0" encoding="utf-8"?>
+<p:sld xmlns:a="http://schemas.openxmlformats.org/drawingml/2006/main" xmlns:r="http://schemas.openxmlformats.org/officeDocument/2006/relationships" xmlns:p="http://schemas.openxmlformats.org/presentationml/2006/main">
+  <p:cSld>
+    <p:spTree>
+      <p:nvGrpSpPr>
+        <p:cNvPr id="1" name=""/>
+        <p:cNvGrpSpPr/>
+        <p:nvPr/>
+      </p:nvGrpSpPr>
+      <p:grpSpPr>
+        <a:xfrm>
+          <a:off x="0" y="0"/>
+          <a:ext cx="0" cy="0"/>
+          <a:chOff x="0" y="0"/>
+          <a:chExt cx="0" cy="0"/>
+        </a:xfrm>
+      </p:grpSpPr>
+      <p:sp>
+        <p:nvSpPr>
+          <p:cNvPr id="2" name="Title 1"/>
+          <p:cNvSpPr>
+            <a:spLocks noGrp="1"/>
+          </p:cNvSpPr>
+          <p:nvPr>
+            <p:ph type="title"/>
+          </p:nvPr>
+        </p:nvSpPr>
+        <p:spPr/>
+        <p:txBody>
+          <a:bodyPr>
+            <a:normAutofit fontScale="90000"/>
+          </a:bodyPr>
+          <a:lstStyle/>
+          <a:p>
+            <a:r>
+              <a:rPr lang="en-CA" dirty="0" smtClean="0"/>
+              <a:t>Processing Performance</a:t>
+            </a:r>
+            <a:r>
+              <a:rPr lang="en-CA" dirty="0" smtClean="0"/>
+              <a:t> :</a:t>
+            </a:r>
+            <a:br>
+              <a:rPr lang="en-CA" dirty="0" smtClean="0"/>
+            </a:br>
+            <a:r>
+              <a:rPr lang="en-CA" dirty="0" smtClean="0"/>
+              <a:t>Proposed Method</a:t>
+            </a:r>
+            <a:endParaRPr lang="en-US" dirty="0"/>
+          </a:p>
+        </p:txBody>
+      </p:sp>
+      <p:pic>
+        <p:nvPicPr>
+          <p:cNvPr id="7173" name="Picture 5" descr="D:\Documents\Projects\Thesis\Proposal\figures\ppia-naive.eps"/>
+          <p:cNvPicPr>
+            <a:picLocks noChangeAspect="1" noChangeArrowheads="1"/>
+          </p:cNvPicPr>
+          <p:nvPr/>
+        </p:nvPicPr>
+        <p:blipFill>
+          <a:blip r:embed="rId2" cstate="print"/>
+          <a:stretch>
+            <a:fillRect/>
+          </a:stretch>
+        </p:blipFill>
+        <p:spPr bwMode="auto">
+          <a:xfrm>
+            <a:off x="0" y="1629886"/>
+            <a:ext cx="9144000" cy="4578503"/>
+          </a:xfrm>
+          <a:prstGeom prst="rect">
+            <a:avLst/>
+          </a:prstGeom>
+          <a:noFill/>
+        </p:spPr>
+      </p:pic>
+    </p:spTree>
+  </p:cSld>
+  <p:clrMapOvr>
+    <a:masterClrMapping/>
+  </p:clrMapOvr>
+</p:sld>
+</file>
+
+<file path=ppt/slides/slide27.xml><?xml version="1.0" encoding="utf-8"?>
+<p:sld xmlns:a="http://schemas.openxmlformats.org/drawingml/2006/main" xmlns:r="http://schemas.openxmlformats.org/officeDocument/2006/relationships" xmlns:p="http://schemas.openxmlformats.org/presentationml/2006/main">
+  <p:cSld>
+    <p:spTree>
+      <p:nvGrpSpPr>
+        <p:cNvPr id="1" name=""/>
+        <p:cNvGrpSpPr/>
+        <p:nvPr/>
+      </p:nvGrpSpPr>
+      <p:grpSpPr>
+        <a:xfrm>
+          <a:off x="0" y="0"/>
+          <a:ext cx="0" cy="0"/>
+          <a:chOff x="0" y="0"/>
+          <a:chExt cx="0" cy="0"/>
+        </a:xfrm>
+      </p:grpSpPr>
+      <p:sp>
+        <p:nvSpPr>
+          <p:cNvPr id="2" name="Title 1"/>
+          <p:cNvSpPr>
+            <a:spLocks noGrp="1"/>
+          </p:cNvSpPr>
+          <p:nvPr>
+            <p:ph type="title"/>
+          </p:nvPr>
+        </p:nvSpPr>
+        <p:spPr/>
+        <p:txBody>
+          <a:bodyPr>
+            <a:normAutofit fontScale="90000"/>
+          </a:bodyPr>
+          <a:lstStyle/>
+          <a:p>
+            <a:r>
+              <a:rPr lang="en-CA" dirty="0" smtClean="0"/>
+              <a:t>Processing Performance:</a:t>
+            </a:r>
+            <a:br>
+              <a:rPr lang="en-CA" dirty="0" smtClean="0"/>
+            </a:br>
+            <a:r>
+              <a:rPr lang="en-CA" dirty="0" smtClean="0"/>
+              <a:t>Conclusions</a:t>
+            </a:r>
+            <a:endParaRPr lang="en-US" dirty="0"/>
+          </a:p>
+        </p:txBody>
+      </p:sp>
+      <p:sp>
+        <p:nvSpPr>
+          <p:cNvPr id="3" name="Content Placeholder 2"/>
+          <p:cNvSpPr>
+            <a:spLocks noGrp="1"/>
+          </p:cNvSpPr>
+          <p:nvPr>
+            <p:ph idx="1"/>
+          </p:nvPr>
+        </p:nvSpPr>
+        <p:spPr/>
+        <p:txBody>
+          <a:bodyPr/>
+          <a:lstStyle/>
+          <a:p>
+            <a:r>
+              <a:rPr lang="en-CA" dirty="0" smtClean="0"/>
+              <a:t>The naïve and proposed methods far outperform the other methods</a:t>
+            </a:r>
+          </a:p>
+          <a:p>
+            <a:r>
+              <a:rPr lang="en-CA" dirty="0" smtClean="0"/>
+              <a:t>As throughput increases, both </a:t>
+            </a:r>
+            <a:r>
+              <a:rPr lang="en-CA" dirty="0" err="1" smtClean="0"/>
+              <a:t>Paxson</a:t>
+            </a:r>
+            <a:r>
+              <a:rPr lang="en-CA" dirty="0" smtClean="0"/>
+              <a:t> and Born approaches suffer severe degradation in performance.</a:t>
+            </a:r>
+          </a:p>
+        </p:txBody>
+      </p:sp>
+    </p:spTree>
+  </p:cSld>
+  <p:clrMapOvr>
+    <a:masterClrMapping/>
+  </p:clrMapOvr>
+</p:sld>
+</file>
+
+<file path=ppt/slides/slide28.xml><?xml version="1.0" encoding="utf-8"?>
+<p:sld xmlns:a="http://schemas.openxmlformats.org/drawingml/2006/main" xmlns:r="http://schemas.openxmlformats.org/officeDocument/2006/relationships" xmlns:p="http://schemas.openxmlformats.org/presentationml/2006/main">
+  <p:cSld>
+    <p:spTree>
+      <p:nvGrpSpPr>
+        <p:cNvPr id="1" name=""/>
+        <p:cNvGrpSpPr/>
+        <p:nvPr/>
+      </p:nvGrpSpPr>
+      <p:grpSpPr>
+        <a:xfrm>
+          <a:off x="0" y="0"/>
+          <a:ext cx="0" cy="0"/>
+          <a:chOff x="0" y="0"/>
+          <a:chExt cx="0" cy="0"/>
+        </a:xfrm>
+      </p:grpSpPr>
+      <p:sp>
+        <p:nvSpPr>
+          <p:cNvPr id="2" name="Title 1"/>
+          <p:cNvSpPr>
+            <a:spLocks noGrp="1"/>
+          </p:cNvSpPr>
+          <p:nvPr>
+            <p:ph type="title"/>
+          </p:nvPr>
+        </p:nvSpPr>
+        <p:spPr/>
+        <p:txBody>
+          <a:bodyPr>
+            <a:normAutofit fontScale="90000"/>
+          </a:bodyPr>
+          <a:lstStyle/>
+          <a:p>
+            <a:r>
+              <a:rPr lang="en-CA" dirty="0" smtClean="0"/>
+              <a:t>Detection Performance</a:t>
+            </a:r>
+            <a:r>
+              <a:rPr lang="en-CA" dirty="0" smtClean="0"/>
+              <a:t> :</a:t>
+            </a:r>
+            <a:br>
+              <a:rPr lang="en-CA" dirty="0" smtClean="0"/>
+            </a:br>
+            <a:r>
+              <a:rPr lang="en-CA" dirty="0" smtClean="0"/>
+              <a:t>Naïve Method</a:t>
+            </a:r>
+            <a:endParaRPr lang="en-US" dirty="0"/>
+          </a:p>
+        </p:txBody>
+      </p:sp>
+      <p:pic>
+        <p:nvPicPr>
+          <p:cNvPr id="4" name="Content Placeholder 3" descr="cnplot.eps"/>
+          <p:cNvPicPr>
+            <a:picLocks noGrp="1" noChangeAspect="1"/>
+          </p:cNvPicPr>
+          <p:nvPr>
+            <p:ph idx="1"/>
+          </p:nvPr>
+        </p:nvPicPr>
+        <p:blipFill>
+          <a:blip r:embed="rId2" cstate="print"/>
+          <a:stretch>
+            <a:fillRect/>
+          </a:stretch>
+        </p:blipFill>
+        <p:spPr>
+          <a:xfrm>
+            <a:off x="0" y="1412776"/>
+            <a:ext cx="9144000" cy="4748733"/>
+          </a:xfrm>
+        </p:spPr>
+      </p:pic>
+    </p:spTree>
+  </p:cSld>
+  <p:clrMapOvr>
+    <a:masterClrMapping/>
+  </p:clrMapOvr>
+</p:sld>
+</file>
+
+<file path=ppt/slides/slide29.xml><?xml version="1.0" encoding="utf-8"?>
+<p:sld xmlns:a="http://schemas.openxmlformats.org/drawingml/2006/main" xmlns:r="http://schemas.openxmlformats.org/officeDocument/2006/relationships" xmlns:p="http://schemas.openxmlformats.org/presentationml/2006/main">
+  <p:cSld>
+    <p:spTree>
+      <p:nvGrpSpPr>
+        <p:cNvPr id="1" name=""/>
+        <p:cNvGrpSpPr/>
+        <p:nvPr/>
+      </p:nvGrpSpPr>
+      <p:grpSpPr>
+        <a:xfrm>
+          <a:off x="0" y="0"/>
+          <a:ext cx="0" cy="0"/>
+          <a:chOff x="0" y="0"/>
+          <a:chExt cx="0" cy="0"/>
+        </a:xfrm>
+      </p:grpSpPr>
+      <p:sp>
+        <p:nvSpPr>
+          <p:cNvPr id="2" name="Title 1"/>
+          <p:cNvSpPr>
+            <a:spLocks noGrp="1"/>
+          </p:cNvSpPr>
+          <p:nvPr>
+            <p:ph type="title"/>
+          </p:nvPr>
+        </p:nvSpPr>
+        <p:spPr/>
+        <p:txBody>
+          <a:bodyPr>
+            <a:normAutofit fontScale="90000"/>
+          </a:bodyPr>
+          <a:lstStyle/>
+          <a:p>
+            <a:r>
+              <a:rPr lang="en-CA" dirty="0" smtClean="0"/>
+              <a:t>Detection Performance</a:t>
+            </a:r>
+            <a:r>
+              <a:rPr lang="en-CA" dirty="0" smtClean="0"/>
+              <a:t> :</a:t>
+            </a:r>
+            <a:br>
+              <a:rPr lang="en-CA" dirty="0" smtClean="0"/>
+            </a:br>
+            <a:r>
+              <a:rPr lang="en-CA" dirty="0" smtClean="0"/>
+              <a:t>Naïve Method</a:t>
+            </a:r>
+            <a:endParaRPr lang="en-US" dirty="0"/>
+          </a:p>
+        </p:txBody>
+      </p:sp>
+      <p:pic>
+        <p:nvPicPr>
+          <p:cNvPr id="4" name="Content Placeholder 3" descr="cnplot.eps"/>
+          <p:cNvPicPr>
+            <a:picLocks noGrp="1" noChangeAspect="1"/>
+          </p:cNvPicPr>
+          <p:nvPr>
+            <p:ph idx="1"/>
+          </p:nvPr>
+        </p:nvPicPr>
+        <p:blipFill>
+          <a:blip r:embed="rId2" cstate="print"/>
+          <a:stretch>
+            <a:fillRect/>
+          </a:stretch>
+        </p:blipFill>
+        <p:spPr>
+          <a:xfrm>
+            <a:off x="0" y="1412776"/>
+            <a:ext cx="9144000" cy="5056094"/>
+          </a:xfrm>
+        </p:spPr>
+      </p:pic>
+    </p:spTree>
+  </p:cSld>
+  <p:clrMapOvr>
+    <a:masterClrMapping/>
+  </p:clrMapOvr>
+</p:sld>
+</file>
+
 <file path=ppt/slides/slide3.xml><?xml version="1.0" encoding="utf-8"?>
 <p:sld xmlns:a="http://schemas.openxmlformats.org/drawingml/2006/main" xmlns:r="http://schemas.openxmlformats.org/officeDocument/2006/relationships" xmlns:p="http://schemas.openxmlformats.org/presentationml/2006/main">
   <p:cSld>
@@ -4345,6 +5393,850 @@
           </a:p>
         </p:txBody>
       </p:sp>
+    </p:spTree>
+  </p:cSld>
+  <p:clrMapOvr>
+    <a:masterClrMapping/>
+  </p:clrMapOvr>
+</p:sld>
+</file>
+
+<file path=ppt/slides/slide30.xml><?xml version="1.0" encoding="utf-8"?>
+<p:sld xmlns:a="http://schemas.openxmlformats.org/drawingml/2006/main" xmlns:r="http://schemas.openxmlformats.org/officeDocument/2006/relationships" xmlns:p="http://schemas.openxmlformats.org/presentationml/2006/main">
+  <p:cSld>
+    <p:spTree>
+      <p:nvGrpSpPr>
+        <p:cNvPr id="1" name=""/>
+        <p:cNvGrpSpPr/>
+        <p:nvPr/>
+      </p:nvGrpSpPr>
+      <p:grpSpPr>
+        <a:xfrm>
+          <a:off x="0" y="0"/>
+          <a:ext cx="0" cy="0"/>
+          <a:chOff x="0" y="0"/>
+          <a:chExt cx="0" cy="0"/>
+        </a:xfrm>
+      </p:grpSpPr>
+      <p:sp>
+        <p:nvSpPr>
+          <p:cNvPr id="2" name="Title 1"/>
+          <p:cNvSpPr>
+            <a:spLocks noGrp="1"/>
+          </p:cNvSpPr>
+          <p:nvPr>
+            <p:ph type="title"/>
+          </p:nvPr>
+        </p:nvSpPr>
+        <p:spPr/>
+        <p:txBody>
+          <a:bodyPr>
+            <a:normAutofit fontScale="90000"/>
+          </a:bodyPr>
+          <a:lstStyle/>
+          <a:p>
+            <a:r>
+              <a:rPr lang="en-CA" dirty="0" smtClean="0"/>
+              <a:t>Detection Performance</a:t>
+            </a:r>
+            <a:r>
+              <a:rPr lang="en-CA" dirty="0" smtClean="0"/>
+              <a:t> :</a:t>
+            </a:r>
+            <a:br>
+              <a:rPr lang="en-CA" dirty="0" smtClean="0"/>
+            </a:br>
+            <a:r>
+              <a:rPr lang="en-CA" dirty="0" smtClean="0"/>
+              <a:t>Born Method</a:t>
+            </a:r>
+            <a:endParaRPr lang="en-US" dirty="0"/>
+          </a:p>
+        </p:txBody>
+      </p:sp>
+      <p:pic>
+        <p:nvPicPr>
+          <p:cNvPr id="4" name="Content Placeholder 3" descr="cnplot.eps"/>
+          <p:cNvPicPr>
+            <a:picLocks noGrp="1" noChangeAspect="1"/>
+          </p:cNvPicPr>
+          <p:nvPr>
+            <p:ph idx="1"/>
+          </p:nvPr>
+        </p:nvPicPr>
+        <p:blipFill>
+          <a:blip r:embed="rId2" cstate="print"/>
+          <a:stretch>
+            <a:fillRect/>
+          </a:stretch>
+        </p:blipFill>
+        <p:spPr>
+          <a:xfrm>
+            <a:off x="0" y="1412776"/>
+            <a:ext cx="9144000" cy="4748732"/>
+          </a:xfrm>
+        </p:spPr>
+      </p:pic>
+    </p:spTree>
+  </p:cSld>
+  <p:clrMapOvr>
+    <a:masterClrMapping/>
+  </p:clrMapOvr>
+</p:sld>
+</file>
+
+<file path=ppt/slides/slide31.xml><?xml version="1.0" encoding="utf-8"?>
+<p:sld xmlns:a="http://schemas.openxmlformats.org/drawingml/2006/main" xmlns:r="http://schemas.openxmlformats.org/officeDocument/2006/relationships" xmlns:p="http://schemas.openxmlformats.org/presentationml/2006/main">
+  <p:cSld>
+    <p:spTree>
+      <p:nvGrpSpPr>
+        <p:cNvPr id="1" name=""/>
+        <p:cNvGrpSpPr/>
+        <p:nvPr/>
+      </p:nvGrpSpPr>
+      <p:grpSpPr>
+        <a:xfrm>
+          <a:off x="0" y="0"/>
+          <a:ext cx="0" cy="0"/>
+          <a:chOff x="0" y="0"/>
+          <a:chExt cx="0" cy="0"/>
+        </a:xfrm>
+      </p:grpSpPr>
+      <p:sp>
+        <p:nvSpPr>
+          <p:cNvPr id="2" name="Title 1"/>
+          <p:cNvSpPr>
+            <a:spLocks noGrp="1"/>
+          </p:cNvSpPr>
+          <p:nvPr>
+            <p:ph type="title"/>
+          </p:nvPr>
+        </p:nvSpPr>
+        <p:spPr/>
+        <p:txBody>
+          <a:bodyPr>
+            <a:normAutofit fontScale="90000"/>
+          </a:bodyPr>
+          <a:lstStyle/>
+          <a:p>
+            <a:r>
+              <a:rPr lang="en-CA" dirty="0" smtClean="0"/>
+              <a:t>Detection Performance</a:t>
+            </a:r>
+            <a:r>
+              <a:rPr lang="en-CA" dirty="0" smtClean="0"/>
+              <a:t> :</a:t>
+            </a:r>
+            <a:br>
+              <a:rPr lang="en-CA" dirty="0" smtClean="0"/>
+            </a:br>
+            <a:r>
+              <a:rPr lang="en-CA" dirty="0" smtClean="0"/>
+              <a:t>Born Method</a:t>
+            </a:r>
+            <a:endParaRPr lang="en-US" dirty="0"/>
+          </a:p>
+        </p:txBody>
+      </p:sp>
+      <p:pic>
+        <p:nvPicPr>
+          <p:cNvPr id="4" name="Content Placeholder 3" descr="cnplot.eps"/>
+          <p:cNvPicPr>
+            <a:picLocks noGrp="1" noChangeAspect="1"/>
+          </p:cNvPicPr>
+          <p:nvPr>
+            <p:ph idx="1"/>
+          </p:nvPr>
+        </p:nvPicPr>
+        <p:blipFill>
+          <a:blip r:embed="rId2" cstate="print"/>
+          <a:stretch>
+            <a:fillRect/>
+          </a:stretch>
+        </p:blipFill>
+        <p:spPr>
+          <a:xfrm>
+            <a:off x="0" y="1412776"/>
+            <a:ext cx="9143999" cy="5056094"/>
+          </a:xfrm>
+        </p:spPr>
+      </p:pic>
+    </p:spTree>
+  </p:cSld>
+  <p:clrMapOvr>
+    <a:masterClrMapping/>
+  </p:clrMapOvr>
+</p:sld>
+</file>
+
+<file path=ppt/slides/slide32.xml><?xml version="1.0" encoding="utf-8"?>
+<p:sld xmlns:a="http://schemas.openxmlformats.org/drawingml/2006/main" xmlns:r="http://schemas.openxmlformats.org/officeDocument/2006/relationships" xmlns:p="http://schemas.openxmlformats.org/presentationml/2006/main">
+  <p:cSld>
+    <p:spTree>
+      <p:nvGrpSpPr>
+        <p:cNvPr id="1" name=""/>
+        <p:cNvGrpSpPr/>
+        <p:nvPr/>
+      </p:nvGrpSpPr>
+      <p:grpSpPr>
+        <a:xfrm>
+          <a:off x="0" y="0"/>
+          <a:ext cx="0" cy="0"/>
+          <a:chOff x="0" y="0"/>
+          <a:chExt cx="0" cy="0"/>
+        </a:xfrm>
+      </p:grpSpPr>
+      <p:sp>
+        <p:nvSpPr>
+          <p:cNvPr id="2" name="Title 1"/>
+          <p:cNvSpPr>
+            <a:spLocks noGrp="1"/>
+          </p:cNvSpPr>
+          <p:nvPr>
+            <p:ph type="title"/>
+          </p:nvPr>
+        </p:nvSpPr>
+        <p:spPr/>
+        <p:txBody>
+          <a:bodyPr>
+            <a:normAutofit fontScale="90000"/>
+          </a:bodyPr>
+          <a:lstStyle/>
+          <a:p>
+            <a:r>
+              <a:rPr lang="en-CA" dirty="0" smtClean="0"/>
+              <a:t>Detection Performance</a:t>
+            </a:r>
+            <a:r>
+              <a:rPr lang="en-CA" dirty="0" smtClean="0"/>
+              <a:t> :</a:t>
+            </a:r>
+            <a:br>
+              <a:rPr lang="en-CA" dirty="0" smtClean="0"/>
+            </a:br>
+            <a:r>
+              <a:rPr lang="en-CA" dirty="0" err="1" smtClean="0"/>
+              <a:t>Paxson</a:t>
+            </a:r>
+            <a:r>
+              <a:rPr lang="en-CA" dirty="0" smtClean="0"/>
+              <a:t> Method</a:t>
+            </a:r>
+            <a:endParaRPr lang="en-US" dirty="0"/>
+          </a:p>
+        </p:txBody>
+      </p:sp>
+      <p:pic>
+        <p:nvPicPr>
+          <p:cNvPr id="4" name="Content Placeholder 3" descr="cnplot.eps"/>
+          <p:cNvPicPr>
+            <a:picLocks noGrp="1" noChangeAspect="1"/>
+          </p:cNvPicPr>
+          <p:nvPr>
+            <p:ph idx="1"/>
+          </p:nvPr>
+        </p:nvPicPr>
+        <p:blipFill>
+          <a:blip r:embed="rId2" cstate="print"/>
+          <a:stretch>
+            <a:fillRect/>
+          </a:stretch>
+        </p:blipFill>
+        <p:spPr>
+          <a:xfrm>
+            <a:off x="0" y="1412776"/>
+            <a:ext cx="9144000" cy="4748732"/>
+          </a:xfrm>
+        </p:spPr>
+      </p:pic>
+    </p:spTree>
+  </p:cSld>
+  <p:clrMapOvr>
+    <a:masterClrMapping/>
+  </p:clrMapOvr>
+</p:sld>
+</file>
+
+<file path=ppt/slides/slide33.xml><?xml version="1.0" encoding="utf-8"?>
+<p:sld xmlns:a="http://schemas.openxmlformats.org/drawingml/2006/main" xmlns:r="http://schemas.openxmlformats.org/officeDocument/2006/relationships" xmlns:p="http://schemas.openxmlformats.org/presentationml/2006/main">
+  <p:cSld>
+    <p:spTree>
+      <p:nvGrpSpPr>
+        <p:cNvPr id="1" name=""/>
+        <p:cNvGrpSpPr/>
+        <p:nvPr/>
+      </p:nvGrpSpPr>
+      <p:grpSpPr>
+        <a:xfrm>
+          <a:off x="0" y="0"/>
+          <a:ext cx="0" cy="0"/>
+          <a:chOff x="0" y="0"/>
+          <a:chExt cx="0" cy="0"/>
+        </a:xfrm>
+      </p:grpSpPr>
+      <p:sp>
+        <p:nvSpPr>
+          <p:cNvPr id="2" name="Title 1"/>
+          <p:cNvSpPr>
+            <a:spLocks noGrp="1"/>
+          </p:cNvSpPr>
+          <p:nvPr>
+            <p:ph type="title"/>
+          </p:nvPr>
+        </p:nvSpPr>
+        <p:spPr/>
+        <p:txBody>
+          <a:bodyPr>
+            <a:normAutofit fontScale="90000"/>
+          </a:bodyPr>
+          <a:lstStyle/>
+          <a:p>
+            <a:r>
+              <a:rPr lang="en-CA" dirty="0" smtClean="0"/>
+              <a:t>Detection Performance</a:t>
+            </a:r>
+            <a:r>
+              <a:rPr lang="en-CA" dirty="0" smtClean="0"/>
+              <a:t> :</a:t>
+            </a:r>
+            <a:br>
+              <a:rPr lang="en-CA" dirty="0" smtClean="0"/>
+            </a:br>
+            <a:r>
+              <a:rPr lang="en-CA" dirty="0" err="1" smtClean="0"/>
+              <a:t>Paxson</a:t>
+            </a:r>
+            <a:r>
+              <a:rPr lang="en-CA" dirty="0" smtClean="0"/>
+              <a:t> Method</a:t>
+            </a:r>
+            <a:endParaRPr lang="en-US" dirty="0"/>
+          </a:p>
+        </p:txBody>
+      </p:sp>
+      <p:pic>
+        <p:nvPicPr>
+          <p:cNvPr id="4" name="Content Placeholder 3" descr="cnplot.eps"/>
+          <p:cNvPicPr>
+            <a:picLocks noGrp="1" noChangeAspect="1"/>
+          </p:cNvPicPr>
+          <p:nvPr>
+            <p:ph idx="1"/>
+          </p:nvPr>
+        </p:nvPicPr>
+        <p:blipFill>
+          <a:blip r:embed="rId2" cstate="print"/>
+          <a:stretch>
+            <a:fillRect/>
+          </a:stretch>
+        </p:blipFill>
+        <p:spPr>
+          <a:xfrm>
+            <a:off x="0" y="1412776"/>
+            <a:ext cx="9143999" cy="5056094"/>
+          </a:xfrm>
+        </p:spPr>
+      </p:pic>
+    </p:spTree>
+  </p:cSld>
+  <p:clrMapOvr>
+    <a:masterClrMapping/>
+  </p:clrMapOvr>
+</p:sld>
+</file>
+
+<file path=ppt/slides/slide34.xml><?xml version="1.0" encoding="utf-8"?>
+<p:sld xmlns:a="http://schemas.openxmlformats.org/drawingml/2006/main" xmlns:r="http://schemas.openxmlformats.org/officeDocument/2006/relationships" xmlns:p="http://schemas.openxmlformats.org/presentationml/2006/main">
+  <p:cSld>
+    <p:spTree>
+      <p:nvGrpSpPr>
+        <p:cNvPr id="1" name=""/>
+        <p:cNvGrpSpPr/>
+        <p:nvPr/>
+      </p:nvGrpSpPr>
+      <p:grpSpPr>
+        <a:xfrm>
+          <a:off x="0" y="0"/>
+          <a:ext cx="0" cy="0"/>
+          <a:chOff x="0" y="0"/>
+          <a:chExt cx="0" cy="0"/>
+        </a:xfrm>
+      </p:grpSpPr>
+      <p:sp>
+        <p:nvSpPr>
+          <p:cNvPr id="2" name="Title 1"/>
+          <p:cNvSpPr>
+            <a:spLocks noGrp="1"/>
+          </p:cNvSpPr>
+          <p:nvPr>
+            <p:ph type="title"/>
+          </p:nvPr>
+        </p:nvSpPr>
+        <p:spPr/>
+        <p:txBody>
+          <a:bodyPr>
+            <a:normAutofit fontScale="90000"/>
+          </a:bodyPr>
+          <a:lstStyle/>
+          <a:p>
+            <a:r>
+              <a:rPr lang="en-CA" dirty="0" smtClean="0"/>
+              <a:t>Detection Performance</a:t>
+            </a:r>
+            <a:r>
+              <a:rPr lang="en-CA" dirty="0" smtClean="0"/>
+              <a:t> :</a:t>
+            </a:r>
+            <a:br>
+              <a:rPr lang="en-CA" dirty="0" smtClean="0"/>
+            </a:br>
+            <a:r>
+              <a:rPr lang="en-CA" dirty="0" err="1" smtClean="0"/>
+              <a:t>Paxson</a:t>
+            </a:r>
+            <a:r>
+              <a:rPr lang="en-CA" dirty="0" smtClean="0"/>
+              <a:t> Method</a:t>
+            </a:r>
+            <a:endParaRPr lang="en-US" dirty="0"/>
+          </a:p>
+        </p:txBody>
+      </p:sp>
+      <p:pic>
+        <p:nvPicPr>
+          <p:cNvPr id="4" name="Content Placeholder 3" descr="cnplot.eps"/>
+          <p:cNvPicPr>
+            <a:picLocks noGrp="1" noChangeAspect="1"/>
+          </p:cNvPicPr>
+          <p:nvPr>
+            <p:ph idx="1"/>
+          </p:nvPr>
+        </p:nvPicPr>
+        <p:blipFill>
+          <a:blip r:embed="rId2" cstate="print"/>
+          <a:stretch>
+            <a:fillRect/>
+          </a:stretch>
+        </p:blipFill>
+        <p:spPr>
+          <a:xfrm>
+            <a:off x="0" y="1412776"/>
+            <a:ext cx="9143999" cy="5056093"/>
+          </a:xfrm>
+        </p:spPr>
+      </p:pic>
+    </p:spTree>
+  </p:cSld>
+  <p:clrMapOvr>
+    <a:masterClrMapping/>
+  </p:clrMapOvr>
+</p:sld>
+</file>
+
+<file path=ppt/slides/slide35.xml><?xml version="1.0" encoding="utf-8"?>
+<p:sld xmlns:a="http://schemas.openxmlformats.org/drawingml/2006/main" xmlns:r="http://schemas.openxmlformats.org/officeDocument/2006/relationships" xmlns:p="http://schemas.openxmlformats.org/presentationml/2006/main">
+  <p:cSld>
+    <p:spTree>
+      <p:nvGrpSpPr>
+        <p:cNvPr id="1" name=""/>
+        <p:cNvGrpSpPr/>
+        <p:nvPr/>
+      </p:nvGrpSpPr>
+      <p:grpSpPr>
+        <a:xfrm>
+          <a:off x="0" y="0"/>
+          <a:ext cx="0" cy="0"/>
+          <a:chOff x="0" y="0"/>
+          <a:chExt cx="0" cy="0"/>
+        </a:xfrm>
+      </p:grpSpPr>
+      <p:sp>
+        <p:nvSpPr>
+          <p:cNvPr id="2" name="Title 1"/>
+          <p:cNvSpPr>
+            <a:spLocks noGrp="1"/>
+          </p:cNvSpPr>
+          <p:nvPr>
+            <p:ph type="title"/>
+          </p:nvPr>
+        </p:nvSpPr>
+        <p:spPr/>
+        <p:txBody>
+          <a:bodyPr>
+            <a:normAutofit fontScale="90000"/>
+          </a:bodyPr>
+          <a:lstStyle/>
+          <a:p>
+            <a:r>
+              <a:rPr lang="en-CA" dirty="0" smtClean="0"/>
+              <a:t>Detection Performance</a:t>
+            </a:r>
+            <a:r>
+              <a:rPr lang="en-CA" dirty="0" smtClean="0"/>
+              <a:t> :</a:t>
+            </a:r>
+            <a:br>
+              <a:rPr lang="en-CA" dirty="0" smtClean="0"/>
+            </a:br>
+            <a:r>
+              <a:rPr lang="en-CA" dirty="0" smtClean="0"/>
+              <a:t>Proposed Method</a:t>
+            </a:r>
+            <a:endParaRPr lang="en-US" dirty="0"/>
+          </a:p>
+        </p:txBody>
+      </p:sp>
+      <p:pic>
+        <p:nvPicPr>
+          <p:cNvPr id="4" name="Content Placeholder 3" descr="cnplot.eps"/>
+          <p:cNvPicPr>
+            <a:picLocks noGrp="1" noChangeAspect="1"/>
+          </p:cNvPicPr>
+          <p:nvPr>
+            <p:ph idx="1"/>
+          </p:nvPr>
+        </p:nvPicPr>
+        <p:blipFill>
+          <a:blip r:embed="rId2" cstate="print"/>
+          <a:stretch>
+            <a:fillRect/>
+          </a:stretch>
+        </p:blipFill>
+        <p:spPr>
+          <a:xfrm>
+            <a:off x="29402" y="1412776"/>
+            <a:ext cx="9085196" cy="4748733"/>
+          </a:xfrm>
+        </p:spPr>
+      </p:pic>
+    </p:spTree>
+  </p:cSld>
+  <p:clrMapOvr>
+    <a:masterClrMapping/>
+  </p:clrMapOvr>
+</p:sld>
+</file>
+
+<file path=ppt/slides/slide36.xml><?xml version="1.0" encoding="utf-8"?>
+<p:sld xmlns:a="http://schemas.openxmlformats.org/drawingml/2006/main" xmlns:r="http://schemas.openxmlformats.org/officeDocument/2006/relationships" xmlns:p="http://schemas.openxmlformats.org/presentationml/2006/main">
+  <p:cSld>
+    <p:spTree>
+      <p:nvGrpSpPr>
+        <p:cNvPr id="1" name=""/>
+        <p:cNvGrpSpPr/>
+        <p:nvPr/>
+      </p:nvGrpSpPr>
+      <p:grpSpPr>
+        <a:xfrm>
+          <a:off x="0" y="0"/>
+          <a:ext cx="0" cy="0"/>
+          <a:chOff x="0" y="0"/>
+          <a:chExt cx="0" cy="0"/>
+        </a:xfrm>
+      </p:grpSpPr>
+      <p:sp>
+        <p:nvSpPr>
+          <p:cNvPr id="2" name="Title 1"/>
+          <p:cNvSpPr>
+            <a:spLocks noGrp="1"/>
+          </p:cNvSpPr>
+          <p:nvPr>
+            <p:ph type="title"/>
+          </p:nvPr>
+        </p:nvSpPr>
+        <p:spPr/>
+        <p:txBody>
+          <a:bodyPr>
+            <a:normAutofit fontScale="90000"/>
+          </a:bodyPr>
+          <a:lstStyle/>
+          <a:p>
+            <a:r>
+              <a:rPr lang="en-CA" dirty="0" smtClean="0"/>
+              <a:t>Detection Performance</a:t>
+            </a:r>
+            <a:r>
+              <a:rPr lang="en-CA" dirty="0" smtClean="0"/>
+              <a:t> :</a:t>
+            </a:r>
+            <a:br>
+              <a:rPr lang="en-CA" dirty="0" smtClean="0"/>
+            </a:br>
+            <a:r>
+              <a:rPr lang="en-CA" dirty="0" err="1" smtClean="0"/>
+              <a:t>ProposedMethod</a:t>
+            </a:r>
+            <a:endParaRPr lang="en-US" dirty="0"/>
+          </a:p>
+        </p:txBody>
+      </p:sp>
+      <p:pic>
+        <p:nvPicPr>
+          <p:cNvPr id="4" name="Content Placeholder 3" descr="cnplot.eps"/>
+          <p:cNvPicPr>
+            <a:picLocks noGrp="1" noChangeAspect="1"/>
+          </p:cNvPicPr>
+          <p:nvPr>
+            <p:ph idx="1"/>
+          </p:nvPr>
+        </p:nvPicPr>
+        <p:blipFill>
+          <a:blip r:embed="rId2" cstate="print"/>
+          <a:stretch>
+            <a:fillRect/>
+          </a:stretch>
+        </p:blipFill>
+        <p:spPr>
+          <a:xfrm>
+            <a:off x="0" y="1412776"/>
+            <a:ext cx="9143999" cy="5056094"/>
+          </a:xfrm>
+        </p:spPr>
+      </p:pic>
+    </p:spTree>
+  </p:cSld>
+  <p:clrMapOvr>
+    <a:masterClrMapping/>
+  </p:clrMapOvr>
+</p:sld>
+</file>
+
+<file path=ppt/slides/slide37.xml><?xml version="1.0" encoding="utf-8"?>
+<p:sld xmlns:a="http://schemas.openxmlformats.org/drawingml/2006/main" xmlns:r="http://schemas.openxmlformats.org/officeDocument/2006/relationships" xmlns:p="http://schemas.openxmlformats.org/presentationml/2006/main">
+  <p:cSld>
+    <p:spTree>
+      <p:nvGrpSpPr>
+        <p:cNvPr id="1" name=""/>
+        <p:cNvGrpSpPr/>
+        <p:nvPr/>
+      </p:nvGrpSpPr>
+      <p:grpSpPr>
+        <a:xfrm>
+          <a:off x="0" y="0"/>
+          <a:ext cx="0" cy="0"/>
+          <a:chOff x="0" y="0"/>
+          <a:chExt cx="0" cy="0"/>
+        </a:xfrm>
+      </p:grpSpPr>
+      <p:sp>
+        <p:nvSpPr>
+          <p:cNvPr id="2" name="Title 1"/>
+          <p:cNvSpPr>
+            <a:spLocks noGrp="1"/>
+          </p:cNvSpPr>
+          <p:nvPr>
+            <p:ph type="title"/>
+          </p:nvPr>
+        </p:nvSpPr>
+        <p:spPr/>
+        <p:txBody>
+          <a:bodyPr>
+            <a:normAutofit fontScale="90000"/>
+          </a:bodyPr>
+          <a:lstStyle/>
+          <a:p>
+            <a:r>
+              <a:rPr lang="en-CA" dirty="0" smtClean="0"/>
+              <a:t>Detection Performance</a:t>
+            </a:r>
+            <a:r>
+              <a:rPr lang="en-CA" dirty="0" smtClean="0"/>
+              <a:t> :</a:t>
+            </a:r>
+            <a:br>
+              <a:rPr lang="en-CA" dirty="0" smtClean="0"/>
+            </a:br>
+            <a:r>
+              <a:rPr lang="en-CA" dirty="0" smtClean="0"/>
+              <a:t>Proposed Method</a:t>
+            </a:r>
+            <a:endParaRPr lang="en-US" dirty="0"/>
+          </a:p>
+        </p:txBody>
+      </p:sp>
+      <p:pic>
+        <p:nvPicPr>
+          <p:cNvPr id="4" name="Content Placeholder 3" descr="cnplot.eps"/>
+          <p:cNvPicPr>
+            <a:picLocks noGrp="1" noChangeAspect="1"/>
+          </p:cNvPicPr>
+          <p:nvPr>
+            <p:ph idx="1"/>
+          </p:nvPr>
+        </p:nvPicPr>
+        <p:blipFill>
+          <a:blip r:embed="rId2" cstate="print"/>
+          <a:stretch>
+            <a:fillRect/>
+          </a:stretch>
+        </p:blipFill>
+        <p:spPr>
+          <a:xfrm>
+            <a:off x="0" y="1412776"/>
+            <a:ext cx="9143999" cy="5056094"/>
+          </a:xfrm>
+        </p:spPr>
+      </p:pic>
+    </p:spTree>
+  </p:cSld>
+  <p:clrMapOvr>
+    <a:masterClrMapping/>
+  </p:clrMapOvr>
+</p:sld>
+</file>
+
+<file path=ppt/slides/slide38.xml><?xml version="1.0" encoding="utf-8"?>
+<p:sld xmlns:a="http://schemas.openxmlformats.org/drawingml/2006/main" xmlns:r="http://schemas.openxmlformats.org/officeDocument/2006/relationships" xmlns:p="http://schemas.openxmlformats.org/presentationml/2006/main">
+  <p:cSld>
+    <p:spTree>
+      <p:nvGrpSpPr>
+        <p:cNvPr id="1" name=""/>
+        <p:cNvGrpSpPr/>
+        <p:nvPr/>
+      </p:nvGrpSpPr>
+      <p:grpSpPr>
+        <a:xfrm>
+          <a:off x="0" y="0"/>
+          <a:ext cx="0" cy="0"/>
+          <a:chOff x="0" y="0"/>
+          <a:chExt cx="0" cy="0"/>
+        </a:xfrm>
+      </p:grpSpPr>
+      <p:sp>
+        <p:nvSpPr>
+          <p:cNvPr id="2" name="Title 1"/>
+          <p:cNvSpPr>
+            <a:spLocks noGrp="1"/>
+          </p:cNvSpPr>
+          <p:nvPr>
+            <p:ph type="title"/>
+          </p:nvPr>
+        </p:nvSpPr>
+        <p:spPr/>
+        <p:txBody>
+          <a:bodyPr>
+            <a:normAutofit fontScale="90000"/>
+          </a:bodyPr>
+          <a:lstStyle/>
+          <a:p>
+            <a:r>
+              <a:rPr lang="en-CA" dirty="0" smtClean="0"/>
+              <a:t>Detection Performance:</a:t>
+            </a:r>
+            <a:br>
+              <a:rPr lang="en-CA" dirty="0" smtClean="0"/>
+            </a:br>
+            <a:r>
+              <a:rPr lang="en-CA" dirty="0" smtClean="0"/>
+              <a:t>Comparison of False Positive Rates</a:t>
+            </a:r>
+            <a:endParaRPr lang="en-US" dirty="0"/>
+          </a:p>
+        </p:txBody>
+      </p:sp>
+      <p:pic>
+        <p:nvPicPr>
+          <p:cNvPr id="4" name="Content Placeholder 3" descr="cplot2.eps"/>
+          <p:cNvPicPr>
+            <a:picLocks noGrp="1" noChangeAspect="1"/>
+          </p:cNvPicPr>
+          <p:nvPr>
+            <p:ph idx="1"/>
+          </p:nvPr>
+        </p:nvPicPr>
+        <p:blipFill>
+          <a:blip r:embed="rId2" cstate="print"/>
+          <a:stretch>
+            <a:fillRect/>
+          </a:stretch>
+        </p:blipFill>
+        <p:spPr>
+          <a:xfrm>
+            <a:off x="0" y="1571139"/>
+            <a:ext cx="9144000" cy="5047746"/>
+          </a:xfrm>
+        </p:spPr>
+      </p:pic>
+    </p:spTree>
+  </p:cSld>
+  <p:clrMapOvr>
+    <a:masterClrMapping/>
+  </p:clrMapOvr>
+</p:sld>
+</file>
+
+<file path=ppt/slides/slide39.xml><?xml version="1.0" encoding="utf-8"?>
+<p:sld xmlns:a="http://schemas.openxmlformats.org/drawingml/2006/main" xmlns:r="http://schemas.openxmlformats.org/officeDocument/2006/relationships" xmlns:p="http://schemas.openxmlformats.org/presentationml/2006/main">
+  <p:cSld>
+    <p:spTree>
+      <p:nvGrpSpPr>
+        <p:cNvPr id="1" name=""/>
+        <p:cNvGrpSpPr/>
+        <p:nvPr/>
+      </p:nvGrpSpPr>
+      <p:grpSpPr>
+        <a:xfrm>
+          <a:off x="0" y="0"/>
+          <a:ext cx="0" cy="0"/>
+          <a:chOff x="0" y="0"/>
+          <a:chExt cx="0" cy="0"/>
+        </a:xfrm>
+      </p:grpSpPr>
+      <p:sp>
+        <p:nvSpPr>
+          <p:cNvPr id="2" name="Title 1"/>
+          <p:cNvSpPr>
+            <a:spLocks noGrp="1"/>
+          </p:cNvSpPr>
+          <p:nvPr>
+            <p:ph type="title"/>
+          </p:nvPr>
+        </p:nvSpPr>
+        <p:spPr/>
+        <p:txBody>
+          <a:bodyPr>
+            <a:normAutofit fontScale="90000"/>
+          </a:bodyPr>
+          <a:lstStyle/>
+          <a:p>
+            <a:r>
+              <a:rPr lang="en-CA" dirty="0" smtClean="0"/>
+              <a:t>Detection Performance:</a:t>
+            </a:r>
+            <a:br>
+              <a:rPr lang="en-CA" dirty="0" smtClean="0"/>
+            </a:br>
+            <a:r>
+              <a:rPr lang="en-CA" dirty="0" smtClean="0"/>
+              <a:t>Comparison of False Positive Rates</a:t>
+            </a:r>
+            <a:endParaRPr lang="en-US" dirty="0"/>
+          </a:p>
+        </p:txBody>
+      </p:sp>
+      <p:pic>
+        <p:nvPicPr>
+          <p:cNvPr id="4" name="Content Placeholder 3" descr="cplot2.eps"/>
+          <p:cNvPicPr>
+            <a:picLocks noGrp="1" noChangeAspect="1"/>
+          </p:cNvPicPr>
+          <p:nvPr>
+            <p:ph idx="1"/>
+          </p:nvPr>
+        </p:nvPicPr>
+        <p:blipFill>
+          <a:blip r:embed="rId2" cstate="print"/>
+          <a:stretch>
+            <a:fillRect/>
+          </a:stretch>
+        </p:blipFill>
+        <p:spPr>
+          <a:xfrm>
+            <a:off x="0" y="1556792"/>
+            <a:ext cx="9143999" cy="5076441"/>
+          </a:xfrm>
+        </p:spPr>
+      </p:pic>
     </p:spTree>
   </p:cSld>
   <p:clrMapOvr>
@@ -4460,6 +6352,511 @@
 </p:sld>
 </file>
 
+<file path=ppt/slides/slide40.xml><?xml version="1.0" encoding="utf-8"?>
+<p:sld xmlns:a="http://schemas.openxmlformats.org/drawingml/2006/main" xmlns:r="http://schemas.openxmlformats.org/officeDocument/2006/relationships" xmlns:p="http://schemas.openxmlformats.org/presentationml/2006/main">
+  <p:cSld>
+    <p:spTree>
+      <p:nvGrpSpPr>
+        <p:cNvPr id="1" name=""/>
+        <p:cNvGrpSpPr/>
+        <p:nvPr/>
+      </p:nvGrpSpPr>
+      <p:grpSpPr>
+        <a:xfrm>
+          <a:off x="0" y="0"/>
+          <a:ext cx="0" cy="0"/>
+          <a:chOff x="0" y="0"/>
+          <a:chExt cx="0" cy="0"/>
+        </a:xfrm>
+      </p:grpSpPr>
+      <p:sp>
+        <p:nvSpPr>
+          <p:cNvPr id="2" name="Title 1"/>
+          <p:cNvSpPr>
+            <a:spLocks noGrp="1"/>
+          </p:cNvSpPr>
+          <p:nvPr>
+            <p:ph type="title"/>
+          </p:nvPr>
+        </p:nvSpPr>
+        <p:spPr/>
+        <p:txBody>
+          <a:bodyPr>
+            <a:normAutofit fontScale="90000"/>
+          </a:bodyPr>
+          <a:lstStyle/>
+          <a:p>
+            <a:r>
+              <a:rPr lang="en-CA" dirty="0" smtClean="0"/>
+              <a:t>Detection Performance:</a:t>
+            </a:r>
+            <a:br>
+              <a:rPr lang="en-CA" dirty="0" smtClean="0"/>
+            </a:br>
+            <a:r>
+              <a:rPr lang="en-CA" dirty="0" smtClean="0"/>
+              <a:t>Comparison of False Positive Rates</a:t>
+            </a:r>
+            <a:endParaRPr lang="en-US" dirty="0"/>
+          </a:p>
+        </p:txBody>
+      </p:sp>
+      <p:pic>
+        <p:nvPicPr>
+          <p:cNvPr id="4" name="Content Placeholder 3" descr="cplot2.eps"/>
+          <p:cNvPicPr>
+            <a:picLocks noGrp="1" noChangeAspect="1"/>
+          </p:cNvPicPr>
+          <p:nvPr>
+            <p:ph idx="1"/>
+          </p:nvPr>
+        </p:nvPicPr>
+        <p:blipFill>
+          <a:blip r:embed="rId2" cstate="print"/>
+          <a:stretch>
+            <a:fillRect/>
+          </a:stretch>
+        </p:blipFill>
+        <p:spPr>
+          <a:xfrm>
+            <a:off x="0" y="1556792"/>
+            <a:ext cx="9143999" cy="5076441"/>
+          </a:xfrm>
+        </p:spPr>
+      </p:pic>
+    </p:spTree>
+  </p:cSld>
+  <p:clrMapOvr>
+    <a:masterClrMapping/>
+  </p:clrMapOvr>
+</p:sld>
+</file>
+
+<file path=ppt/slides/slide41.xml><?xml version="1.0" encoding="utf-8"?>
+<p:sld xmlns:a="http://schemas.openxmlformats.org/drawingml/2006/main" xmlns:r="http://schemas.openxmlformats.org/officeDocument/2006/relationships" xmlns:p="http://schemas.openxmlformats.org/presentationml/2006/main">
+  <p:cSld>
+    <p:spTree>
+      <p:nvGrpSpPr>
+        <p:cNvPr id="1" name=""/>
+        <p:cNvGrpSpPr/>
+        <p:nvPr/>
+      </p:nvGrpSpPr>
+      <p:grpSpPr>
+        <a:xfrm>
+          <a:off x="0" y="0"/>
+          <a:ext cx="0" cy="0"/>
+          <a:chOff x="0" y="0"/>
+          <a:chExt cx="0" cy="0"/>
+        </a:xfrm>
+      </p:grpSpPr>
+      <p:sp>
+        <p:nvSpPr>
+          <p:cNvPr id="2" name="Title 1"/>
+          <p:cNvSpPr>
+            <a:spLocks noGrp="1"/>
+          </p:cNvSpPr>
+          <p:nvPr>
+            <p:ph type="title"/>
+          </p:nvPr>
+        </p:nvSpPr>
+        <p:spPr/>
+        <p:txBody>
+          <a:bodyPr>
+            <a:normAutofit fontScale="90000"/>
+          </a:bodyPr>
+          <a:lstStyle/>
+          <a:p>
+            <a:r>
+              <a:rPr lang="en-CA" dirty="0" smtClean="0"/>
+              <a:t>Detection Performance:</a:t>
+            </a:r>
+            <a:br>
+              <a:rPr lang="en-CA" dirty="0" smtClean="0"/>
+            </a:br>
+            <a:r>
+              <a:rPr lang="en-CA" dirty="0" smtClean="0"/>
+              <a:t>Conclusions</a:t>
+            </a:r>
+            <a:endParaRPr lang="en-US" dirty="0"/>
+          </a:p>
+        </p:txBody>
+      </p:sp>
+      <p:sp>
+        <p:nvSpPr>
+          <p:cNvPr id="3" name="Content Placeholder 2"/>
+          <p:cNvSpPr>
+            <a:spLocks noGrp="1"/>
+          </p:cNvSpPr>
+          <p:nvPr>
+            <p:ph idx="1"/>
+          </p:nvPr>
+        </p:nvSpPr>
+        <p:spPr/>
+        <p:txBody>
+          <a:bodyPr/>
+          <a:lstStyle/>
+          <a:p>
+            <a:r>
+              <a:rPr lang="en-CA" dirty="0" smtClean="0"/>
+              <a:t>The proposed approach achieves categorically lower false positive rates than all other approaches.</a:t>
+            </a:r>
+          </a:p>
+          <a:p>
+            <a:endParaRPr lang="en-CA" dirty="0"/>
+          </a:p>
+          <a:p>
+            <a:r>
+              <a:rPr lang="en-CA" dirty="0" smtClean="0"/>
+              <a:t>The prototype next-gen tunnel is the most difficult tunnel to detect by far.</a:t>
+            </a:r>
+          </a:p>
+          <a:p>
+            <a:pPr lvl="1"/>
+            <a:r>
+              <a:rPr lang="en-CA" dirty="0" err="1" smtClean="0"/>
+              <a:t>Born’s</a:t>
+            </a:r>
+            <a:r>
+              <a:rPr lang="en-CA" dirty="0" smtClean="0"/>
+              <a:t> approach has a false-positive rate little better than random chance.</a:t>
+            </a:r>
+            <a:endParaRPr lang="en-US" dirty="0"/>
+          </a:p>
+        </p:txBody>
+      </p:sp>
+    </p:spTree>
+  </p:cSld>
+  <p:clrMapOvr>
+    <a:masterClrMapping/>
+  </p:clrMapOvr>
+</p:sld>
+</file>
+
+<file path=ppt/slides/slide42.xml><?xml version="1.0" encoding="utf-8"?>
+<p:sld xmlns:a="http://schemas.openxmlformats.org/drawingml/2006/main" xmlns:r="http://schemas.openxmlformats.org/officeDocument/2006/relationships" xmlns:p="http://schemas.openxmlformats.org/presentationml/2006/main">
+  <p:cSld>
+    <p:spTree>
+      <p:nvGrpSpPr>
+        <p:cNvPr id="1" name=""/>
+        <p:cNvGrpSpPr/>
+        <p:nvPr/>
+      </p:nvGrpSpPr>
+      <p:grpSpPr>
+        <a:xfrm>
+          <a:off x="0" y="0"/>
+          <a:ext cx="0" cy="0"/>
+          <a:chOff x="0" y="0"/>
+          <a:chExt cx="0" cy="0"/>
+        </a:xfrm>
+      </p:grpSpPr>
+      <p:sp>
+        <p:nvSpPr>
+          <p:cNvPr id="2" name="Title 1"/>
+          <p:cNvSpPr>
+            <a:spLocks noGrp="1"/>
+          </p:cNvSpPr>
+          <p:nvPr>
+            <p:ph type="title"/>
+          </p:nvPr>
+        </p:nvSpPr>
+        <p:spPr/>
+        <p:txBody>
+          <a:bodyPr/>
+          <a:lstStyle/>
+          <a:p>
+            <a:r>
+              <a:rPr lang="en-CA" dirty="0" smtClean="0"/>
+              <a:t>Conclusions</a:t>
+            </a:r>
+            <a:endParaRPr lang="en-US" dirty="0"/>
+          </a:p>
+        </p:txBody>
+      </p:sp>
+      <p:sp>
+        <p:nvSpPr>
+          <p:cNvPr id="3" name="Content Placeholder 2"/>
+          <p:cNvSpPr>
+            <a:spLocks noGrp="1"/>
+          </p:cNvSpPr>
+          <p:nvPr>
+            <p:ph idx="1"/>
+          </p:nvPr>
+        </p:nvSpPr>
+        <p:spPr/>
+        <p:txBody>
+          <a:bodyPr/>
+          <a:lstStyle/>
+          <a:p>
+            <a:r>
+              <a:rPr lang="en-CA" dirty="0" smtClean="0"/>
+              <a:t>Proposed method:</a:t>
+            </a:r>
+          </a:p>
+          <a:p>
+            <a:pPr lvl="1"/>
+            <a:r>
+              <a:rPr lang="en-CA" dirty="0" smtClean="0"/>
+              <a:t>Achieves the best detection performance, and nearly the best processing performance.</a:t>
+            </a:r>
+          </a:p>
+          <a:p>
+            <a:pPr lvl="1"/>
+            <a:r>
+              <a:rPr lang="en-CA" dirty="0" smtClean="0"/>
+              <a:t>Represents a notable and novel contribution to the field.</a:t>
+            </a:r>
+          </a:p>
+          <a:p>
+            <a:pPr lvl="1"/>
+            <a:r>
+              <a:rPr lang="en-CA" dirty="0" smtClean="0"/>
+              <a:t>Is already implemented in high-performance C/C++, making deployment possible.</a:t>
+            </a:r>
+            <a:endParaRPr lang="en-US" dirty="0"/>
+          </a:p>
+        </p:txBody>
+      </p:sp>
+    </p:spTree>
+  </p:cSld>
+  <p:clrMapOvr>
+    <a:masterClrMapping/>
+  </p:clrMapOvr>
+</p:sld>
+</file>
+
+<file path=ppt/slides/slide43.xml><?xml version="1.0" encoding="utf-8"?>
+<p:sld xmlns:a="http://schemas.openxmlformats.org/drawingml/2006/main" xmlns:r="http://schemas.openxmlformats.org/officeDocument/2006/relationships" xmlns:p="http://schemas.openxmlformats.org/presentationml/2006/main">
+  <p:cSld>
+    <p:spTree>
+      <p:nvGrpSpPr>
+        <p:cNvPr id="1" name=""/>
+        <p:cNvGrpSpPr/>
+        <p:nvPr/>
+      </p:nvGrpSpPr>
+      <p:grpSpPr>
+        <a:xfrm>
+          <a:off x="0" y="0"/>
+          <a:ext cx="0" cy="0"/>
+          <a:chOff x="0" y="0"/>
+          <a:chExt cx="0" cy="0"/>
+        </a:xfrm>
+      </p:grpSpPr>
+      <p:sp>
+        <p:nvSpPr>
+          <p:cNvPr id="2" name="Title 1"/>
+          <p:cNvSpPr>
+            <a:spLocks noGrp="1"/>
+          </p:cNvSpPr>
+          <p:nvPr>
+            <p:ph type="title"/>
+          </p:nvPr>
+        </p:nvSpPr>
+        <p:spPr/>
+        <p:txBody>
+          <a:bodyPr/>
+          <a:lstStyle/>
+          <a:p>
+            <a:r>
+              <a:rPr lang="en-CA" dirty="0" smtClean="0"/>
+              <a:t>Potential Future Work</a:t>
+            </a:r>
+            <a:endParaRPr lang="en-US" dirty="0"/>
+          </a:p>
+        </p:txBody>
+      </p:sp>
+      <p:sp>
+        <p:nvSpPr>
+          <p:cNvPr id="3" name="Content Placeholder 2"/>
+          <p:cNvSpPr>
+            <a:spLocks noGrp="1"/>
+          </p:cNvSpPr>
+          <p:nvPr>
+            <p:ph idx="1"/>
+          </p:nvPr>
+        </p:nvSpPr>
+        <p:spPr/>
+        <p:txBody>
+          <a:bodyPr/>
+          <a:lstStyle/>
+          <a:p>
+            <a:r>
+              <a:rPr lang="en-CA" dirty="0" smtClean="0"/>
+              <a:t>Test on more strictly </a:t>
+            </a:r>
+            <a:r>
+              <a:rPr lang="en-CA" dirty="0" err="1" smtClean="0"/>
+              <a:t>curated</a:t>
+            </a:r>
+            <a:r>
+              <a:rPr lang="en-CA" dirty="0" smtClean="0"/>
+              <a:t> data sets to remove confounding factors.</a:t>
+            </a:r>
+          </a:p>
+          <a:p>
+            <a:r>
+              <a:rPr lang="en-CA" dirty="0" smtClean="0"/>
+              <a:t>Identify ways of improving false positive rate</a:t>
+            </a:r>
+          </a:p>
+          <a:p>
+            <a:pPr lvl="1"/>
+            <a:r>
+              <a:rPr lang="en-CA" dirty="0" smtClean="0"/>
+              <a:t>Potentially with a more tailored metric</a:t>
+            </a:r>
+          </a:p>
+          <a:p>
+            <a:pPr lvl="1"/>
+            <a:r>
+              <a:rPr lang="en-CA" dirty="0" smtClean="0"/>
+              <a:t>Potentially with more temporal knowledge and correlation</a:t>
+            </a:r>
+            <a:endParaRPr lang="en-US" dirty="0"/>
+          </a:p>
+        </p:txBody>
+      </p:sp>
+    </p:spTree>
+  </p:cSld>
+  <p:clrMapOvr>
+    <a:masterClrMapping/>
+  </p:clrMapOvr>
+</p:sld>
+</file>
+
+<file path=ppt/slides/slide44.xml><?xml version="1.0" encoding="utf-8"?>
+<p:sld xmlns:a="http://schemas.openxmlformats.org/drawingml/2006/main" xmlns:r="http://schemas.openxmlformats.org/officeDocument/2006/relationships" xmlns:p="http://schemas.openxmlformats.org/presentationml/2006/main">
+  <p:cSld>
+    <p:spTree>
+      <p:nvGrpSpPr>
+        <p:cNvPr id="1" name=""/>
+        <p:cNvGrpSpPr/>
+        <p:nvPr/>
+      </p:nvGrpSpPr>
+      <p:grpSpPr>
+        <a:xfrm>
+          <a:off x="0" y="0"/>
+          <a:ext cx="0" cy="0"/>
+          <a:chOff x="0" y="0"/>
+          <a:chExt cx="0" cy="0"/>
+        </a:xfrm>
+      </p:grpSpPr>
+      <p:sp>
+        <p:nvSpPr>
+          <p:cNvPr id="2" name="Title 1"/>
+          <p:cNvSpPr>
+            <a:spLocks noGrp="1"/>
+          </p:cNvSpPr>
+          <p:nvPr>
+            <p:ph type="title"/>
+          </p:nvPr>
+        </p:nvSpPr>
+        <p:spPr/>
+        <p:txBody>
+          <a:bodyPr/>
+          <a:lstStyle/>
+          <a:p>
+            <a:r>
+              <a:rPr lang="en-CA" dirty="0" smtClean="0"/>
+              <a:t>Thank you</a:t>
+            </a:r>
+            <a:endParaRPr lang="en-US" dirty="0"/>
+          </a:p>
+        </p:txBody>
+      </p:sp>
+      <p:sp>
+        <p:nvSpPr>
+          <p:cNvPr id="3" name="Content Placeholder 2"/>
+          <p:cNvSpPr>
+            <a:spLocks noGrp="1"/>
+          </p:cNvSpPr>
+          <p:nvPr>
+            <p:ph idx="1"/>
+          </p:nvPr>
+        </p:nvSpPr>
+        <p:spPr/>
+        <p:txBody>
+          <a:bodyPr/>
+          <a:lstStyle/>
+          <a:p>
+            <a:r>
+              <a:rPr lang="en-CA" dirty="0" smtClean="0"/>
+              <a:t>Questions</a:t>
+            </a:r>
+            <a:endParaRPr lang="en-US" dirty="0"/>
+          </a:p>
+        </p:txBody>
+      </p:sp>
+    </p:spTree>
+  </p:cSld>
+  <p:clrMapOvr>
+    <a:masterClrMapping/>
+  </p:clrMapOvr>
+</p:sld>
+</file>
+
+<file path=ppt/slides/slide45.xml><?xml version="1.0" encoding="utf-8"?>
+<p:sld xmlns:a="http://schemas.openxmlformats.org/drawingml/2006/main" xmlns:r="http://schemas.openxmlformats.org/officeDocument/2006/relationships" xmlns:p="http://schemas.openxmlformats.org/presentationml/2006/main">
+  <p:cSld>
+    <p:spTree>
+      <p:nvGrpSpPr>
+        <p:cNvPr id="1" name=""/>
+        <p:cNvGrpSpPr/>
+        <p:nvPr/>
+      </p:nvGrpSpPr>
+      <p:grpSpPr>
+        <a:xfrm>
+          <a:off x="0" y="0"/>
+          <a:ext cx="0" cy="0"/>
+          <a:chOff x="0" y="0"/>
+          <a:chExt cx="0" cy="0"/>
+        </a:xfrm>
+      </p:grpSpPr>
+      <p:sp>
+        <p:nvSpPr>
+          <p:cNvPr id="2" name="Title 1"/>
+          <p:cNvSpPr>
+            <a:spLocks noGrp="1"/>
+          </p:cNvSpPr>
+          <p:nvPr>
+            <p:ph type="title"/>
+          </p:nvPr>
+        </p:nvSpPr>
+        <p:spPr/>
+        <p:txBody>
+          <a:bodyPr/>
+          <a:lstStyle/>
+          <a:p>
+            <a:endParaRPr lang="en-US"/>
+          </a:p>
+        </p:txBody>
+      </p:sp>
+      <p:sp>
+        <p:nvSpPr>
+          <p:cNvPr id="3" name="Content Placeholder 2"/>
+          <p:cNvSpPr>
+            <a:spLocks noGrp="1"/>
+          </p:cNvSpPr>
+          <p:nvPr>
+            <p:ph idx="1"/>
+          </p:nvPr>
+        </p:nvSpPr>
+        <p:spPr/>
+        <p:txBody>
+          <a:bodyPr/>
+          <a:lstStyle/>
+          <a:p>
+            <a:endParaRPr lang="en-US"/>
+          </a:p>
+        </p:txBody>
+      </p:sp>
+    </p:spTree>
+  </p:cSld>
+  <p:clrMapOvr>
+    <a:masterClrMapping/>
+  </p:clrMapOvr>
+</p:sld>
+</file>
+
 <file path=ppt/slides/slide5.xml><?xml version="1.0" encoding="utf-8"?>
 <p:sld xmlns:a="http://schemas.openxmlformats.org/drawingml/2006/main" xmlns:r="http://schemas.openxmlformats.org/officeDocument/2006/relationships" xmlns:p="http://schemas.openxmlformats.org/presentationml/2006/main">
   <p:cSld>
@@ -4788,7 +7185,9 @@
         </p:nvSpPr>
         <p:spPr/>
         <p:txBody>
-          <a:bodyPr/>
+          <a:bodyPr>
+            <a:normAutofit lnSpcReduction="10000"/>
+          </a:bodyPr>
           <a:lstStyle/>
           <a:p>
             <a:r>
@@ -4839,6 +7238,12 @@
             <a:r>
               <a:rPr lang="en-CA" dirty="0" smtClean="0"/>
               <a:t>PSUDP</a:t>
+            </a:r>
+          </a:p>
+          <a:p>
+            <a:r>
+              <a:rPr lang="en-CA" dirty="0" smtClean="0"/>
+              <a:t>A custom implementation was built to simulate a next-generation tunnel</a:t>
             </a:r>
             <a:endParaRPr lang="en-US" dirty="0"/>
           </a:p>
@@ -4888,14 +7293,14 @@
           <a:p>
             <a:r>
               <a:rPr lang="en-CA" dirty="0" smtClean="0"/>
-              <a:t>State of the Art:</a:t>
+              <a:t>Custom DNS Tunnel</a:t>
             </a:r>
             <a:br>
               <a:rPr lang="en-CA" dirty="0" smtClean="0"/>
             </a:br>
             <a:r>
               <a:rPr lang="en-CA" dirty="0" smtClean="0"/>
-              <a:t>DNS Tunnel Detection</a:t>
+              <a:t>Application</a:t>
             </a:r>
             <a:endParaRPr lang="en-US" dirty="0"/>
           </a:p>
@@ -4918,50 +7323,28 @@
           <a:p>
             <a:r>
               <a:rPr lang="en-CA" dirty="0" smtClean="0"/>
-              <a:t>Fall into several categories</a:t>
-            </a:r>
-          </a:p>
-          <a:p>
-            <a:pPr lvl="1"/>
-            <a:r>
-              <a:rPr lang="en-CA" dirty="0" smtClean="0"/>
-              <a:t>Signature based</a:t>
-            </a:r>
-          </a:p>
-          <a:p>
-            <a:pPr lvl="1"/>
-            <a:r>
-              <a:rPr lang="en-CA" dirty="0" smtClean="0"/>
-              <a:t>Domain hash/blacklist</a:t>
-            </a:r>
-          </a:p>
-          <a:p>
-            <a:pPr lvl="1"/>
-            <a:r>
-              <a:rPr lang="en-CA" dirty="0" smtClean="0"/>
-              <a:t>Flow data based</a:t>
-            </a:r>
-          </a:p>
-          <a:p>
-            <a:pPr lvl="1"/>
-            <a:r>
-              <a:rPr lang="en-CA" dirty="0" smtClean="0"/>
-              <a:t>Character frequency analysis on queries</a:t>
-            </a:r>
-          </a:p>
-          <a:p>
-            <a:pPr lvl="1"/>
-            <a:r>
-              <a:rPr lang="en-CA" dirty="0" smtClean="0"/>
-              <a:t>Behaviour of DNS queries on a per-domain basis</a:t>
-            </a:r>
-          </a:p>
-          <a:p>
-            <a:r>
-              <a:rPr lang="en-CA" dirty="0" smtClean="0"/>
-              <a:t>The proposed approach falls into the last category</a:t>
-            </a:r>
-            <a:endParaRPr lang="en-US" dirty="0"/>
+              <a:t>Prototype proof-of-concept implementation</a:t>
+            </a:r>
+          </a:p>
+          <a:p>
+            <a:r>
+              <a:rPr lang="en-CA" dirty="0" smtClean="0"/>
+              <a:t>Implements encoding to match character frequencies to circumvent </a:t>
+            </a:r>
+            <a:r>
+              <a:rPr lang="en-CA" dirty="0" err="1" smtClean="0"/>
+              <a:t>Born’s</a:t>
+            </a:r>
+            <a:r>
+              <a:rPr lang="en-CA" dirty="0" smtClean="0"/>
+              <a:t> approach to detection.</a:t>
+            </a:r>
+          </a:p>
+          <a:p>
+            <a:r>
+              <a:rPr lang="en-CA" dirty="0" smtClean="0"/>
+              <a:t>Limited to client-to-server transfer only</a:t>
+            </a:r>
           </a:p>
         </p:txBody>
       </p:sp>
@@ -5009,14 +7392,14 @@
           <a:p>
             <a:r>
               <a:rPr lang="en-CA" dirty="0" smtClean="0"/>
-              <a:t>Context:</a:t>
+              <a:t>State of the Art:</a:t>
             </a:r>
             <a:br>
               <a:rPr lang="en-CA" dirty="0" smtClean="0"/>
             </a:br>
             <a:r>
               <a:rPr lang="en-CA" dirty="0" smtClean="0"/>
-              <a:t>Goals and Objectives</a:t>
+              <a:t>DNS Tunnel Detection</a:t>
             </a:r>
             <a:endParaRPr lang="en-US" dirty="0"/>
           </a:p>
@@ -5039,7 +7422,48 @@
           <a:p>
             <a:r>
               <a:rPr lang="en-CA" dirty="0" smtClean="0"/>
-              <a:t>Be able to identify DNS tunnels that do not violate DNS RFCs or specifications in near real time with high accuracy.</a:t>
+              <a:t>Fall into several categories</a:t>
+            </a:r>
+          </a:p>
+          <a:p>
+            <a:pPr lvl="1"/>
+            <a:r>
+              <a:rPr lang="en-CA" dirty="0" smtClean="0"/>
+              <a:t>Signature based</a:t>
+            </a:r>
+          </a:p>
+          <a:p>
+            <a:pPr lvl="1"/>
+            <a:r>
+              <a:rPr lang="en-CA" dirty="0" smtClean="0"/>
+              <a:t>Domain hash/blacklist</a:t>
+            </a:r>
+          </a:p>
+          <a:p>
+            <a:pPr lvl="1"/>
+            <a:r>
+              <a:rPr lang="en-CA" dirty="0" smtClean="0"/>
+              <a:t>Flow data based</a:t>
+            </a:r>
+          </a:p>
+          <a:p>
+            <a:pPr lvl="1"/>
+            <a:r>
+              <a:rPr lang="en-CA" dirty="0" smtClean="0"/>
+              <a:t>Character frequency analysis on queries</a:t>
+            </a:r>
+          </a:p>
+          <a:p>
+            <a:pPr lvl="1"/>
+            <a:r>
+              <a:rPr lang="en-CA" dirty="0" smtClean="0"/>
+              <a:t>Behaviour of DNS queries on a per-domain basis</a:t>
+            </a:r>
+          </a:p>
+          <a:p>
+            <a:r>
+              <a:rPr lang="en-CA" dirty="0" smtClean="0"/>
+              <a:t>The proposed approach falls into the last category</a:t>
             </a:r>
             <a:endParaRPr lang="en-US" dirty="0"/>
           </a:p>

</xml_diff>

<commit_message>
Closing out, ready for bed.
</commit_message>
<xml_diff>
--- a/Defense.pptx
+++ b/Defense.pptx
@@ -3091,7 +3091,7 @@
         </p:nvSpPr>
         <p:spPr>
           <a:xfrm>
-            <a:off x="683568" y="1340768"/>
+            <a:off x="685800" y="1340768"/>
             <a:ext cx="7772400" cy="1470025"/>
           </a:xfrm>
         </p:spPr>
@@ -3127,7 +3127,7 @@
         </p:nvSpPr>
         <p:spPr>
           <a:xfrm>
-            <a:off x="1371600" y="2636912"/>
+            <a:off x="1371600" y="3068960"/>
             <a:ext cx="6400800" cy="3168352"/>
           </a:xfrm>
         </p:spPr>

</xml_diff>

<commit_message>
About to start refining it.
</commit_message>
<xml_diff>
--- a/Defense.pptx
+++ b/Defense.pptx
@@ -6,16 +6,16 @@
   </p:sldMasterIdLst>
   <p:sldIdLst>
     <p:sldId id="256" r:id="rId2"/>
-    <p:sldId id="258" r:id="rId3"/>
-    <p:sldId id="259" r:id="rId4"/>
-    <p:sldId id="260" r:id="rId5"/>
-    <p:sldId id="261" r:id="rId6"/>
-    <p:sldId id="262" r:id="rId7"/>
-    <p:sldId id="263" r:id="rId8"/>
-    <p:sldId id="281" r:id="rId9"/>
-    <p:sldId id="264" r:id="rId10"/>
-    <p:sldId id="265" r:id="rId11"/>
-    <p:sldId id="266" r:id="rId12"/>
+    <p:sldId id="305" r:id="rId3"/>
+    <p:sldId id="304" r:id="rId4"/>
+    <p:sldId id="258" r:id="rId5"/>
+    <p:sldId id="259" r:id="rId6"/>
+    <p:sldId id="260" r:id="rId7"/>
+    <p:sldId id="261" r:id="rId8"/>
+    <p:sldId id="262" r:id="rId9"/>
+    <p:sldId id="263" r:id="rId10"/>
+    <p:sldId id="281" r:id="rId11"/>
+    <p:sldId id="264" r:id="rId12"/>
     <p:sldId id="267" r:id="rId13"/>
     <p:sldId id="268" r:id="rId14"/>
     <p:sldId id="269" r:id="rId15"/>
@@ -332,7 +332,8 @@
           <a:p>
             <a:fld id="{AADD84B7-5B7A-47CB-9705-36F80C5381DC}" type="datetimeFigureOut">
               <a:rPr lang="en-US" smtClean="0"/>
-              <a:t>1/27/2014</a:t>
+              <a:pPr/>
+              <a:t>2/2/2014</a:t>
             </a:fld>
             <a:endParaRPr lang="en-US"/>
           </a:p>
@@ -374,6 +375,7 @@
           <a:p>
             <a:fld id="{E14D2599-18BE-47BB-BC2D-666CCD9CE092}" type="slidenum">
               <a:rPr lang="en-US" smtClean="0"/>
+              <a:pPr/>
               <a:t>‹#›</a:t>
             </a:fld>
             <a:endParaRPr lang="en-US"/>
@@ -497,7 +499,8 @@
           <a:p>
             <a:fld id="{AADD84B7-5B7A-47CB-9705-36F80C5381DC}" type="datetimeFigureOut">
               <a:rPr lang="en-US" smtClean="0"/>
-              <a:t>1/27/2014</a:t>
+              <a:pPr/>
+              <a:t>2/2/2014</a:t>
             </a:fld>
             <a:endParaRPr lang="en-US"/>
           </a:p>
@@ -539,6 +542,7 @@
           <a:p>
             <a:fld id="{E14D2599-18BE-47BB-BC2D-666CCD9CE092}" type="slidenum">
               <a:rPr lang="en-US" smtClean="0"/>
+              <a:pPr/>
               <a:t>‹#›</a:t>
             </a:fld>
             <a:endParaRPr lang="en-US"/>
@@ -672,7 +676,8 @@
           <a:p>
             <a:fld id="{AADD84B7-5B7A-47CB-9705-36F80C5381DC}" type="datetimeFigureOut">
               <a:rPr lang="en-US" smtClean="0"/>
-              <a:t>1/27/2014</a:t>
+              <a:pPr/>
+              <a:t>2/2/2014</a:t>
             </a:fld>
             <a:endParaRPr lang="en-US"/>
           </a:p>
@@ -714,6 +719,7 @@
           <a:p>
             <a:fld id="{E14D2599-18BE-47BB-BC2D-666CCD9CE092}" type="slidenum">
               <a:rPr lang="en-US" smtClean="0"/>
+              <a:pPr/>
               <a:t>‹#›</a:t>
             </a:fld>
             <a:endParaRPr lang="en-US"/>
@@ -837,7 +843,8 @@
           <a:p>
             <a:fld id="{AADD84B7-5B7A-47CB-9705-36F80C5381DC}" type="datetimeFigureOut">
               <a:rPr lang="en-US" smtClean="0"/>
-              <a:t>1/27/2014</a:t>
+              <a:pPr/>
+              <a:t>2/2/2014</a:t>
             </a:fld>
             <a:endParaRPr lang="en-US"/>
           </a:p>
@@ -879,6 +886,7 @@
           <a:p>
             <a:fld id="{E14D2599-18BE-47BB-BC2D-666CCD9CE092}" type="slidenum">
               <a:rPr lang="en-US" smtClean="0"/>
+              <a:pPr/>
               <a:t>‹#›</a:t>
             </a:fld>
             <a:endParaRPr lang="en-US"/>
@@ -1078,7 +1086,8 @@
           <a:p>
             <a:fld id="{AADD84B7-5B7A-47CB-9705-36F80C5381DC}" type="datetimeFigureOut">
               <a:rPr lang="en-US" smtClean="0"/>
-              <a:t>1/27/2014</a:t>
+              <a:pPr/>
+              <a:t>2/2/2014</a:t>
             </a:fld>
             <a:endParaRPr lang="en-US"/>
           </a:p>
@@ -1120,6 +1129,7 @@
           <a:p>
             <a:fld id="{E14D2599-18BE-47BB-BC2D-666CCD9CE092}" type="slidenum">
               <a:rPr lang="en-US" smtClean="0"/>
+              <a:pPr/>
               <a:t>‹#›</a:t>
             </a:fld>
             <a:endParaRPr lang="en-US"/>
@@ -1361,7 +1371,8 @@
           <a:p>
             <a:fld id="{AADD84B7-5B7A-47CB-9705-36F80C5381DC}" type="datetimeFigureOut">
               <a:rPr lang="en-US" smtClean="0"/>
-              <a:t>1/27/2014</a:t>
+              <a:pPr/>
+              <a:t>2/2/2014</a:t>
             </a:fld>
             <a:endParaRPr lang="en-US"/>
           </a:p>
@@ -1403,6 +1414,7 @@
           <a:p>
             <a:fld id="{E14D2599-18BE-47BB-BC2D-666CCD9CE092}" type="slidenum">
               <a:rPr lang="en-US" smtClean="0"/>
+              <a:pPr/>
               <a:t>‹#›</a:t>
             </a:fld>
             <a:endParaRPr lang="en-US"/>
@@ -1778,7 +1790,8 @@
           <a:p>
             <a:fld id="{AADD84B7-5B7A-47CB-9705-36F80C5381DC}" type="datetimeFigureOut">
               <a:rPr lang="en-US" smtClean="0"/>
-              <a:t>1/27/2014</a:t>
+              <a:pPr/>
+              <a:t>2/2/2014</a:t>
             </a:fld>
             <a:endParaRPr lang="en-US"/>
           </a:p>
@@ -1820,6 +1833,7 @@
           <a:p>
             <a:fld id="{E14D2599-18BE-47BB-BC2D-666CCD9CE092}" type="slidenum">
               <a:rPr lang="en-US" smtClean="0"/>
+              <a:pPr/>
               <a:t>‹#›</a:t>
             </a:fld>
             <a:endParaRPr lang="en-US"/>
@@ -1891,7 +1905,8 @@
           <a:p>
             <a:fld id="{AADD84B7-5B7A-47CB-9705-36F80C5381DC}" type="datetimeFigureOut">
               <a:rPr lang="en-US" smtClean="0"/>
-              <a:t>1/27/2014</a:t>
+              <a:pPr/>
+              <a:t>2/2/2014</a:t>
             </a:fld>
             <a:endParaRPr lang="en-US"/>
           </a:p>
@@ -1933,6 +1948,7 @@
           <a:p>
             <a:fld id="{E14D2599-18BE-47BB-BC2D-666CCD9CE092}" type="slidenum">
               <a:rPr lang="en-US" smtClean="0"/>
+              <a:pPr/>
               <a:t>‹#›</a:t>
             </a:fld>
             <a:endParaRPr lang="en-US"/>
@@ -1981,7 +1997,8 @@
           <a:p>
             <a:fld id="{AADD84B7-5B7A-47CB-9705-36F80C5381DC}" type="datetimeFigureOut">
               <a:rPr lang="en-US" smtClean="0"/>
-              <a:t>1/27/2014</a:t>
+              <a:pPr/>
+              <a:t>2/2/2014</a:t>
             </a:fld>
             <a:endParaRPr lang="en-US"/>
           </a:p>
@@ -2023,6 +2040,7 @@
           <a:p>
             <a:fld id="{E14D2599-18BE-47BB-BC2D-666CCD9CE092}" type="slidenum">
               <a:rPr lang="en-US" smtClean="0"/>
+              <a:pPr/>
               <a:t>‹#›</a:t>
             </a:fld>
             <a:endParaRPr lang="en-US"/>
@@ -2253,7 +2271,8 @@
           <a:p>
             <a:fld id="{AADD84B7-5B7A-47CB-9705-36F80C5381DC}" type="datetimeFigureOut">
               <a:rPr lang="en-US" smtClean="0"/>
-              <a:t>1/27/2014</a:t>
+              <a:pPr/>
+              <a:t>2/2/2014</a:t>
             </a:fld>
             <a:endParaRPr lang="en-US"/>
           </a:p>
@@ -2295,6 +2314,7 @@
           <a:p>
             <a:fld id="{E14D2599-18BE-47BB-BC2D-666CCD9CE092}" type="slidenum">
               <a:rPr lang="en-US" smtClean="0"/>
+              <a:pPr/>
               <a:t>‹#›</a:t>
             </a:fld>
             <a:endParaRPr lang="en-US"/>
@@ -2501,7 +2521,8 @@
           <a:p>
             <a:fld id="{AADD84B7-5B7A-47CB-9705-36F80C5381DC}" type="datetimeFigureOut">
               <a:rPr lang="en-US" smtClean="0"/>
-              <a:t>1/27/2014</a:t>
+              <a:pPr/>
+              <a:t>2/2/2014</a:t>
             </a:fld>
             <a:endParaRPr lang="en-US"/>
           </a:p>
@@ -2543,6 +2564,7 @@
           <a:p>
             <a:fld id="{E14D2599-18BE-47BB-BC2D-666CCD9CE092}" type="slidenum">
               <a:rPr lang="en-US" smtClean="0"/>
+              <a:pPr/>
               <a:t>‹#›</a:t>
             </a:fld>
             <a:endParaRPr lang="en-US"/>
@@ -2709,7 +2731,8 @@
           <a:p>
             <a:fld id="{AADD84B7-5B7A-47CB-9705-36F80C5381DC}" type="datetimeFigureOut">
               <a:rPr lang="en-US" smtClean="0"/>
-              <a:t>1/27/2014</a:t>
+              <a:pPr/>
+              <a:t>2/2/2014</a:t>
             </a:fld>
             <a:endParaRPr lang="en-US"/>
           </a:p>
@@ -2787,6 +2810,7 @@
           <a:p>
             <a:fld id="{E14D2599-18BE-47BB-BC2D-666CCD9CE092}" type="slidenum">
               <a:rPr lang="en-US" smtClean="0"/>
+              <a:pPr/>
               <a:t>‹#›</a:t>
             </a:fld>
             <a:endParaRPr lang="en-US"/>
@@ -3318,14 +3342,14 @@
           <a:p>
             <a:r>
               <a:rPr lang="en-CA" dirty="0" smtClean="0"/>
-              <a:t>Context:</a:t>
+              <a:t>Custom DNS Tunnel</a:t>
             </a:r>
             <a:br>
               <a:rPr lang="en-CA" dirty="0" smtClean="0"/>
             </a:br>
             <a:r>
               <a:rPr lang="en-CA" dirty="0" smtClean="0"/>
-              <a:t>Goals and Objectives</a:t>
+              <a:t>Application</a:t>
             </a:r>
             <a:endParaRPr lang="en-US" dirty="0"/>
           </a:p>
@@ -3348,9 +3372,28 @@
           <a:p>
             <a:r>
               <a:rPr lang="en-CA" dirty="0" smtClean="0"/>
-              <a:t>Be able to identify DNS tunnels that do not violate DNS RFCs or specifications in near real time with high accuracy.</a:t>
-            </a:r>
-            <a:endParaRPr lang="en-US" dirty="0"/>
+              <a:t>Prototype proof-of-concept implementation</a:t>
+            </a:r>
+          </a:p>
+          <a:p>
+            <a:r>
+              <a:rPr lang="en-CA" dirty="0" smtClean="0"/>
+              <a:t>Implements encoding to match character frequencies to circumvent </a:t>
+            </a:r>
+            <a:r>
+              <a:rPr lang="en-CA" dirty="0" err="1" smtClean="0"/>
+              <a:t>Born’s</a:t>
+            </a:r>
+            <a:r>
+              <a:rPr lang="en-CA" dirty="0" smtClean="0"/>
+              <a:t> approach to detection.</a:t>
+            </a:r>
+          </a:p>
+          <a:p>
+            <a:r>
+              <a:rPr lang="en-CA" dirty="0" smtClean="0"/>
+              <a:t>Limited to client-to-server transfer only</a:t>
+            </a:r>
           </a:p>
         </p:txBody>
       </p:sp>
@@ -3398,14 +3441,14 @@
           <a:p>
             <a:r>
               <a:rPr lang="en-CA" dirty="0" smtClean="0"/>
-              <a:t>Context:</a:t>
+              <a:t>State of the Art:</a:t>
             </a:r>
             <a:br>
               <a:rPr lang="en-CA" dirty="0" smtClean="0"/>
             </a:br>
             <a:r>
               <a:rPr lang="en-CA" dirty="0" smtClean="0"/>
-              <a:t>Motivation</a:t>
+              <a:t>DNS Tunnel Detection</a:t>
             </a:r>
             <a:endParaRPr lang="en-US" dirty="0"/>
           </a:p>
@@ -3428,27 +3471,48 @@
           <a:p>
             <a:r>
               <a:rPr lang="en-CA" dirty="0" smtClean="0"/>
-              <a:t>DNS tunnels are used in malware as </a:t>
-            </a:r>
-            <a:r>
-              <a:rPr lang="en-CA" dirty="0" err="1" smtClean="0"/>
-              <a:t>botnet</a:t>
-            </a:r>
-            <a:r>
-              <a:rPr lang="en-CA" dirty="0" smtClean="0"/>
-              <a:t> command-and-control channels</a:t>
-            </a:r>
-          </a:p>
-          <a:p>
-            <a:r>
-              <a:rPr lang="en-CA" dirty="0" smtClean="0"/>
-              <a:t>DNS tunnels are used to in/ex-filtrate data through corporate security layers</a:t>
-            </a:r>
-          </a:p>
-          <a:p>
-            <a:r>
-              <a:rPr lang="en-CA" dirty="0" smtClean="0"/>
-              <a:t>The ability to monitor the existence of these channels is important when securing a network.</a:t>
+              <a:t>Fall into several categories</a:t>
+            </a:r>
+          </a:p>
+          <a:p>
+            <a:pPr lvl="1"/>
+            <a:r>
+              <a:rPr lang="en-CA" dirty="0" smtClean="0"/>
+              <a:t>Signature based</a:t>
+            </a:r>
+          </a:p>
+          <a:p>
+            <a:pPr lvl="1"/>
+            <a:r>
+              <a:rPr lang="en-CA" dirty="0" smtClean="0"/>
+              <a:t>Domain hash/blacklist</a:t>
+            </a:r>
+          </a:p>
+          <a:p>
+            <a:pPr lvl="1"/>
+            <a:r>
+              <a:rPr lang="en-CA" dirty="0" smtClean="0"/>
+              <a:t>Flow data based</a:t>
+            </a:r>
+          </a:p>
+          <a:p>
+            <a:pPr lvl="1"/>
+            <a:r>
+              <a:rPr lang="en-CA" dirty="0" smtClean="0"/>
+              <a:t>Character frequency analysis on queries</a:t>
+            </a:r>
+          </a:p>
+          <a:p>
+            <a:pPr lvl="1"/>
+            <a:r>
+              <a:rPr lang="en-CA" dirty="0" smtClean="0"/>
+              <a:t>Behaviour of DNS queries on a per-domain basis</a:t>
+            </a:r>
+          </a:p>
+          <a:p>
+            <a:r>
+              <a:rPr lang="en-CA" dirty="0" smtClean="0"/>
+              <a:t>The proposed approach falls into the last category</a:t>
             </a:r>
             <a:endParaRPr lang="en-US" dirty="0"/>
           </a:p>
@@ -4345,14 +4409,14 @@
           <a:p>
             <a:r>
               <a:rPr lang="en-CA" dirty="0" smtClean="0"/>
-              <a:t>Background:</a:t>
+              <a:t>Context:</a:t>
             </a:r>
             <a:br>
               <a:rPr lang="en-CA" dirty="0" smtClean="0"/>
             </a:br>
             <a:r>
               <a:rPr lang="en-CA" dirty="0" smtClean="0"/>
-              <a:t>Entropy</a:t>
+              <a:t>Motivation</a:t>
             </a:r>
             <a:endParaRPr lang="en-US" dirty="0"/>
           </a:p>
@@ -4375,50 +4439,43 @@
           <a:p>
             <a:r>
               <a:rPr lang="en-CA" dirty="0" smtClean="0"/>
-              <a:t>Rough measure of the amount of information contained in a collection, </a:t>
-            </a:r>
-            <a:r>
-              <a:rPr lang="en-CA" sz="5000" i="1" dirty="0" smtClean="0">
-                <a:latin typeface="DilleniaUPC" pitchFamily="18" charset="-34"/>
-                <a:cs typeface="DilleniaUPC" pitchFamily="18" charset="-34"/>
-              </a:rPr>
-              <a:t>C:</a:t>
-            </a:r>
-          </a:p>
-          <a:p>
-            <a:endParaRPr lang="en-CA" dirty="0" smtClean="0"/>
-          </a:p>
-          <a:p>
-            <a:endParaRPr lang="en-CA" dirty="0"/>
-          </a:p>
-          <a:p>
-            <a:endParaRPr lang="en-CA" dirty="0" smtClean="0"/>
-          </a:p>
-          <a:p>
+              <a:t>DNS tunnels are used in malware as </a:t>
+            </a:r>
+            <a:r>
+              <a:rPr lang="en-CA" dirty="0" err="1" smtClean="0"/>
+              <a:t>botnet</a:t>
+            </a:r>
+            <a:r>
+              <a:rPr lang="en-CA" dirty="0" smtClean="0"/>
+              <a:t> command-and-control channels</a:t>
+            </a:r>
+          </a:p>
+          <a:p>
+            <a:r>
+              <a:rPr lang="en-CA" dirty="0" smtClean="0"/>
+              <a:t>DNS tunnels are used to in/ex-filtrate data through corporate security layers</a:t>
+            </a:r>
+          </a:p>
+          <a:p>
+            <a:r>
+              <a:rPr lang="en-CA" dirty="0" smtClean="0"/>
+              <a:t>The ability to monitor the existence of these channels is important when securing a network</a:t>
+            </a:r>
+            <a:r>
+              <a:rPr lang="en-CA" dirty="0" smtClean="0"/>
+              <a:t>.</a:t>
+            </a:r>
+          </a:p>
+          <a:p>
+            <a:pPr lvl="1"/>
+            <a:r>
+              <a:rPr lang="en-CA" dirty="0" smtClean="0"/>
+              <a:t>Currently quite difficult</a:t>
+            </a:r>
             <a:endParaRPr lang="en-US" dirty="0"/>
           </a:p>
         </p:txBody>
       </p:sp>
-      <p:graphicFrame>
-        <p:nvGraphicFramePr>
-          <p:cNvPr id="2051" name="Content Placeholder 3"/>
-          <p:cNvGraphicFramePr>
-            <a:graphicFrameLocks noChangeAspect="1"/>
-          </p:cNvGraphicFramePr>
-          <p:nvPr/>
-        </p:nvGraphicFramePr>
-        <p:xfrm>
-          <a:off x="2555776" y="2924944"/>
-          <a:ext cx="3984625" cy="1727200"/>
-        </p:xfrm>
-        <a:graphic>
-          <a:graphicData uri="http://schemas.openxmlformats.org/presentationml/2006/ole">
-            <p:oleObj spid="_x0000_s2051" name="Equation" r:id="rId3" imgW="1523880" imgH="660240" progId="Equation.3">
-              <p:embed/>
-            </p:oleObj>
-          </a:graphicData>
-        </a:graphic>
-      </p:graphicFrame>
     </p:spTree>
   </p:cSld>
   <p:clrMapOvr>
@@ -4781,11 +4838,7 @@
           <a:p>
             <a:r>
               <a:rPr lang="en-CA" dirty="0" smtClean="0"/>
-              <a:t>Processing Performance</a:t>
-            </a:r>
-            <a:r>
-              <a:rPr lang="en-CA" dirty="0" smtClean="0"/>
-              <a:t> :</a:t>
+              <a:t>Processing Performance :</a:t>
             </a:r>
             <a:br>
               <a:rPr lang="en-CA" dirty="0" smtClean="0"/>
@@ -4867,11 +4920,7 @@
           <a:p>
             <a:r>
               <a:rPr lang="en-CA" dirty="0" smtClean="0"/>
-              <a:t>Processing Performance</a:t>
-            </a:r>
-            <a:r>
-              <a:rPr lang="en-CA" dirty="0" smtClean="0"/>
-              <a:t> :</a:t>
+              <a:t>Processing Performance :</a:t>
             </a:r>
             <a:br>
               <a:rPr lang="en-CA" dirty="0" smtClean="0"/>
@@ -4957,11 +5006,7 @@
           <a:p>
             <a:r>
               <a:rPr lang="en-CA" dirty="0" smtClean="0"/>
-              <a:t>Processing Performance</a:t>
-            </a:r>
-            <a:r>
-              <a:rPr lang="en-CA" dirty="0" smtClean="0"/>
-              <a:t> :</a:t>
+              <a:t>Processing Performance :</a:t>
             </a:r>
             <a:br>
               <a:rPr lang="en-CA" dirty="0" smtClean="0"/>
@@ -5136,11 +5181,7 @@
           <a:p>
             <a:r>
               <a:rPr lang="en-CA" dirty="0" smtClean="0"/>
-              <a:t>Detection Performance</a:t>
-            </a:r>
-            <a:r>
-              <a:rPr lang="en-CA" dirty="0" smtClean="0"/>
-              <a:t> :</a:t>
+              <a:t>Detection Performance :</a:t>
             </a:r>
             <a:br>
               <a:rPr lang="en-CA" dirty="0" smtClean="0"/>
@@ -5220,11 +5261,7 @@
           <a:p>
             <a:r>
               <a:rPr lang="en-CA" dirty="0" smtClean="0"/>
-              <a:t>Detection Performance</a:t>
-            </a:r>
-            <a:r>
-              <a:rPr lang="en-CA" dirty="0" smtClean="0"/>
-              <a:t> :</a:t>
+              <a:t>Detection Performance :</a:t>
             </a:r>
             <a:br>
               <a:rPr lang="en-CA" dirty="0" smtClean="0"/>
@@ -5304,14 +5341,14 @@
           <a:p>
             <a:r>
               <a:rPr lang="en-CA" dirty="0" smtClean="0"/>
-              <a:t>Background:</a:t>
+              <a:t>Context:</a:t>
             </a:r>
             <a:br>
               <a:rPr lang="en-CA" dirty="0" smtClean="0"/>
             </a:br>
             <a:r>
               <a:rPr lang="en-CA" dirty="0" smtClean="0"/>
-              <a:t>Domain Name System (DNS)</a:t>
+              <a:t>Goals and Objectives</a:t>
             </a:r>
             <a:endParaRPr lang="en-US" dirty="0"/>
           </a:p>
@@ -5329,65 +5366,23 @@
         </p:nvSpPr>
         <p:spPr/>
         <p:txBody>
-          <a:bodyPr>
-            <a:normAutofit fontScale="85000" lnSpcReduction="10000"/>
-          </a:bodyPr>
-          <a:lstStyle/>
-          <a:p>
-            <a:r>
-              <a:rPr lang="en-CA" dirty="0" smtClean="0"/>
-              <a:t>Translates text references to other forms of records. For example:</a:t>
+          <a:bodyPr/>
+          <a:lstStyle/>
+          <a:p>
+            <a:r>
+              <a:rPr lang="en-CA" dirty="0" smtClean="0"/>
+              <a:t>Be able to identify DNS tunnels that do not violate DNS RFCs or specifications in near real time with high accuracy</a:t>
+            </a:r>
+            <a:r>
+              <a:rPr lang="en-CA" dirty="0" smtClean="0"/>
+              <a:t>.</a:t>
             </a:r>
           </a:p>
           <a:p>
             <a:pPr lvl="1"/>
             <a:r>
               <a:rPr lang="en-CA" dirty="0" smtClean="0"/>
-              <a:t>IP or IPv6 address (A or AAAA)</a:t>
-            </a:r>
-          </a:p>
-          <a:p>
-            <a:pPr lvl="1"/>
-            <a:r>
-              <a:rPr lang="en-CA" dirty="0" smtClean="0"/>
-              <a:t>Another domain name (CNAME)</a:t>
-            </a:r>
-          </a:p>
-          <a:p>
-            <a:pPr lvl="1"/>
-            <a:r>
-              <a:rPr lang="en-CA" dirty="0" smtClean="0"/>
-              <a:t>IP address to name (PTR)</a:t>
-            </a:r>
-          </a:p>
-          <a:p>
-            <a:pPr lvl="1"/>
-            <a:r>
-              <a:rPr lang="en-CA" dirty="0" smtClean="0"/>
-              <a:t>Name to bulk data (TXT)</a:t>
-            </a:r>
-          </a:p>
-          <a:p>
-            <a:pPr lvl="1"/>
-            <a:endParaRPr lang="en-CA" dirty="0"/>
-          </a:p>
-          <a:p>
-            <a:r>
-              <a:rPr lang="en-CA" dirty="0" smtClean="0"/>
-              <a:t>Provides the human-interaction layer for the Internet</a:t>
-            </a:r>
-          </a:p>
-          <a:p>
-            <a:r>
-              <a:rPr lang="en-CA" dirty="0" smtClean="0"/>
-              <a:t>Offers a great deal of flexibility for deploying automated services over existing infrastructure</a:t>
-            </a:r>
-          </a:p>
-          <a:p>
-            <a:pPr lvl="1"/>
-            <a:r>
-              <a:rPr lang="en-CA" dirty="0" smtClean="0"/>
-              <a:t>For example: spam, malware, and address blacklists.</a:t>
+              <a:t>Low false-positive rate</a:t>
             </a:r>
             <a:endParaRPr lang="en-US" dirty="0"/>
           </a:p>
@@ -5437,11 +5432,7 @@
           <a:p>
             <a:r>
               <a:rPr lang="en-CA" dirty="0" smtClean="0"/>
-              <a:t>Detection Performance</a:t>
-            </a:r>
-            <a:r>
-              <a:rPr lang="en-CA" dirty="0" smtClean="0"/>
-              <a:t> :</a:t>
+              <a:t>Detection Performance :</a:t>
             </a:r>
             <a:br>
               <a:rPr lang="en-CA" dirty="0" smtClean="0"/>
@@ -5521,11 +5512,7 @@
           <a:p>
             <a:r>
               <a:rPr lang="en-CA" dirty="0" smtClean="0"/>
-              <a:t>Detection Performance</a:t>
-            </a:r>
-            <a:r>
-              <a:rPr lang="en-CA" dirty="0" smtClean="0"/>
-              <a:t> :</a:t>
+              <a:t>Detection Performance :</a:t>
             </a:r>
             <a:br>
               <a:rPr lang="en-CA" dirty="0" smtClean="0"/>
@@ -5605,11 +5592,7 @@
           <a:p>
             <a:r>
               <a:rPr lang="en-CA" dirty="0" smtClean="0"/>
-              <a:t>Detection Performance</a:t>
-            </a:r>
-            <a:r>
-              <a:rPr lang="en-CA" dirty="0" smtClean="0"/>
-              <a:t> :</a:t>
+              <a:t>Detection Performance :</a:t>
             </a:r>
             <a:br>
               <a:rPr lang="en-CA" dirty="0" smtClean="0"/>
@@ -5693,11 +5676,7 @@
           <a:p>
             <a:r>
               <a:rPr lang="en-CA" dirty="0" smtClean="0"/>
-              <a:t>Detection Performance</a:t>
-            </a:r>
-            <a:r>
-              <a:rPr lang="en-CA" dirty="0" smtClean="0"/>
-              <a:t> :</a:t>
+              <a:t>Detection Performance :</a:t>
             </a:r>
             <a:br>
               <a:rPr lang="en-CA" dirty="0" smtClean="0"/>
@@ -5781,11 +5760,7 @@
           <a:p>
             <a:r>
               <a:rPr lang="en-CA" dirty="0" smtClean="0"/>
-              <a:t>Detection Performance</a:t>
-            </a:r>
-            <a:r>
-              <a:rPr lang="en-CA" dirty="0" smtClean="0"/>
-              <a:t> :</a:t>
+              <a:t>Detection Performance :</a:t>
             </a:r>
             <a:br>
               <a:rPr lang="en-CA" dirty="0" smtClean="0"/>
@@ -5869,11 +5844,7 @@
           <a:p>
             <a:r>
               <a:rPr lang="en-CA" dirty="0" smtClean="0"/>
-              <a:t>Detection Performance</a:t>
-            </a:r>
-            <a:r>
-              <a:rPr lang="en-CA" dirty="0" smtClean="0"/>
-              <a:t> :</a:t>
+              <a:t>Detection Performance :</a:t>
             </a:r>
             <a:br>
               <a:rPr lang="en-CA" dirty="0" smtClean="0"/>
@@ -5953,11 +5924,7 @@
           <a:p>
             <a:r>
               <a:rPr lang="en-CA" dirty="0" smtClean="0"/>
-              <a:t>Detection Performance</a:t>
-            </a:r>
-            <a:r>
-              <a:rPr lang="en-CA" dirty="0" smtClean="0"/>
-              <a:t> :</a:t>
+              <a:t>Detection Performance :</a:t>
             </a:r>
             <a:br>
               <a:rPr lang="en-CA" dirty="0" smtClean="0"/>
@@ -6037,11 +6004,7 @@
           <a:p>
             <a:r>
               <a:rPr lang="en-CA" dirty="0" smtClean="0"/>
-              <a:t>Detection Performance</a:t>
-            </a:r>
-            <a:r>
-              <a:rPr lang="en-CA" dirty="0" smtClean="0"/>
-              <a:t> :</a:t>
+              <a:t>Detection Performance :</a:t>
             </a:r>
             <a:br>
               <a:rPr lang="en-CA" dirty="0" smtClean="0"/>
@@ -6288,7 +6251,7 @@
             </a:br>
             <a:r>
               <a:rPr lang="en-CA" dirty="0" smtClean="0"/>
-              <a:t>Covert Channels</a:t>
+              <a:t>Entropy</a:t>
             </a:r>
             <a:endParaRPr lang="en-US" dirty="0"/>
           </a:p>
@@ -6306,44 +6269,55 @@
         </p:nvSpPr>
         <p:spPr/>
         <p:txBody>
-          <a:bodyPr>
-            <a:normAutofit/>
-          </a:bodyPr>
-          <a:lstStyle/>
-          <a:p>
-            <a:r>
-              <a:rPr lang="en-CA" dirty="0" smtClean="0"/>
-              <a:t>Utilize standard means of transportation in non-standard ways</a:t>
-            </a:r>
-          </a:p>
-          <a:p>
-            <a:pPr lvl="1"/>
-            <a:r>
-              <a:rPr lang="en-CA" dirty="0" smtClean="0"/>
-              <a:t>Often transporting unintended data types of existing protocols</a:t>
-            </a:r>
-          </a:p>
-          <a:p>
-            <a:pPr lvl="1"/>
-            <a:r>
-              <a:rPr lang="en-CA" dirty="0" smtClean="0"/>
-              <a:t>Occasionally involves new custom protocols built on existing ones</a:t>
-            </a:r>
-          </a:p>
-          <a:p>
-            <a:r>
-              <a:rPr lang="en-CA" dirty="0" smtClean="0"/>
-              <a:t>Intention is rarely benign, often circumventing existing security layers</a:t>
+          <a:bodyPr/>
+          <a:lstStyle/>
+          <a:p>
+            <a:r>
+              <a:rPr lang="en-CA" dirty="0" smtClean="0"/>
+              <a:t>Rough measure of the amount of information contained in a collection, </a:t>
+            </a:r>
+            <a:r>
+              <a:rPr lang="en-CA" sz="5000" i="1" dirty="0" smtClean="0">
+                <a:latin typeface="DilleniaUPC" pitchFamily="18" charset="-34"/>
+                <a:cs typeface="DilleniaUPC" pitchFamily="18" charset="-34"/>
+              </a:rPr>
+              <a:t>C:</a:t>
             </a:r>
           </a:p>
           <a:p>
             <a:endParaRPr lang="en-CA" dirty="0" smtClean="0"/>
           </a:p>
           <a:p>
+            <a:endParaRPr lang="en-CA" dirty="0"/>
+          </a:p>
+          <a:p>
+            <a:endParaRPr lang="en-CA" dirty="0" smtClean="0"/>
+          </a:p>
+          <a:p>
             <a:endParaRPr lang="en-US" dirty="0"/>
           </a:p>
         </p:txBody>
       </p:sp>
+      <p:graphicFrame>
+        <p:nvGraphicFramePr>
+          <p:cNvPr id="2051" name="Content Placeholder 3"/>
+          <p:cNvGraphicFramePr>
+            <a:graphicFrameLocks noChangeAspect="1"/>
+          </p:cNvGraphicFramePr>
+          <p:nvPr/>
+        </p:nvGraphicFramePr>
+        <p:xfrm>
+          <a:off x="2555776" y="2924944"/>
+          <a:ext cx="3984625" cy="1727200"/>
+        </p:xfrm>
+        <a:graphic>
+          <a:graphicData uri="http://schemas.openxmlformats.org/presentationml/2006/ole">
+            <p:oleObj spid="_x0000_s2051" name="Equation" r:id="rId3" imgW="1523880" imgH="660240" progId="Equation.3">
+              <p:embed/>
+            </p:oleObj>
+          </a:graphicData>
+        </a:graphic>
+      </p:graphicFrame>
     </p:spTree>
   </p:cSld>
   <p:clrMapOvr>
@@ -6900,7 +6874,7 @@
             </a:br>
             <a:r>
               <a:rPr lang="en-CA" dirty="0" smtClean="0"/>
-              <a:t>Covert Channels</a:t>
+              <a:t>Domain Name System (DNS)</a:t>
             </a:r>
             <a:endParaRPr lang="en-US" dirty="0"/>
           </a:p>
@@ -6919,76 +6893,65 @@
         <p:spPr/>
         <p:txBody>
           <a:bodyPr>
-            <a:normAutofit fontScale="92500" lnSpcReduction="20000"/>
+            <a:normAutofit fontScale="85000" lnSpcReduction="10000"/>
           </a:bodyPr>
           <a:lstStyle/>
           <a:p>
             <a:r>
               <a:rPr lang="en-CA" dirty="0" smtClean="0"/>
-              <a:t>May or may not modify the standard protocols in ways that are conforming to specifications.</a:t>
-            </a:r>
-          </a:p>
-          <a:p>
-            <a:r>
-              <a:rPr lang="en-CA" dirty="0" smtClean="0"/>
-              <a:t>May sacrifice ‘common’ features such as </a:t>
-            </a:r>
-            <a:r>
-              <a:rPr lang="en-CA" dirty="0" err="1" smtClean="0"/>
-              <a:t>bidirectionality</a:t>
-            </a:r>
-            <a:endParaRPr lang="en-CA" dirty="0" smtClean="0"/>
-          </a:p>
-          <a:p>
-            <a:pPr>
-              <a:buNone/>
-            </a:pPr>
-            <a:endParaRPr lang="en-CA" dirty="0" smtClean="0"/>
-          </a:p>
-          <a:p>
-            <a:r>
-              <a:rPr lang="en-CA" dirty="0" smtClean="0"/>
-              <a:t>Examples:</a:t>
+              <a:t>Translates text references to other forms of records. For example:</a:t>
             </a:r>
           </a:p>
           <a:p>
             <a:pPr lvl="1"/>
             <a:r>
               <a:rPr lang="en-CA" dirty="0" smtClean="0"/>
-              <a:t>IP timing channels</a:t>
+              <a:t>IP or IPv6 address (A or AAAA)</a:t>
             </a:r>
           </a:p>
           <a:p>
             <a:pPr lvl="1"/>
             <a:r>
               <a:rPr lang="en-CA" dirty="0" smtClean="0"/>
-              <a:t>May use third party services such as Twitter, </a:t>
-            </a:r>
-            <a:r>
-              <a:rPr lang="en-CA" dirty="0" err="1" smtClean="0"/>
-              <a:t>Facebook</a:t>
-            </a:r>
-            <a:r>
-              <a:rPr lang="en-CA" dirty="0" smtClean="0"/>
-              <a:t>, or image hosting providers</a:t>
-            </a:r>
-          </a:p>
-          <a:p>
-            <a:pPr lvl="2"/>
-            <a:r>
-              <a:rPr lang="en-CA" dirty="0" smtClean="0"/>
-              <a:t>Encoding information in JPEG headers</a:t>
+              <a:t>Another domain name (CNAME)</a:t>
             </a:r>
           </a:p>
           <a:p>
             <a:pPr lvl="1"/>
             <a:r>
               <a:rPr lang="en-CA" dirty="0" smtClean="0"/>
-              <a:t>DNS tunnels</a:t>
+              <a:t>IP address to name (PTR)</a:t>
             </a:r>
           </a:p>
           <a:p>
             <a:pPr lvl="1"/>
+            <a:r>
+              <a:rPr lang="en-CA" dirty="0" smtClean="0"/>
+              <a:t>Name to bulk data (TXT)</a:t>
+            </a:r>
+          </a:p>
+          <a:p>
+            <a:pPr lvl="1"/>
+            <a:endParaRPr lang="en-CA" dirty="0"/>
+          </a:p>
+          <a:p>
+            <a:r>
+              <a:rPr lang="en-CA" dirty="0" smtClean="0"/>
+              <a:t>Provides the human-interaction layer for the Internet</a:t>
+            </a:r>
+          </a:p>
+          <a:p>
+            <a:r>
+              <a:rPr lang="en-CA" dirty="0" smtClean="0"/>
+              <a:t>Offers a great deal of flexibility for deploying automated services over existing infrastructure</a:t>
+            </a:r>
+          </a:p>
+          <a:p>
+            <a:pPr lvl="1"/>
+            <a:r>
+              <a:rPr lang="en-CA" dirty="0" smtClean="0"/>
+              <a:t>For example: spam, malware, and address blacklists.</a:t>
+            </a:r>
             <a:endParaRPr lang="en-US" dirty="0"/>
           </a:p>
         </p:txBody>
@@ -7044,7 +7007,7 @@
             </a:br>
             <a:r>
               <a:rPr lang="en-CA" dirty="0" smtClean="0"/>
-              <a:t>DNS Tunnels</a:t>
+              <a:t>Covert Channels</a:t>
             </a:r>
             <a:endParaRPr lang="en-US" dirty="0"/>
           </a:p>
@@ -7063,55 +7026,47 @@
         <p:spPr/>
         <p:txBody>
           <a:bodyPr>
-            <a:normAutofit fontScale="92500"/>
+            <a:normAutofit/>
           </a:bodyPr>
           <a:lstStyle/>
           <a:p>
             <a:r>
               <a:rPr lang="en-CA" dirty="0" smtClean="0"/>
-              <a:t>Raw DNS tunnels</a:t>
+              <a:t>Utilize standard means of transportation in non-standard ways</a:t>
             </a:r>
           </a:p>
           <a:p>
             <a:pPr lvl="1"/>
             <a:r>
               <a:rPr lang="en-CA" dirty="0" smtClean="0"/>
-              <a:t>Utilize UDP/TCP port 53 for transmitting arbitrary data without respect for DNS protocol specifications</a:t>
+              <a:t>Often transporting unintended data types </a:t>
+            </a:r>
+            <a:r>
+              <a:rPr lang="en-CA" dirty="0" smtClean="0"/>
+              <a:t>over existing </a:t>
+            </a:r>
+            <a:r>
+              <a:rPr lang="en-CA" dirty="0" smtClean="0"/>
+              <a:t>protocols</a:t>
             </a:r>
           </a:p>
           <a:p>
             <a:pPr lvl="1"/>
             <a:r>
               <a:rPr lang="en-CA" dirty="0" smtClean="0"/>
-              <a:t>Not difficult to block</a:t>
-            </a:r>
-          </a:p>
-          <a:p>
-            <a:r>
-              <a:rPr lang="en-CA" dirty="0" smtClean="0"/>
-              <a:t>Conforming DNS tunnels</a:t>
-            </a:r>
-          </a:p>
-          <a:p>
-            <a:pPr lvl="1"/>
-            <a:r>
-              <a:rPr lang="en-CA" dirty="0" smtClean="0"/>
-              <a:t>Makes use of DNS packets that do not violate the protocol specifications to transmit arbitrary data</a:t>
-            </a:r>
-          </a:p>
-          <a:p>
-            <a:pPr lvl="1"/>
-            <a:r>
-              <a:rPr lang="en-CA" dirty="0" smtClean="0"/>
-              <a:t>Can be very difficult to identify and block</a:t>
-            </a:r>
-          </a:p>
-          <a:p>
-            <a:pPr lvl="1"/>
-            <a:r>
-              <a:rPr lang="en-CA" dirty="0" smtClean="0"/>
-              <a:t>The focus of this work</a:t>
-            </a:r>
+              <a:t>Occasionally involves new custom protocols built on existing ones</a:t>
+            </a:r>
+          </a:p>
+          <a:p>
+            <a:r>
+              <a:rPr lang="en-CA" dirty="0" smtClean="0"/>
+              <a:t>Intention is rarely benign, often circumventing existing security layers</a:t>
+            </a:r>
+          </a:p>
+          <a:p>
+            <a:endParaRPr lang="en-CA" dirty="0" smtClean="0"/>
+          </a:p>
+          <a:p>
             <a:endParaRPr lang="en-US" dirty="0"/>
           </a:p>
         </p:txBody>
@@ -7167,7 +7122,7 @@
             </a:br>
             <a:r>
               <a:rPr lang="en-CA" dirty="0" smtClean="0"/>
-              <a:t>DNS Tunnels</a:t>
+              <a:t>Covert Channels</a:t>
             </a:r>
             <a:endParaRPr lang="en-US" dirty="0"/>
           </a:p>
@@ -7186,65 +7141,76 @@
         <p:spPr/>
         <p:txBody>
           <a:bodyPr>
-            <a:normAutofit lnSpcReduction="10000"/>
+            <a:normAutofit fontScale="92500" lnSpcReduction="20000"/>
           </a:bodyPr>
           <a:lstStyle/>
           <a:p>
             <a:r>
               <a:rPr lang="en-CA" dirty="0" smtClean="0"/>
-              <a:t>Existing implementations are commonplace</a:t>
+              <a:t>May or may not modify the standard protocols in ways that are conforming to specifications.</a:t>
+            </a:r>
+          </a:p>
+          <a:p>
+            <a:r>
+              <a:rPr lang="en-CA" dirty="0" smtClean="0"/>
+              <a:t>May sacrifice ‘common’ features such as </a:t>
+            </a:r>
+            <a:r>
+              <a:rPr lang="en-CA" dirty="0" err="1" smtClean="0"/>
+              <a:t>bidirectionality</a:t>
+            </a:r>
+            <a:endParaRPr lang="en-CA" dirty="0" smtClean="0"/>
+          </a:p>
+          <a:p>
+            <a:pPr>
+              <a:buNone/>
+            </a:pPr>
+            <a:endParaRPr lang="en-CA" dirty="0" smtClean="0"/>
+          </a:p>
+          <a:p>
+            <a:r>
+              <a:rPr lang="en-CA" dirty="0" smtClean="0"/>
+              <a:t>Examples:</a:t>
             </a:r>
           </a:p>
           <a:p>
             <a:pPr lvl="1"/>
             <a:r>
               <a:rPr lang="en-CA" dirty="0" smtClean="0"/>
-              <a:t>Iodine</a:t>
+              <a:t>IP timing channels</a:t>
             </a:r>
           </a:p>
           <a:p>
             <a:pPr lvl="1"/>
             <a:r>
+              <a:rPr lang="en-CA" dirty="0" smtClean="0"/>
+              <a:t>May use third party services such as Twitter, </a:t>
+            </a:r>
+            <a:r>
               <a:rPr lang="en-CA" dirty="0" err="1" smtClean="0"/>
-              <a:t>OzymanDNS</a:t>
-            </a:r>
-            <a:endParaRPr lang="en-CA" dirty="0" smtClean="0"/>
+              <a:t>Facebook</a:t>
+            </a:r>
+            <a:r>
+              <a:rPr lang="en-CA" dirty="0" smtClean="0"/>
+              <a:t>, or image hosting providers</a:t>
+            </a:r>
+          </a:p>
+          <a:p>
+            <a:pPr lvl="2"/>
+            <a:r>
+              <a:rPr lang="en-CA" dirty="0" smtClean="0"/>
+              <a:t>Encoding information in JPEG headers</a:t>
+            </a:r>
           </a:p>
           <a:p>
             <a:pPr lvl="1"/>
             <a:r>
               <a:rPr lang="en-CA" dirty="0" smtClean="0"/>
-              <a:t>Dns2tcp</a:t>
+              <a:t>DNS tunnels</a:t>
             </a:r>
           </a:p>
           <a:p>
             <a:pPr lvl="1"/>
-            <a:r>
-              <a:rPr lang="en-CA" dirty="0" err="1" smtClean="0"/>
-              <a:t>DNScat</a:t>
-            </a:r>
-            <a:endParaRPr lang="en-CA" dirty="0" smtClean="0"/>
-          </a:p>
-          <a:p>
-            <a:pPr lvl="1"/>
-            <a:r>
-              <a:rPr lang="en-CA" dirty="0" err="1" smtClean="0"/>
-              <a:t>DeNiSe</a:t>
-            </a:r>
-            <a:endParaRPr lang="en-CA" dirty="0" smtClean="0"/>
-          </a:p>
-          <a:p>
-            <a:pPr lvl="1"/>
-            <a:r>
-              <a:rPr lang="en-CA" dirty="0" smtClean="0"/>
-              <a:t>PSUDP</a:t>
-            </a:r>
-          </a:p>
-          <a:p>
-            <a:r>
-              <a:rPr lang="en-CA" dirty="0" smtClean="0"/>
-              <a:t>A custom implementation was built to simulate a next-generation tunnel</a:t>
-            </a:r>
             <a:endParaRPr lang="en-US" dirty="0"/>
           </a:p>
         </p:txBody>
@@ -7293,14 +7259,14 @@
           <a:p>
             <a:r>
               <a:rPr lang="en-CA" dirty="0" smtClean="0"/>
-              <a:t>Custom DNS Tunnel</a:t>
+              <a:t>Background:</a:t>
             </a:r>
             <a:br>
               <a:rPr lang="en-CA" dirty="0" smtClean="0"/>
             </a:br>
             <a:r>
               <a:rPr lang="en-CA" dirty="0" smtClean="0"/>
-              <a:t>Application</a:t>
+              <a:t>DNS Tunnels</a:t>
             </a:r>
             <a:endParaRPr lang="en-US" dirty="0"/>
           </a:p>
@@ -7318,33 +7284,57 @@
         </p:nvSpPr>
         <p:spPr/>
         <p:txBody>
-          <a:bodyPr/>
-          <a:lstStyle/>
-          <a:p>
-            <a:r>
-              <a:rPr lang="en-CA" dirty="0" smtClean="0"/>
-              <a:t>Prototype proof-of-concept implementation</a:t>
-            </a:r>
-          </a:p>
-          <a:p>
-            <a:r>
-              <a:rPr lang="en-CA" dirty="0" smtClean="0"/>
-              <a:t>Implements encoding to match character frequencies to circumvent </a:t>
-            </a:r>
-            <a:r>
-              <a:rPr lang="en-CA" dirty="0" err="1" smtClean="0"/>
-              <a:t>Born’s</a:t>
-            </a:r>
-            <a:r>
-              <a:rPr lang="en-CA" dirty="0" smtClean="0"/>
-              <a:t> approach to detection.</a:t>
-            </a:r>
-          </a:p>
-          <a:p>
-            <a:r>
-              <a:rPr lang="en-CA" dirty="0" smtClean="0"/>
-              <a:t>Limited to client-to-server transfer only</a:t>
-            </a:r>
+          <a:bodyPr>
+            <a:normAutofit fontScale="92500"/>
+          </a:bodyPr>
+          <a:lstStyle/>
+          <a:p>
+            <a:r>
+              <a:rPr lang="en-CA" dirty="0" smtClean="0"/>
+              <a:t>Raw DNS tunnels</a:t>
+            </a:r>
+          </a:p>
+          <a:p>
+            <a:pPr lvl="1"/>
+            <a:r>
+              <a:rPr lang="en-CA" dirty="0" smtClean="0"/>
+              <a:t>Utilize UDP/TCP port 53 for transmitting arbitrary data without respect for DNS protocol specifications</a:t>
+            </a:r>
+          </a:p>
+          <a:p>
+            <a:pPr lvl="1"/>
+            <a:r>
+              <a:rPr lang="en-CA" dirty="0" smtClean="0"/>
+              <a:t>Not difficult to block</a:t>
+            </a:r>
+          </a:p>
+          <a:p>
+            <a:r>
+              <a:rPr lang="en-CA" dirty="0" smtClean="0"/>
+              <a:t>Conforming DNS tunnels</a:t>
+            </a:r>
+          </a:p>
+          <a:p>
+            <a:pPr lvl="1"/>
+            <a:r>
+              <a:rPr lang="en-CA" dirty="0" smtClean="0"/>
+              <a:t>Makes use of DNS packets that do not violate the protocol specifications to transmit arbitrary data</a:t>
+            </a:r>
+          </a:p>
+          <a:p>
+            <a:pPr lvl="1"/>
+            <a:r>
+              <a:rPr lang="en-CA" dirty="0" smtClean="0"/>
+              <a:t>Can be very difficult to identify and block</a:t>
+            </a:r>
+          </a:p>
+          <a:p>
+            <a:pPr lvl="1"/>
+            <a:r>
+              <a:rPr lang="en-CA" dirty="0" smtClean="0"/>
+              <a:t>The focus of this work</a:t>
+            </a:r>
+            <a:endParaRPr lang="en-US" dirty="0"/>
           </a:p>
         </p:txBody>
       </p:sp>
@@ -7392,14 +7382,14 @@
           <a:p>
             <a:r>
               <a:rPr lang="en-CA" dirty="0" smtClean="0"/>
-              <a:t>State of the Art:</a:t>
+              <a:t>Background:</a:t>
             </a:r>
             <a:br>
               <a:rPr lang="en-CA" dirty="0" smtClean="0"/>
             </a:br>
             <a:r>
               <a:rPr lang="en-CA" dirty="0" smtClean="0"/>
-              <a:t>DNS Tunnel Detection</a:t>
+              <a:t>DNS Tunnels</a:t>
             </a:r>
             <a:endParaRPr lang="en-US" dirty="0"/>
           </a:p>
@@ -7417,53 +7407,65 @@
         </p:nvSpPr>
         <p:spPr/>
         <p:txBody>
-          <a:bodyPr/>
-          <a:lstStyle/>
-          <a:p>
-            <a:r>
-              <a:rPr lang="en-CA" dirty="0" smtClean="0"/>
-              <a:t>Fall into several categories</a:t>
+          <a:bodyPr>
+            <a:normAutofit lnSpcReduction="10000"/>
+          </a:bodyPr>
+          <a:lstStyle/>
+          <a:p>
+            <a:r>
+              <a:rPr lang="en-CA" dirty="0" smtClean="0"/>
+              <a:t>Existing implementations are commonplace</a:t>
             </a:r>
           </a:p>
           <a:p>
             <a:pPr lvl="1"/>
             <a:r>
               <a:rPr lang="en-CA" dirty="0" smtClean="0"/>
-              <a:t>Signature based</a:t>
+              <a:t>Iodine</a:t>
             </a:r>
           </a:p>
           <a:p>
             <a:pPr lvl="1"/>
             <a:r>
-              <a:rPr lang="en-CA" dirty="0" smtClean="0"/>
-              <a:t>Domain hash/blacklist</a:t>
-            </a:r>
+              <a:rPr lang="en-CA" dirty="0" err="1" smtClean="0"/>
+              <a:t>OzymanDNS</a:t>
+            </a:r>
+            <a:endParaRPr lang="en-CA" dirty="0" smtClean="0"/>
           </a:p>
           <a:p>
             <a:pPr lvl="1"/>
             <a:r>
               <a:rPr lang="en-CA" dirty="0" smtClean="0"/>
-              <a:t>Flow data based</a:t>
+              <a:t>Dns2tcp</a:t>
             </a:r>
           </a:p>
           <a:p>
             <a:pPr lvl="1"/>
             <a:r>
-              <a:rPr lang="en-CA" dirty="0" smtClean="0"/>
-              <a:t>Character frequency analysis on queries</a:t>
-            </a:r>
+              <a:rPr lang="en-CA" dirty="0" err="1" smtClean="0"/>
+              <a:t>DNScat</a:t>
+            </a:r>
+            <a:endParaRPr lang="en-CA" dirty="0" smtClean="0"/>
           </a:p>
           <a:p>
             <a:pPr lvl="1"/>
             <a:r>
-              <a:rPr lang="en-CA" dirty="0" smtClean="0"/>
-              <a:t>Behaviour of DNS queries on a per-domain basis</a:t>
-            </a:r>
-          </a:p>
-          <a:p>
-            <a:r>
-              <a:rPr lang="en-CA" dirty="0" smtClean="0"/>
-              <a:t>The proposed approach falls into the last category</a:t>
+              <a:rPr lang="en-CA" dirty="0" err="1" smtClean="0"/>
+              <a:t>DeNiSe</a:t>
+            </a:r>
+            <a:endParaRPr lang="en-CA" dirty="0" smtClean="0"/>
+          </a:p>
+          <a:p>
+            <a:pPr lvl="1"/>
+            <a:r>
+              <a:rPr lang="en-CA" dirty="0" smtClean="0"/>
+              <a:t>PSUDP</a:t>
+            </a:r>
+          </a:p>
+          <a:p>
+            <a:r>
+              <a:rPr lang="en-CA" dirty="0" smtClean="0"/>
+              <a:t>A custom implementation was built to simulate a next-generation tunnel</a:t>
             </a:r>
             <a:endParaRPr lang="en-US" dirty="0"/>
           </a:p>

</xml_diff>

<commit_message>
Write the notes. now to edit into points.
</commit_message>
<xml_diff>
--- a/Defense.pptx
+++ b/Defense.pptx
@@ -8,12 +8,12 @@
     <p:sldId id="256" r:id="rId2"/>
     <p:sldId id="305" r:id="rId3"/>
     <p:sldId id="304" r:id="rId4"/>
-    <p:sldId id="258" r:id="rId5"/>
-    <p:sldId id="259" r:id="rId6"/>
-    <p:sldId id="260" r:id="rId7"/>
-    <p:sldId id="261" r:id="rId8"/>
-    <p:sldId id="262" r:id="rId9"/>
-    <p:sldId id="263" r:id="rId10"/>
+    <p:sldId id="259" r:id="rId5"/>
+    <p:sldId id="260" r:id="rId6"/>
+    <p:sldId id="261" r:id="rId7"/>
+    <p:sldId id="258" r:id="rId8"/>
+    <p:sldId id="263" r:id="rId9"/>
+    <p:sldId id="262" r:id="rId10"/>
     <p:sldId id="281" r:id="rId11"/>
     <p:sldId id="264" r:id="rId12"/>
     <p:sldId id="267" r:id="rId13"/>
@@ -24,32 +24,33 @@
     <p:sldId id="272" r:id="rId18"/>
     <p:sldId id="273" r:id="rId19"/>
     <p:sldId id="299" r:id="rId20"/>
-    <p:sldId id="274" r:id="rId21"/>
-    <p:sldId id="275" r:id="rId22"/>
-    <p:sldId id="276" r:id="rId23"/>
-    <p:sldId id="277" r:id="rId24"/>
-    <p:sldId id="278" r:id="rId25"/>
-    <p:sldId id="279" r:id="rId26"/>
-    <p:sldId id="280" r:id="rId27"/>
-    <p:sldId id="298" r:id="rId28"/>
-    <p:sldId id="282" r:id="rId29"/>
-    <p:sldId id="283" r:id="rId30"/>
-    <p:sldId id="284" r:id="rId31"/>
-    <p:sldId id="285" r:id="rId32"/>
-    <p:sldId id="286" r:id="rId33"/>
-    <p:sldId id="287" r:id="rId34"/>
-    <p:sldId id="290" r:id="rId35"/>
-    <p:sldId id="288" r:id="rId36"/>
-    <p:sldId id="289" r:id="rId37"/>
-    <p:sldId id="291" r:id="rId38"/>
-    <p:sldId id="295" r:id="rId39"/>
-    <p:sldId id="296" r:id="rId40"/>
-    <p:sldId id="294" r:id="rId41"/>
-    <p:sldId id="297" r:id="rId42"/>
-    <p:sldId id="300" r:id="rId43"/>
-    <p:sldId id="301" r:id="rId44"/>
-    <p:sldId id="302" r:id="rId45"/>
-    <p:sldId id="303" r:id="rId46"/>
+    <p:sldId id="306" r:id="rId21"/>
+    <p:sldId id="274" r:id="rId22"/>
+    <p:sldId id="275" r:id="rId23"/>
+    <p:sldId id="276" r:id="rId24"/>
+    <p:sldId id="277" r:id="rId25"/>
+    <p:sldId id="278" r:id="rId26"/>
+    <p:sldId id="279" r:id="rId27"/>
+    <p:sldId id="280" r:id="rId28"/>
+    <p:sldId id="298" r:id="rId29"/>
+    <p:sldId id="282" r:id="rId30"/>
+    <p:sldId id="283" r:id="rId31"/>
+    <p:sldId id="284" r:id="rId32"/>
+    <p:sldId id="285" r:id="rId33"/>
+    <p:sldId id="286" r:id="rId34"/>
+    <p:sldId id="287" r:id="rId35"/>
+    <p:sldId id="290" r:id="rId36"/>
+    <p:sldId id="288" r:id="rId37"/>
+    <p:sldId id="289" r:id="rId38"/>
+    <p:sldId id="291" r:id="rId39"/>
+    <p:sldId id="295" r:id="rId40"/>
+    <p:sldId id="296" r:id="rId41"/>
+    <p:sldId id="294" r:id="rId42"/>
+    <p:sldId id="297" r:id="rId43"/>
+    <p:sldId id="300" r:id="rId44"/>
+    <p:sldId id="301" r:id="rId45"/>
+    <p:sldId id="302" r:id="rId46"/>
+    <p:sldId id="303" r:id="rId47"/>
   </p:sldIdLst>
   <p:sldSz cx="9144000" cy="6858000" type="screen4x3"/>
   <p:notesSz cx="6858000" cy="9144000"/>
@@ -333,7 +334,7 @@
             <a:fld id="{AADD84B7-5B7A-47CB-9705-36F80C5381DC}" type="datetimeFigureOut">
               <a:rPr lang="en-US" smtClean="0"/>
               <a:pPr/>
-              <a:t>2/2/2014</a:t>
+              <a:t>2/3/2014</a:t>
             </a:fld>
             <a:endParaRPr lang="en-US"/>
           </a:p>
@@ -500,7 +501,7 @@
             <a:fld id="{AADD84B7-5B7A-47CB-9705-36F80C5381DC}" type="datetimeFigureOut">
               <a:rPr lang="en-US" smtClean="0"/>
               <a:pPr/>
-              <a:t>2/2/2014</a:t>
+              <a:t>2/3/2014</a:t>
             </a:fld>
             <a:endParaRPr lang="en-US"/>
           </a:p>
@@ -677,7 +678,7 @@
             <a:fld id="{AADD84B7-5B7A-47CB-9705-36F80C5381DC}" type="datetimeFigureOut">
               <a:rPr lang="en-US" smtClean="0"/>
               <a:pPr/>
-              <a:t>2/2/2014</a:t>
+              <a:t>2/3/2014</a:t>
             </a:fld>
             <a:endParaRPr lang="en-US"/>
           </a:p>
@@ -844,7 +845,7 @@
             <a:fld id="{AADD84B7-5B7A-47CB-9705-36F80C5381DC}" type="datetimeFigureOut">
               <a:rPr lang="en-US" smtClean="0"/>
               <a:pPr/>
-              <a:t>2/2/2014</a:t>
+              <a:t>2/3/2014</a:t>
             </a:fld>
             <a:endParaRPr lang="en-US"/>
           </a:p>
@@ -1087,7 +1088,7 @@
             <a:fld id="{AADD84B7-5B7A-47CB-9705-36F80C5381DC}" type="datetimeFigureOut">
               <a:rPr lang="en-US" smtClean="0"/>
               <a:pPr/>
-              <a:t>2/2/2014</a:t>
+              <a:t>2/3/2014</a:t>
             </a:fld>
             <a:endParaRPr lang="en-US"/>
           </a:p>
@@ -1372,7 +1373,7 @@
             <a:fld id="{AADD84B7-5B7A-47CB-9705-36F80C5381DC}" type="datetimeFigureOut">
               <a:rPr lang="en-US" smtClean="0"/>
               <a:pPr/>
-              <a:t>2/2/2014</a:t>
+              <a:t>2/3/2014</a:t>
             </a:fld>
             <a:endParaRPr lang="en-US"/>
           </a:p>
@@ -1791,7 +1792,7 @@
             <a:fld id="{AADD84B7-5B7A-47CB-9705-36F80C5381DC}" type="datetimeFigureOut">
               <a:rPr lang="en-US" smtClean="0"/>
               <a:pPr/>
-              <a:t>2/2/2014</a:t>
+              <a:t>2/3/2014</a:t>
             </a:fld>
             <a:endParaRPr lang="en-US"/>
           </a:p>
@@ -1906,7 +1907,7 @@
             <a:fld id="{AADD84B7-5B7A-47CB-9705-36F80C5381DC}" type="datetimeFigureOut">
               <a:rPr lang="en-US" smtClean="0"/>
               <a:pPr/>
-              <a:t>2/2/2014</a:t>
+              <a:t>2/3/2014</a:t>
             </a:fld>
             <a:endParaRPr lang="en-US"/>
           </a:p>
@@ -1998,7 +1999,7 @@
             <a:fld id="{AADD84B7-5B7A-47CB-9705-36F80C5381DC}" type="datetimeFigureOut">
               <a:rPr lang="en-US" smtClean="0"/>
               <a:pPr/>
-              <a:t>2/2/2014</a:t>
+              <a:t>2/3/2014</a:t>
             </a:fld>
             <a:endParaRPr lang="en-US"/>
           </a:p>
@@ -2272,7 +2273,7 @@
             <a:fld id="{AADD84B7-5B7A-47CB-9705-36F80C5381DC}" type="datetimeFigureOut">
               <a:rPr lang="en-US" smtClean="0"/>
               <a:pPr/>
-              <a:t>2/2/2014</a:t>
+              <a:t>2/3/2014</a:t>
             </a:fld>
             <a:endParaRPr lang="en-US"/>
           </a:p>
@@ -2522,7 +2523,7 @@
             <a:fld id="{AADD84B7-5B7A-47CB-9705-36F80C5381DC}" type="datetimeFigureOut">
               <a:rPr lang="en-US" smtClean="0"/>
               <a:pPr/>
-              <a:t>2/2/2014</a:t>
+              <a:t>2/3/2014</a:t>
             </a:fld>
             <a:endParaRPr lang="en-US"/>
           </a:p>
@@ -2732,7 +2733,7 @@
             <a:fld id="{AADD84B7-5B7A-47CB-9705-36F80C5381DC}" type="datetimeFigureOut">
               <a:rPr lang="en-US" smtClean="0"/>
               <a:pPr/>
-              <a:t>2/2/2014</a:t>
+              <a:t>2/3/2014</a:t>
             </a:fld>
             <a:endParaRPr lang="en-US"/>
           </a:p>
@@ -3121,20 +3122,21 @@
         </p:spPr>
         <p:txBody>
           <a:bodyPr>
-            <a:normAutofit/>
+            <a:noAutofit/>
           </a:bodyPr>
           <a:lstStyle/>
           <a:p>
             <a:r>
-              <a:rPr lang="en-US" sz="3400" dirty="0"/>
-              <a:t>A Novel Approach to Detecting Covert DNS</a:t>
-            </a:r>
-            <a:br>
-              <a:rPr lang="en-US" sz="3400" dirty="0"/>
-            </a:br>
-            <a:r>
-              <a:rPr lang="en-US" sz="3400" dirty="0"/>
-              <a:t>Tunnels Using Throughput Estimation</a:t>
+              <a:rPr lang="en-US" sz="3800" dirty="0"/>
+              <a:t>A Novel Approach to Detecting Covert </a:t>
+            </a:r>
+            <a:r>
+              <a:rPr lang="en-US" sz="3800" dirty="0" smtClean="0"/>
+              <a:t>DNS Tunnels </a:t>
+            </a:r>
+            <a:r>
+              <a:rPr lang="en-US" sz="3800" dirty="0"/>
+              <a:t>Using Throughput Estimation</a:t>
             </a:r>
           </a:p>
         </p:txBody>
@@ -3157,144 +3159,25 @@
         </p:spPr>
         <p:txBody>
           <a:bodyPr>
-            <a:normAutofit fontScale="32500" lnSpcReduction="20000"/>
+            <a:normAutofit/>
           </a:bodyPr>
           <a:lstStyle/>
           <a:p>
             <a:r>
-              <a:rPr lang="en-US" dirty="0"/>
+              <a:rPr lang="en-US" sz="2000" dirty="0"/>
               <a:t>by</a:t>
             </a:r>
           </a:p>
           <a:p>
             <a:r>
-              <a:rPr lang="en-US" sz="4900" dirty="0"/>
+              <a:rPr lang="en-US" sz="2400" dirty="0"/>
               <a:t>Michael </a:t>
             </a:r>
             <a:r>
-              <a:rPr lang="en-US" sz="4900" dirty="0" err="1" smtClean="0"/>
+              <a:rPr lang="en-US" sz="2400" dirty="0" err="1" smtClean="0"/>
               <a:t>Himbeault</a:t>
             </a:r>
-            <a:endParaRPr lang="en-US" sz="4900" dirty="0" smtClean="0"/>
-          </a:p>
-          <a:p>
-            <a:endParaRPr lang="en-US" dirty="0"/>
-          </a:p>
-          <a:p>
-            <a:r>
-              <a:rPr lang="en-US" dirty="0"/>
-              <a:t>A Thesis</a:t>
-            </a:r>
-          </a:p>
-          <a:p>
-            <a:r>
-              <a:rPr lang="en-US" dirty="0"/>
-              <a:t>Submitted to the Faculty of Graduate Studies</a:t>
-            </a:r>
-          </a:p>
-          <a:p>
-            <a:r>
-              <a:rPr lang="en-US" dirty="0"/>
-              <a:t>of the University of Manitoba</a:t>
-            </a:r>
-          </a:p>
-          <a:p>
-            <a:r>
-              <a:rPr lang="en-US" dirty="0"/>
-              <a:t>in partial </a:t>
-            </a:r>
-            <a:r>
-              <a:rPr lang="en-US" dirty="0" err="1" smtClean="0"/>
-              <a:t>fulfilment</a:t>
-            </a:r>
-            <a:r>
-              <a:rPr lang="en-US" dirty="0" smtClean="0"/>
-              <a:t> </a:t>
-            </a:r>
-            <a:r>
-              <a:rPr lang="en-US" dirty="0"/>
-              <a:t>of the requirements</a:t>
-            </a:r>
-          </a:p>
-          <a:p>
-            <a:r>
-              <a:rPr lang="en-US" dirty="0"/>
-              <a:t>for the degree </a:t>
-            </a:r>
-            <a:r>
-              <a:rPr lang="en-US" dirty="0" smtClean="0"/>
-              <a:t>of</a:t>
-            </a:r>
-          </a:p>
-          <a:p>
-            <a:endParaRPr lang="en-US" dirty="0"/>
-          </a:p>
-          <a:p>
-            <a:r>
-              <a:rPr lang="en-US" sz="4900" dirty="0"/>
-              <a:t>MASTER OF </a:t>
-            </a:r>
-            <a:r>
-              <a:rPr lang="en-US" sz="4900" dirty="0" smtClean="0"/>
-              <a:t>SCIENCE</a:t>
-            </a:r>
-          </a:p>
-          <a:p>
-            <a:endParaRPr lang="en-US" dirty="0"/>
-          </a:p>
-          <a:p>
-            <a:r>
-              <a:rPr lang="en-US" dirty="0"/>
-              <a:t>Department of Electrical and Computer Engineering</a:t>
-            </a:r>
-          </a:p>
-          <a:p>
-            <a:r>
-              <a:rPr lang="en-US" dirty="0"/>
-              <a:t>University of Manitoba</a:t>
-            </a:r>
-          </a:p>
-          <a:p>
-            <a:r>
-              <a:rPr lang="en-US" dirty="0"/>
-              <a:t>Winnipeg, Manitoba, </a:t>
-            </a:r>
-            <a:r>
-              <a:rPr lang="en-US" dirty="0" smtClean="0"/>
-              <a:t>Canada</a:t>
-            </a:r>
-          </a:p>
-          <a:p>
-            <a:endParaRPr lang="en-CA" dirty="0"/>
-          </a:p>
-          <a:p>
-            <a:endParaRPr lang="en-US" dirty="0"/>
-          </a:p>
-          <a:p>
-            <a:r>
-              <a:rPr lang="en-US" dirty="0"/>
-              <a:t>Copyright </a:t>
-            </a:r>
-            <a:r>
-              <a:rPr lang="en-US" dirty="0" smtClean="0"/>
-              <a:t>2013 </a:t>
-            </a:r>
-            <a:r>
-              <a:rPr lang="en-US" dirty="0"/>
-              <a:t>Michael </a:t>
-            </a:r>
-            <a:r>
-              <a:rPr lang="en-US" dirty="0" err="1"/>
-              <a:t>Himbeault</a:t>
-            </a:r>
-            <a:endParaRPr lang="en-US" dirty="0"/>
-          </a:p>
-          <a:p>
-            <a:r>
-              <a:rPr lang="en-US" dirty="0" smtClean="0"/>
-              <a:t>February 4, 2014</a:t>
-            </a:r>
-            <a:endParaRPr lang="en-US" dirty="0"/>
+            <a:endParaRPr lang="en-US" sz="2400" dirty="0" smtClean="0"/>
           </a:p>
         </p:txBody>
       </p:sp>
@@ -3303,6 +3186,13 @@
   <p:clrMapOvr>
     <a:masterClrMapping/>
   </p:clrMapOvr>
+  <p:timing>
+    <p:tnLst>
+      <p:par>
+        <p:cTn id="1" dur="indefinite" restart="never" nodeType="tmRoot"/>
+      </p:par>
+    </p:tnLst>
+  </p:timing>
 </p:sld>
 </file>
 
@@ -3381,13 +3271,10 @@
               <a:t>Implements encoding to match character frequencies to circumvent </a:t>
             </a:r>
             <a:r>
-              <a:rPr lang="en-CA" dirty="0" err="1" smtClean="0"/>
-              <a:t>Born’s</a:t>
-            </a:r>
-            <a:r>
-              <a:rPr lang="en-CA" dirty="0" smtClean="0"/>
-              <a:t> approach to detection.</a:t>
-            </a:r>
+              <a:rPr lang="en-CA" dirty="0" smtClean="0"/>
+              <a:t>detections approaches that tune to that statistic.</a:t>
+            </a:r>
+            <a:endParaRPr lang="en-CA" dirty="0" smtClean="0"/>
           </a:p>
           <a:p>
             <a:r>
@@ -4434,12 +4321,21 @@
         </p:nvSpPr>
         <p:spPr/>
         <p:txBody>
-          <a:bodyPr/>
-          <a:lstStyle/>
-          <a:p>
-            <a:r>
-              <a:rPr lang="en-CA" dirty="0" smtClean="0"/>
-              <a:t>DNS tunnels are used in malware as </a:t>
+          <a:bodyPr>
+            <a:normAutofit fontScale="92500"/>
+          </a:bodyPr>
+          <a:lstStyle/>
+          <a:p>
+            <a:r>
+              <a:rPr lang="en-CA" dirty="0" smtClean="0"/>
+              <a:t>DNS tunnels uses:</a:t>
+            </a:r>
+          </a:p>
+          <a:p>
+            <a:pPr lvl="1"/>
+            <a:r>
+              <a:rPr lang="en-CA" dirty="0" smtClean="0"/>
+              <a:t>Malware and </a:t>
             </a:r>
             <a:r>
               <a:rPr lang="en-CA" dirty="0" err="1" smtClean="0"/>
@@ -4451,31 +4347,118 @@
             </a:r>
           </a:p>
           <a:p>
-            <a:r>
-              <a:rPr lang="en-CA" dirty="0" smtClean="0"/>
-              <a:t>DNS tunnels are used to in/ex-filtrate data through corporate security layers</a:t>
-            </a:r>
-          </a:p>
-          <a:p>
-            <a:r>
-              <a:rPr lang="en-CA" dirty="0" smtClean="0"/>
-              <a:t>The ability to monitor the existence of these channels is important when securing a network</a:t>
-            </a:r>
-            <a:r>
-              <a:rPr lang="en-CA" dirty="0" smtClean="0"/>
-              <a:t>.</a:t>
-            </a:r>
-          </a:p>
-          <a:p>
             <a:pPr lvl="1"/>
             <a:r>
               <a:rPr lang="en-CA" dirty="0" smtClean="0"/>
+              <a:t>In/ex-filtration channels for transporting data through corporate security layers</a:t>
+            </a:r>
+          </a:p>
+          <a:p>
+            <a:endParaRPr lang="en-CA" dirty="0" smtClean="0"/>
+          </a:p>
+          <a:p>
+            <a:r>
+              <a:rPr lang="en-CA" dirty="0" smtClean="0"/>
+              <a:t>The ability to monitor the existence of these channels is important when securing a network.</a:t>
+            </a:r>
+          </a:p>
+          <a:p>
+            <a:pPr lvl="1"/>
+            <a:r>
+              <a:rPr lang="en-CA" dirty="0" smtClean="0"/>
               <a:t>Currently quite difficult</a:t>
             </a:r>
             <a:endParaRPr lang="en-US" dirty="0"/>
           </a:p>
         </p:txBody>
       </p:sp>
+    </p:spTree>
+  </p:cSld>
+  <p:clrMapOvr>
+    <a:masterClrMapping/>
+  </p:clrMapOvr>
+  <p:timing>
+    <p:tnLst>
+      <p:par>
+        <p:cTn id="1" dur="indefinite" restart="never" nodeType="tmRoot"/>
+      </p:par>
+    </p:tnLst>
+  </p:timing>
+</p:sld>
+</file>
+
+<file path=ppt/slides/slide20.xml><?xml version="1.0" encoding="utf-8"?>
+<p:sld xmlns:a="http://schemas.openxmlformats.org/drawingml/2006/main" xmlns:r="http://schemas.openxmlformats.org/officeDocument/2006/relationships" xmlns:p="http://schemas.openxmlformats.org/presentationml/2006/main">
+  <p:cSld>
+    <p:spTree>
+      <p:nvGrpSpPr>
+        <p:cNvPr id="1" name=""/>
+        <p:cNvGrpSpPr/>
+        <p:nvPr/>
+      </p:nvGrpSpPr>
+      <p:grpSpPr>
+        <a:xfrm>
+          <a:off x="0" y="0"/>
+          <a:ext cx="0" cy="0"/>
+          <a:chOff x="0" y="0"/>
+          <a:chExt cx="0" cy="0"/>
+        </a:xfrm>
+      </p:grpSpPr>
+      <p:sp>
+        <p:nvSpPr>
+          <p:cNvPr id="2" name="Title 1"/>
+          <p:cNvSpPr>
+            <a:spLocks noGrp="1"/>
+          </p:cNvSpPr>
+          <p:nvPr>
+            <p:ph type="title"/>
+          </p:nvPr>
+        </p:nvSpPr>
+        <p:spPr/>
+        <p:txBody>
+          <a:bodyPr>
+            <a:normAutofit fontScale="90000"/>
+          </a:bodyPr>
+          <a:lstStyle/>
+          <a:p>
+            <a:r>
+              <a:rPr lang="en-CA" dirty="0" smtClean="0"/>
+              <a:t>Sample Data:</a:t>
+            </a:r>
+            <a:br>
+              <a:rPr lang="en-CA" dirty="0" smtClean="0"/>
+            </a:br>
+            <a:r>
+              <a:rPr lang="en-CA" dirty="0" smtClean="0"/>
+              <a:t>Packets per second</a:t>
+            </a:r>
+            <a:endParaRPr lang="en-US" dirty="0"/>
+          </a:p>
+        </p:txBody>
+      </p:sp>
+      <p:pic>
+        <p:nvPicPr>
+          <p:cNvPr id="4" name="Content Placeholder 3" descr="pcap-tpp.png"/>
+          <p:cNvPicPr>
+            <a:picLocks noGrp="1" noChangeAspect="1"/>
+          </p:cNvPicPr>
+          <p:nvPr>
+            <p:ph idx="1"/>
+          </p:nvPr>
+        </p:nvPicPr>
+        <p:blipFill>
+          <a:blip r:embed="rId2" cstate="print"/>
+          <a:stretch>
+            <a:fillRect/>
+          </a:stretch>
+        </p:blipFill>
+        <p:spPr>
+          <a:xfrm>
+            <a:off x="0" y="1622300"/>
+            <a:ext cx="9144000" cy="4481762"/>
+          </a:xfrm>
+        </p:spPr>
+      </p:pic>
     </p:spTree>
   </p:cSld>
   <p:clrMapOvr>
@@ -4484,7 +4467,7 @@
 </p:sld>
 </file>
 
-<file path=ppt/slides/slide20.xml><?xml version="1.0" encoding="utf-8"?>
+<file path=ppt/slides/slide21.xml><?xml version="1.0" encoding="utf-8"?>
 <p:sld xmlns:a="http://schemas.openxmlformats.org/drawingml/2006/main" xmlns:r="http://schemas.openxmlformats.org/officeDocument/2006/relationships" xmlns:p="http://schemas.openxmlformats.org/presentationml/2006/main">
   <p:cSld>
     <p:spTree>
@@ -4567,82 +4550,6 @@
 </p:sld>
 </file>
 
-<file path=ppt/slides/slide21.xml><?xml version="1.0" encoding="utf-8"?>
-<p:sld xmlns:a="http://schemas.openxmlformats.org/drawingml/2006/main" xmlns:r="http://schemas.openxmlformats.org/officeDocument/2006/relationships" xmlns:p="http://schemas.openxmlformats.org/presentationml/2006/main">
-  <p:cSld>
-    <p:spTree>
-      <p:nvGrpSpPr>
-        <p:cNvPr id="1" name=""/>
-        <p:cNvGrpSpPr/>
-        <p:nvPr/>
-      </p:nvGrpSpPr>
-      <p:grpSpPr>
-        <a:xfrm>
-          <a:off x="0" y="0"/>
-          <a:ext cx="0" cy="0"/>
-          <a:chOff x="0" y="0"/>
-          <a:chExt cx="0" cy="0"/>
-        </a:xfrm>
-      </p:grpSpPr>
-      <p:sp>
-        <p:nvSpPr>
-          <p:cNvPr id="2" name="Title 1"/>
-          <p:cNvSpPr>
-            <a:spLocks noGrp="1"/>
-          </p:cNvSpPr>
-          <p:nvPr>
-            <p:ph type="title"/>
-          </p:nvPr>
-        </p:nvSpPr>
-        <p:spPr/>
-        <p:txBody>
-          <a:bodyPr>
-            <a:normAutofit/>
-          </a:bodyPr>
-          <a:lstStyle/>
-          <a:p>
-            <a:r>
-              <a:rPr lang="en-CA" dirty="0" smtClean="0"/>
-              <a:t>Processing Performance</a:t>
-            </a:r>
-            <a:endParaRPr lang="en-US" dirty="0"/>
-          </a:p>
-        </p:txBody>
-      </p:sp>
-      <p:pic>
-        <p:nvPicPr>
-          <p:cNvPr id="5122" name="Picture 2" descr="D:\Documents\Projects\Thesis\Proposal\figures\pmqr.eps"/>
-          <p:cNvPicPr>
-            <a:picLocks noChangeAspect="1" noChangeArrowheads="1"/>
-          </p:cNvPicPr>
-          <p:nvPr/>
-        </p:nvPicPr>
-        <p:blipFill>
-          <a:blip r:embed="rId2" cstate="print"/>
-          <a:srcRect/>
-          <a:stretch>
-            <a:fillRect/>
-          </a:stretch>
-        </p:blipFill>
-        <p:spPr bwMode="auto">
-          <a:xfrm>
-            <a:off x="0" y="1244009"/>
-            <a:ext cx="9144000" cy="5613991"/>
-          </a:xfrm>
-          <a:prstGeom prst="rect">
-            <a:avLst/>
-          </a:prstGeom>
-          <a:noFill/>
-        </p:spPr>
-      </p:pic>
-    </p:spTree>
-  </p:cSld>
-  <p:clrMapOvr>
-    <a:masterClrMapping/>
-  </p:clrMapOvr>
-</p:sld>
-</file>
-
 <file path=ppt/slides/slide22.xml><?xml version="1.0" encoding="utf-8"?>
 <p:sld xmlns:a="http://schemas.openxmlformats.org/drawingml/2006/main" xmlns:r="http://schemas.openxmlformats.org/officeDocument/2006/relationships" xmlns:p="http://schemas.openxmlformats.org/presentationml/2006/main">
   <p:cSld>
@@ -4687,7 +4594,7 @@
       </p:sp>
       <p:pic>
         <p:nvPicPr>
-          <p:cNvPr id="6147" name="Picture 3" descr="D:\Documents\Projects\Thesis\Proposal\figures\pmqr-100k.eps"/>
+          <p:cNvPr id="5122" name="Picture 2" descr="D:\Documents\Projects\Thesis\Proposal\figures\pmqr.eps"/>
           <p:cNvPicPr>
             <a:picLocks noChangeAspect="1" noChangeArrowheads="1"/>
           </p:cNvPicPr>
@@ -4749,6 +4656,82 @@
         <p:spPr/>
         <p:txBody>
           <a:bodyPr>
+            <a:normAutofit/>
+          </a:bodyPr>
+          <a:lstStyle/>
+          <a:p>
+            <a:r>
+              <a:rPr lang="en-CA" dirty="0" smtClean="0"/>
+              <a:t>Processing Performance</a:t>
+            </a:r>
+            <a:endParaRPr lang="en-US" dirty="0"/>
+          </a:p>
+        </p:txBody>
+      </p:sp>
+      <p:pic>
+        <p:nvPicPr>
+          <p:cNvPr id="6147" name="Picture 3" descr="D:\Documents\Projects\Thesis\Proposal\figures\pmqr-100k.eps"/>
+          <p:cNvPicPr>
+            <a:picLocks noChangeAspect="1" noChangeArrowheads="1"/>
+          </p:cNvPicPr>
+          <p:nvPr/>
+        </p:nvPicPr>
+        <p:blipFill>
+          <a:blip r:embed="rId2" cstate="print"/>
+          <a:srcRect/>
+          <a:stretch>
+            <a:fillRect/>
+          </a:stretch>
+        </p:blipFill>
+        <p:spPr bwMode="auto">
+          <a:xfrm>
+            <a:off x="0" y="1244009"/>
+            <a:ext cx="9144000" cy="5613991"/>
+          </a:xfrm>
+          <a:prstGeom prst="rect">
+            <a:avLst/>
+          </a:prstGeom>
+          <a:noFill/>
+        </p:spPr>
+      </p:pic>
+    </p:spTree>
+  </p:cSld>
+  <p:clrMapOvr>
+    <a:masterClrMapping/>
+  </p:clrMapOvr>
+</p:sld>
+</file>
+
+<file path=ppt/slides/slide24.xml><?xml version="1.0" encoding="utf-8"?>
+<p:sld xmlns:a="http://schemas.openxmlformats.org/drawingml/2006/main" xmlns:r="http://schemas.openxmlformats.org/officeDocument/2006/relationships" xmlns:p="http://schemas.openxmlformats.org/presentationml/2006/main">
+  <p:cSld>
+    <p:spTree>
+      <p:nvGrpSpPr>
+        <p:cNvPr id="1" name=""/>
+        <p:cNvGrpSpPr/>
+        <p:nvPr/>
+      </p:nvGrpSpPr>
+      <p:grpSpPr>
+        <a:xfrm>
+          <a:off x="0" y="0"/>
+          <a:ext cx="0" cy="0"/>
+          <a:chOff x="0" y="0"/>
+          <a:chExt cx="0" cy="0"/>
+        </a:xfrm>
+      </p:grpSpPr>
+      <p:sp>
+        <p:nvSpPr>
+          <p:cNvPr id="2" name="Title 1"/>
+          <p:cNvSpPr>
+            <a:spLocks noGrp="1"/>
+          </p:cNvSpPr>
+          <p:nvPr>
+            <p:ph type="title"/>
+          </p:nvPr>
+        </p:nvSpPr>
+        <p:spPr/>
+        <p:txBody>
+          <a:bodyPr>
             <a:normAutofit fontScale="90000"/>
           </a:bodyPr>
           <a:lstStyle/>
@@ -4802,88 +4785,6 @@
 </p:sld>
 </file>
 
-<file path=ppt/slides/slide24.xml><?xml version="1.0" encoding="utf-8"?>
-<p:sld xmlns:a="http://schemas.openxmlformats.org/drawingml/2006/main" xmlns:r="http://schemas.openxmlformats.org/officeDocument/2006/relationships" xmlns:p="http://schemas.openxmlformats.org/presentationml/2006/main">
-  <p:cSld>
-    <p:spTree>
-      <p:nvGrpSpPr>
-        <p:cNvPr id="1" name=""/>
-        <p:cNvGrpSpPr/>
-        <p:nvPr/>
-      </p:nvGrpSpPr>
-      <p:grpSpPr>
-        <a:xfrm>
-          <a:off x="0" y="0"/>
-          <a:ext cx="0" cy="0"/>
-          <a:chOff x="0" y="0"/>
-          <a:chExt cx="0" cy="0"/>
-        </a:xfrm>
-      </p:grpSpPr>
-      <p:sp>
-        <p:nvSpPr>
-          <p:cNvPr id="2" name="Title 1"/>
-          <p:cNvSpPr>
-            <a:spLocks noGrp="1"/>
-          </p:cNvSpPr>
-          <p:nvPr>
-            <p:ph type="title"/>
-          </p:nvPr>
-        </p:nvSpPr>
-        <p:spPr/>
-        <p:txBody>
-          <a:bodyPr>
-            <a:normAutofit fontScale="90000"/>
-          </a:bodyPr>
-          <a:lstStyle/>
-          <a:p>
-            <a:r>
-              <a:rPr lang="en-CA" dirty="0" smtClean="0"/>
-              <a:t>Processing Performance :</a:t>
-            </a:r>
-            <a:br>
-              <a:rPr lang="en-CA" dirty="0" smtClean="0"/>
-            </a:br>
-            <a:r>
-              <a:rPr lang="en-CA" dirty="0" smtClean="0"/>
-              <a:t>Born Method</a:t>
-            </a:r>
-            <a:endParaRPr lang="en-US" dirty="0"/>
-          </a:p>
-        </p:txBody>
-      </p:sp>
-      <p:pic>
-        <p:nvPicPr>
-          <p:cNvPr id="7173" name="Picture 5" descr="D:\Documents\Projects\Thesis\Proposal\figures\ppia-naive.eps"/>
-          <p:cNvPicPr>
-            <a:picLocks noChangeAspect="1" noChangeArrowheads="1"/>
-          </p:cNvPicPr>
-          <p:nvPr/>
-        </p:nvPicPr>
-        <p:blipFill>
-          <a:blip r:embed="rId2" cstate="print"/>
-          <a:stretch>
-            <a:fillRect/>
-          </a:stretch>
-        </p:blipFill>
-        <p:spPr bwMode="auto">
-          <a:xfrm>
-            <a:off x="0" y="1629886"/>
-            <a:ext cx="9144000" cy="4578503"/>
-          </a:xfrm>
-          <a:prstGeom prst="rect">
-            <a:avLst/>
-          </a:prstGeom>
-          <a:noFill/>
-        </p:spPr>
-      </p:pic>
-    </p:spTree>
-  </p:cSld>
-  <p:clrMapOvr>
-    <a:masterClrMapping/>
-  </p:clrMapOvr>
-</p:sld>
-</file>
-
 <file path=ppt/slides/slide25.xml><?xml version="1.0" encoding="utf-8"?>
 <p:sld xmlns:a="http://schemas.openxmlformats.org/drawingml/2006/main" xmlns:r="http://schemas.openxmlformats.org/officeDocument/2006/relationships" xmlns:p="http://schemas.openxmlformats.org/presentationml/2006/main">
   <p:cSld>
@@ -4926,12 +4827,8 @@
               <a:rPr lang="en-CA" dirty="0" smtClean="0"/>
             </a:br>
             <a:r>
-              <a:rPr lang="en-CA" dirty="0" err="1" smtClean="0"/>
-              <a:t>Paxson</a:t>
-            </a:r>
-            <a:r>
-              <a:rPr lang="en-CA" dirty="0" smtClean="0"/>
-              <a:t> Method</a:t>
+              <a:rPr lang="en-CA" dirty="0" smtClean="0"/>
+              <a:t>Born Method</a:t>
             </a:r>
             <a:endParaRPr lang="en-US" dirty="0"/>
           </a:p>
@@ -5012,8 +4909,12 @@
               <a:rPr lang="en-CA" dirty="0" smtClean="0"/>
             </a:br>
             <a:r>
-              <a:rPr lang="en-CA" dirty="0" smtClean="0"/>
-              <a:t>Proposed Method</a:t>
+              <a:rPr lang="en-CA" dirty="0" err="1" smtClean="0"/>
+              <a:t>Paxson</a:t>
+            </a:r>
+            <a:r>
+              <a:rPr lang="en-CA" dirty="0" smtClean="0"/>
+              <a:t> Method</a:t>
             </a:r>
             <a:endParaRPr lang="en-US" dirty="0"/>
           </a:p>
@@ -5088,55 +4989,44 @@
           <a:p>
             <a:r>
               <a:rPr lang="en-CA" dirty="0" smtClean="0"/>
-              <a:t>Processing Performance:</a:t>
+              <a:t>Processing Performance :</a:t>
             </a:r>
             <a:br>
               <a:rPr lang="en-CA" dirty="0" smtClean="0"/>
             </a:br>
             <a:r>
               <a:rPr lang="en-CA" dirty="0" smtClean="0"/>
-              <a:t>Conclusions</a:t>
+              <a:t>Proposed Method</a:t>
             </a:r>
             <a:endParaRPr lang="en-US" dirty="0"/>
           </a:p>
         </p:txBody>
       </p:sp>
-      <p:sp>
-        <p:nvSpPr>
-          <p:cNvPr id="3" name="Content Placeholder 2"/>
-          <p:cNvSpPr>
-            <a:spLocks noGrp="1"/>
-          </p:cNvSpPr>
-          <p:nvPr>
-            <p:ph idx="1"/>
-          </p:nvPr>
-        </p:nvSpPr>
-        <p:spPr/>
-        <p:txBody>
-          <a:bodyPr/>
-          <a:lstStyle/>
-          <a:p>
-            <a:r>
-              <a:rPr lang="en-CA" dirty="0" smtClean="0"/>
-              <a:t>The naïve and proposed methods far outperform the other methods</a:t>
-            </a:r>
-          </a:p>
-          <a:p>
-            <a:r>
-              <a:rPr lang="en-CA" dirty="0" smtClean="0"/>
-              <a:t>As throughput increases, both </a:t>
-            </a:r>
-            <a:r>
-              <a:rPr lang="en-CA" dirty="0" err="1" smtClean="0"/>
-              <a:t>Paxson</a:t>
-            </a:r>
-            <a:r>
-              <a:rPr lang="en-CA" dirty="0" smtClean="0"/>
-              <a:t> and Born approaches suffer severe degradation in performance.</a:t>
-            </a:r>
-          </a:p>
-        </p:txBody>
-      </p:sp>
+      <p:pic>
+        <p:nvPicPr>
+          <p:cNvPr id="7173" name="Picture 5" descr="D:\Documents\Projects\Thesis\Proposal\figures\ppia-naive.eps"/>
+          <p:cNvPicPr>
+            <a:picLocks noChangeAspect="1" noChangeArrowheads="1"/>
+          </p:cNvPicPr>
+          <p:nvPr/>
+        </p:nvPicPr>
+        <p:blipFill>
+          <a:blip r:embed="rId2" cstate="print"/>
+          <a:stretch>
+            <a:fillRect/>
+          </a:stretch>
+        </p:blipFill>
+        <p:spPr bwMode="auto">
+          <a:xfrm>
+            <a:off x="0" y="1629886"/>
+            <a:ext cx="9144000" cy="4578503"/>
+          </a:xfrm>
+          <a:prstGeom prst="rect">
+            <a:avLst/>
+          </a:prstGeom>
+          <a:noFill/>
+        </p:spPr>
+      </p:pic>
     </p:spTree>
   </p:cSld>
   <p:clrMapOvr>
@@ -5181,42 +5071,55 @@
           <a:p>
             <a:r>
               <a:rPr lang="en-CA" dirty="0" smtClean="0"/>
-              <a:t>Detection Performance :</a:t>
+              <a:t>Processing Performance:</a:t>
             </a:r>
             <a:br>
               <a:rPr lang="en-CA" dirty="0" smtClean="0"/>
             </a:br>
             <a:r>
               <a:rPr lang="en-CA" dirty="0" smtClean="0"/>
-              <a:t>Naïve Method</a:t>
+              <a:t>Conclusions</a:t>
             </a:r>
             <a:endParaRPr lang="en-US" dirty="0"/>
           </a:p>
         </p:txBody>
       </p:sp>
-      <p:pic>
-        <p:nvPicPr>
-          <p:cNvPr id="4" name="Content Placeholder 3" descr="cnplot.eps"/>
-          <p:cNvPicPr>
-            <a:picLocks noGrp="1" noChangeAspect="1"/>
-          </p:cNvPicPr>
+      <p:sp>
+        <p:nvSpPr>
+          <p:cNvPr id="3" name="Content Placeholder 2"/>
+          <p:cNvSpPr>
+            <a:spLocks noGrp="1"/>
+          </p:cNvSpPr>
           <p:nvPr>
             <p:ph idx="1"/>
           </p:nvPr>
-        </p:nvPicPr>
-        <p:blipFill>
-          <a:blip r:embed="rId2" cstate="print"/>
-          <a:stretch>
-            <a:fillRect/>
-          </a:stretch>
-        </p:blipFill>
-        <p:spPr>
-          <a:xfrm>
-            <a:off x="0" y="1412776"/>
-            <a:ext cx="9144000" cy="4748733"/>
-          </a:xfrm>
-        </p:spPr>
-      </p:pic>
+        </p:nvSpPr>
+        <p:spPr/>
+        <p:txBody>
+          <a:bodyPr/>
+          <a:lstStyle/>
+          <a:p>
+            <a:r>
+              <a:rPr lang="en-CA" dirty="0" smtClean="0"/>
+              <a:t>The naïve and proposed methods far outperform the other methods</a:t>
+            </a:r>
+          </a:p>
+          <a:p>
+            <a:r>
+              <a:rPr lang="en-CA" dirty="0" smtClean="0"/>
+              <a:t>As throughput increases, both </a:t>
+            </a:r>
+            <a:r>
+              <a:rPr lang="en-CA" dirty="0" err="1" smtClean="0"/>
+              <a:t>Paxson</a:t>
+            </a:r>
+            <a:r>
+              <a:rPr lang="en-CA" dirty="0" smtClean="0"/>
+              <a:t> and Born approaches suffer severe degradation in performance.</a:t>
+            </a:r>
+          </a:p>
+        </p:txBody>
+      </p:sp>
     </p:spTree>
   </p:cSld>
   <p:clrMapOvr>
@@ -5293,7 +5196,7 @@
         <p:spPr>
           <a:xfrm>
             <a:off x="0" y="1412776"/>
-            <a:ext cx="9144000" cy="5056094"/>
+            <a:ext cx="9144000" cy="4748733"/>
           </a:xfrm>
         </p:spPr>
       </p:pic>
@@ -5371,11 +5274,7 @@
           <a:p>
             <a:r>
               <a:rPr lang="en-CA" dirty="0" smtClean="0"/>
-              <a:t>Be able to identify DNS tunnels that do not violate DNS RFCs or specifications in near real time with high accuracy</a:t>
-            </a:r>
-            <a:r>
-              <a:rPr lang="en-CA" dirty="0" smtClean="0"/>
-              <a:t>.</a:t>
+              <a:t>Be able to identify DNS tunnels that do not violate DNS RFCs or specifications in near real time with high accuracy.</a:t>
             </a:r>
           </a:p>
           <a:p>
@@ -5393,6 +5292,13 @@
   <p:clrMapOvr>
     <a:masterClrMapping/>
   </p:clrMapOvr>
+  <p:timing>
+    <p:tnLst>
+      <p:par>
+        <p:cTn id="1" dur="indefinite" restart="never" nodeType="tmRoot"/>
+      </p:par>
+    </p:tnLst>
+  </p:timing>
 </p:sld>
 </file>
 
@@ -5439,7 +5345,7 @@
             </a:br>
             <a:r>
               <a:rPr lang="en-CA" dirty="0" smtClean="0"/>
-              <a:t>Born Method</a:t>
+              <a:t>Naïve Method</a:t>
             </a:r>
             <a:endParaRPr lang="en-US" dirty="0"/>
           </a:p>
@@ -5464,7 +5370,7 @@
         <p:spPr>
           <a:xfrm>
             <a:off x="0" y="1412776"/>
-            <a:ext cx="9144000" cy="4748732"/>
+            <a:ext cx="9144000" cy="5056094"/>
           </a:xfrm>
         </p:spPr>
       </p:pic>
@@ -5544,7 +5450,7 @@
         <p:spPr>
           <a:xfrm>
             <a:off x="0" y="1412776"/>
-            <a:ext cx="9143999" cy="5056094"/>
+            <a:ext cx="9144000" cy="4748732"/>
           </a:xfrm>
         </p:spPr>
       </p:pic>
@@ -5598,12 +5504,8 @@
               <a:rPr lang="en-CA" dirty="0" smtClean="0"/>
             </a:br>
             <a:r>
-              <a:rPr lang="en-CA" dirty="0" err="1" smtClean="0"/>
-              <a:t>Paxson</a:t>
-            </a:r>
-            <a:r>
-              <a:rPr lang="en-CA" dirty="0" smtClean="0"/>
-              <a:t> Method</a:t>
+              <a:rPr lang="en-CA" dirty="0" smtClean="0"/>
+              <a:t>Born Method</a:t>
             </a:r>
             <a:endParaRPr lang="en-US" dirty="0"/>
           </a:p>
@@ -5628,7 +5530,7 @@
         <p:spPr>
           <a:xfrm>
             <a:off x="0" y="1412776"/>
-            <a:ext cx="9144000" cy="4748732"/>
+            <a:ext cx="9143999" cy="5056094"/>
           </a:xfrm>
         </p:spPr>
       </p:pic>
@@ -5712,7 +5614,7 @@
         <p:spPr>
           <a:xfrm>
             <a:off x="0" y="1412776"/>
-            <a:ext cx="9143999" cy="5056094"/>
+            <a:ext cx="9144000" cy="4748732"/>
           </a:xfrm>
         </p:spPr>
       </p:pic>
@@ -5796,7 +5698,7 @@
         <p:spPr>
           <a:xfrm>
             <a:off x="0" y="1412776"/>
-            <a:ext cx="9143999" cy="5056093"/>
+            <a:ext cx="9143999" cy="5056094"/>
           </a:xfrm>
         </p:spPr>
       </p:pic>
@@ -5850,8 +5752,12 @@
               <a:rPr lang="en-CA" dirty="0" smtClean="0"/>
             </a:br>
             <a:r>
-              <a:rPr lang="en-CA" dirty="0" smtClean="0"/>
-              <a:t>Proposed Method</a:t>
+              <a:rPr lang="en-CA" dirty="0" err="1" smtClean="0"/>
+              <a:t>Paxson</a:t>
+            </a:r>
+            <a:r>
+              <a:rPr lang="en-CA" dirty="0" smtClean="0"/>
+              <a:t> Method</a:t>
             </a:r>
             <a:endParaRPr lang="en-US" dirty="0"/>
           </a:p>
@@ -5875,8 +5781,8 @@
         </p:blipFill>
         <p:spPr>
           <a:xfrm>
-            <a:off x="29402" y="1412776"/>
-            <a:ext cx="9085196" cy="4748733"/>
+            <a:off x="0" y="1412776"/>
+            <a:ext cx="9143999" cy="5056093"/>
           </a:xfrm>
         </p:spPr>
       </p:pic>
@@ -5930,8 +5836,8 @@
               <a:rPr lang="en-CA" dirty="0" smtClean="0"/>
             </a:br>
             <a:r>
-              <a:rPr lang="en-CA" dirty="0" err="1" smtClean="0"/>
-              <a:t>ProposedMethod</a:t>
+              <a:rPr lang="en-CA" dirty="0" smtClean="0"/>
+              <a:t>Proposed Method</a:t>
             </a:r>
             <a:endParaRPr lang="en-US" dirty="0"/>
           </a:p>
@@ -5955,8 +5861,8 @@
         </p:blipFill>
         <p:spPr>
           <a:xfrm>
-            <a:off x="0" y="1412776"/>
-            <a:ext cx="9143999" cy="5056094"/>
+            <a:off x="29402" y="1412776"/>
+            <a:ext cx="9085196" cy="4748733"/>
           </a:xfrm>
         </p:spPr>
       </p:pic>
@@ -6010,8 +5916,8 @@
               <a:rPr lang="en-CA" dirty="0" smtClean="0"/>
             </a:br>
             <a:r>
-              <a:rPr lang="en-CA" dirty="0" smtClean="0"/>
-              <a:t>Proposed Method</a:t>
+              <a:rPr lang="en-CA" dirty="0" err="1" smtClean="0"/>
+              <a:t>ProposedMethod</a:t>
             </a:r>
             <a:endParaRPr lang="en-US" dirty="0"/>
           </a:p>
@@ -6084,14 +5990,14 @@
           <a:p>
             <a:r>
               <a:rPr lang="en-CA" dirty="0" smtClean="0"/>
-              <a:t>Detection Performance:</a:t>
+              <a:t>Detection Performance :</a:t>
             </a:r>
             <a:br>
               <a:rPr lang="en-CA" dirty="0" smtClean="0"/>
             </a:br>
             <a:r>
               <a:rPr lang="en-CA" dirty="0" smtClean="0"/>
-              <a:t>Comparison of False Positive Rates</a:t>
+              <a:t>Proposed Method</a:t>
             </a:r>
             <a:endParaRPr lang="en-US" dirty="0"/>
           </a:p>
@@ -6099,7 +6005,7 @@
       </p:sp>
       <p:pic>
         <p:nvPicPr>
-          <p:cNvPr id="4" name="Content Placeholder 3" descr="cplot2.eps"/>
+          <p:cNvPr id="4" name="Content Placeholder 3" descr="cnplot.eps"/>
           <p:cNvPicPr>
             <a:picLocks noGrp="1" noChangeAspect="1"/>
           </p:cNvPicPr>
@@ -6115,8 +6021,8 @@
         </p:blipFill>
         <p:spPr>
           <a:xfrm>
-            <a:off x="0" y="1571139"/>
-            <a:ext cx="9144000" cy="5047746"/>
+            <a:off x="0" y="1412776"/>
+            <a:ext cx="9143999" cy="5056094"/>
           </a:xfrm>
         </p:spPr>
       </p:pic>
@@ -6195,8 +6101,8 @@
         </p:blipFill>
         <p:spPr>
           <a:xfrm>
-            <a:off x="0" y="1556792"/>
-            <a:ext cx="9143999" cy="5076441"/>
+            <a:off x="0" y="1571139"/>
+            <a:ext cx="9144000" cy="5047746"/>
           </a:xfrm>
         </p:spPr>
       </p:pic>
@@ -6251,7 +6157,7 @@
             </a:br>
             <a:r>
               <a:rPr lang="en-CA" dirty="0" smtClean="0"/>
-              <a:t>Entropy</a:t>
+              <a:t>Domain Name System (DNS)</a:t>
             </a:r>
             <a:endParaRPr lang="en-US" dirty="0"/>
           </a:p>
@@ -6269,55 +6175,70 @@
         </p:nvSpPr>
         <p:spPr/>
         <p:txBody>
-          <a:bodyPr/>
-          <a:lstStyle/>
-          <a:p>
-            <a:r>
-              <a:rPr lang="en-CA" dirty="0" smtClean="0"/>
-              <a:t>Rough measure of the amount of information contained in a collection, </a:t>
-            </a:r>
-            <a:r>
-              <a:rPr lang="en-CA" sz="5000" i="1" dirty="0" smtClean="0">
-                <a:latin typeface="DilleniaUPC" pitchFamily="18" charset="-34"/>
-                <a:cs typeface="DilleniaUPC" pitchFamily="18" charset="-34"/>
-              </a:rPr>
-              <a:t>C:</a:t>
-            </a:r>
-          </a:p>
-          <a:p>
-            <a:endParaRPr lang="en-CA" dirty="0" smtClean="0"/>
-          </a:p>
-          <a:p>
+          <a:bodyPr>
+            <a:normAutofit fontScale="85000" lnSpcReduction="10000"/>
+          </a:bodyPr>
+          <a:lstStyle/>
+          <a:p>
+            <a:r>
+              <a:rPr lang="en-CA" dirty="0" smtClean="0"/>
+              <a:t>Translates text references to other forms of records. For example:</a:t>
+            </a:r>
+          </a:p>
+          <a:p>
+            <a:pPr lvl="1"/>
+            <a:r>
+              <a:rPr lang="en-CA" dirty="0" smtClean="0"/>
+              <a:t>IP or IPv6 address (A or AAAA)</a:t>
+            </a:r>
+          </a:p>
+          <a:p>
+            <a:pPr lvl="1"/>
+            <a:r>
+              <a:rPr lang="en-CA" dirty="0" smtClean="0"/>
+              <a:t>Another domain name (CNAME)</a:t>
+            </a:r>
+          </a:p>
+          <a:p>
+            <a:pPr lvl="1"/>
+            <a:r>
+              <a:rPr lang="en-CA" dirty="0" smtClean="0"/>
+              <a:t>IP address to name (PTR)</a:t>
+            </a:r>
+          </a:p>
+          <a:p>
+            <a:pPr lvl="1"/>
+            <a:r>
+              <a:rPr lang="en-CA" dirty="0" smtClean="0"/>
+              <a:t>Name to bulk data (TXT)</a:t>
+            </a:r>
+          </a:p>
+          <a:p>
+            <a:pPr lvl="1"/>
             <a:endParaRPr lang="en-CA" dirty="0"/>
           </a:p>
           <a:p>
-            <a:endParaRPr lang="en-CA" dirty="0" smtClean="0"/>
-          </a:p>
-          <a:p>
+            <a:r>
+              <a:rPr lang="en-CA" dirty="0" smtClean="0"/>
+              <a:t>Provides the human-interaction layer for the Internet</a:t>
+            </a:r>
+          </a:p>
+          <a:p>
+            <a:r>
+              <a:rPr lang="en-CA" dirty="0" smtClean="0"/>
+              <a:t>Offers a great deal of flexibility for deploying automated services over existing infrastructure</a:t>
+            </a:r>
+          </a:p>
+          <a:p>
+            <a:pPr lvl="1"/>
+            <a:r>
+              <a:rPr lang="en-CA" dirty="0" smtClean="0"/>
+              <a:t>For example: spam, malware, and address blacklists.</a:t>
+            </a:r>
             <a:endParaRPr lang="en-US" dirty="0"/>
           </a:p>
         </p:txBody>
       </p:sp>
-      <p:graphicFrame>
-        <p:nvGraphicFramePr>
-          <p:cNvPr id="2051" name="Content Placeholder 3"/>
-          <p:cNvGraphicFramePr>
-            <a:graphicFrameLocks noChangeAspect="1"/>
-          </p:cNvGraphicFramePr>
-          <p:nvPr/>
-        </p:nvGraphicFramePr>
-        <p:xfrm>
-          <a:off x="2555776" y="2924944"/>
-          <a:ext cx="3984625" cy="1727200"/>
-        </p:xfrm>
-        <a:graphic>
-          <a:graphicData uri="http://schemas.openxmlformats.org/presentationml/2006/ole">
-            <p:oleObj spid="_x0000_s2051" name="Equation" r:id="rId3" imgW="1523880" imgH="660240" progId="Equation.3">
-              <p:embed/>
-            </p:oleObj>
-          </a:graphicData>
-        </a:graphic>
-      </p:graphicFrame>
     </p:spTree>
   </p:cSld>
   <p:clrMapOvr>
@@ -6449,55 +6370,35 @@
             </a:br>
             <a:r>
               <a:rPr lang="en-CA" dirty="0" smtClean="0"/>
-              <a:t>Conclusions</a:t>
+              <a:t>Comparison of False Positive Rates</a:t>
             </a:r>
             <a:endParaRPr lang="en-US" dirty="0"/>
           </a:p>
         </p:txBody>
       </p:sp>
-      <p:sp>
-        <p:nvSpPr>
-          <p:cNvPr id="3" name="Content Placeholder 2"/>
-          <p:cNvSpPr>
-            <a:spLocks noGrp="1"/>
-          </p:cNvSpPr>
+      <p:pic>
+        <p:nvPicPr>
+          <p:cNvPr id="4" name="Content Placeholder 3" descr="cplot2.eps"/>
+          <p:cNvPicPr>
+            <a:picLocks noGrp="1" noChangeAspect="1"/>
+          </p:cNvPicPr>
           <p:nvPr>
             <p:ph idx="1"/>
           </p:nvPr>
-        </p:nvSpPr>
-        <p:spPr/>
-        <p:txBody>
-          <a:bodyPr/>
-          <a:lstStyle/>
-          <a:p>
-            <a:r>
-              <a:rPr lang="en-CA" dirty="0" smtClean="0"/>
-              <a:t>The proposed approach achieves categorically lower false positive rates than all other approaches.</a:t>
-            </a:r>
-          </a:p>
-          <a:p>
-            <a:endParaRPr lang="en-CA" dirty="0"/>
-          </a:p>
-          <a:p>
-            <a:r>
-              <a:rPr lang="en-CA" dirty="0" smtClean="0"/>
-              <a:t>The prototype next-gen tunnel is the most difficult tunnel to detect by far.</a:t>
-            </a:r>
-          </a:p>
-          <a:p>
-            <a:pPr lvl="1"/>
-            <a:r>
-              <a:rPr lang="en-CA" dirty="0" err="1" smtClean="0"/>
-              <a:t>Born’s</a:t>
-            </a:r>
-            <a:r>
-              <a:rPr lang="en-CA" dirty="0" smtClean="0"/>
-              <a:t> approach has a false-positive rate little better than random chance.</a:t>
-            </a:r>
-            <a:endParaRPr lang="en-US" dirty="0"/>
-          </a:p>
-        </p:txBody>
-      </p:sp>
+        </p:nvPicPr>
+        <p:blipFill>
+          <a:blip r:embed="rId2" cstate="print"/>
+          <a:stretch>
+            <a:fillRect/>
+          </a:stretch>
+        </p:blipFill>
+        <p:spPr>
+          <a:xfrm>
+            <a:off x="0" y="1556792"/>
+            <a:ext cx="9143999" cy="5076441"/>
+          </a:xfrm>
+        </p:spPr>
+      </p:pic>
     </p:spTree>
   </p:cSld>
   <p:clrMapOvr>
@@ -6535,56 +6436,64 @@
         </p:nvSpPr>
         <p:spPr/>
         <p:txBody>
+          <a:bodyPr>
+            <a:normAutofit fontScale="90000"/>
+          </a:bodyPr>
+          <a:lstStyle/>
+          <a:p>
+            <a:r>
+              <a:rPr lang="en-CA" dirty="0" smtClean="0"/>
+              <a:t>Detection Performance:</a:t>
+            </a:r>
+            <a:br>
+              <a:rPr lang="en-CA" dirty="0" smtClean="0"/>
+            </a:br>
+            <a:r>
+              <a:rPr lang="en-CA" dirty="0" smtClean="0"/>
+              <a:t>Conclusions</a:t>
+            </a:r>
+            <a:endParaRPr lang="en-US" dirty="0"/>
+          </a:p>
+        </p:txBody>
+      </p:sp>
+      <p:sp>
+        <p:nvSpPr>
+          <p:cNvPr id="3" name="Content Placeholder 2"/>
+          <p:cNvSpPr>
+            <a:spLocks noGrp="1"/>
+          </p:cNvSpPr>
+          <p:nvPr>
+            <p:ph idx="1"/>
+          </p:nvPr>
+        </p:nvSpPr>
+        <p:spPr/>
+        <p:txBody>
           <a:bodyPr/>
           <a:lstStyle/>
           <a:p>
             <a:r>
               <a:rPr lang="en-CA" dirty="0" smtClean="0"/>
-              <a:t>Conclusions</a:t>
-            </a:r>
-            <a:endParaRPr lang="en-US" dirty="0"/>
-          </a:p>
-        </p:txBody>
-      </p:sp>
-      <p:sp>
-        <p:nvSpPr>
-          <p:cNvPr id="3" name="Content Placeholder 2"/>
-          <p:cNvSpPr>
-            <a:spLocks noGrp="1"/>
-          </p:cNvSpPr>
-          <p:nvPr>
-            <p:ph idx="1"/>
-          </p:nvPr>
-        </p:nvSpPr>
-        <p:spPr/>
-        <p:txBody>
-          <a:bodyPr/>
-          <a:lstStyle/>
-          <a:p>
-            <a:r>
-              <a:rPr lang="en-CA" dirty="0" smtClean="0"/>
-              <a:t>Proposed method:</a:t>
+              <a:t>The proposed approach achieves categorically lower false positive rates than all other approaches.</a:t>
+            </a:r>
+          </a:p>
+          <a:p>
+            <a:endParaRPr lang="en-CA" dirty="0"/>
+          </a:p>
+          <a:p>
+            <a:r>
+              <a:rPr lang="en-CA" dirty="0" smtClean="0"/>
+              <a:t>The prototype next-gen tunnel is the most difficult tunnel to detect by far.</a:t>
             </a:r>
           </a:p>
           <a:p>
             <a:pPr lvl="1"/>
             <a:r>
-              <a:rPr lang="en-CA" dirty="0" smtClean="0"/>
-              <a:t>Achieves the best detection performance, and nearly the best processing performance.</a:t>
-            </a:r>
-          </a:p>
-          <a:p>
-            <a:pPr lvl="1"/>
-            <a:r>
-              <a:rPr lang="en-CA" dirty="0" smtClean="0"/>
-              <a:t>Represents a notable and novel contribution to the field.</a:t>
-            </a:r>
-          </a:p>
-          <a:p>
-            <a:pPr lvl="1"/>
-            <a:r>
-              <a:rPr lang="en-CA" dirty="0" smtClean="0"/>
-              <a:t>Is already implemented in high-performance C/C++, making deployment possible.</a:t>
+              <a:rPr lang="en-CA" dirty="0" err="1" smtClean="0"/>
+              <a:t>Born’s</a:t>
+            </a:r>
+            <a:r>
+              <a:rPr lang="en-CA" dirty="0" smtClean="0"/>
+              <a:t> approach has a false-positive rate little better than random chance.</a:t>
             </a:r>
             <a:endParaRPr lang="en-US" dirty="0"/>
           </a:p>
@@ -6632,7 +6541,7 @@
           <a:p>
             <a:r>
               <a:rPr lang="en-CA" dirty="0" smtClean="0"/>
-              <a:t>Potential Future Work</a:t>
+              <a:t>Conclusions</a:t>
             </a:r>
             <a:endParaRPr lang="en-US" dirty="0"/>
           </a:p>
@@ -6655,37 +6564,30 @@
           <a:p>
             <a:r>
               <a:rPr lang="en-CA" dirty="0" smtClean="0"/>
-              <a:t>Test on more strictly </a:t>
-            </a:r>
-            <a:r>
-              <a:rPr lang="en-CA" dirty="0" err="1" smtClean="0"/>
-              <a:t>curated</a:t>
-            </a:r>
-            <a:r>
-              <a:rPr lang="en-CA" dirty="0" smtClean="0"/>
-              <a:t> data sets to remove confounding factors.</a:t>
-            </a:r>
-          </a:p>
-          <a:p>
-            <a:r>
-              <a:rPr lang="en-CA" dirty="0" smtClean="0"/>
-              <a:t>Identify ways of improving false positive rate</a:t>
+              <a:t>Proposed method:</a:t>
             </a:r>
           </a:p>
           <a:p>
             <a:pPr lvl="1"/>
             <a:r>
               <a:rPr lang="en-CA" dirty="0" smtClean="0"/>
-              <a:t>Potentially with a more tailored metric</a:t>
+              <a:t>Achieves the best detection performance, and nearly the best processing performance.</a:t>
             </a:r>
           </a:p>
           <a:p>
             <a:pPr lvl="1"/>
             <a:r>
               <a:rPr lang="en-CA" dirty="0" smtClean="0"/>
-              <a:t>Potentially with more temporal knowledge and correlation</a:t>
-            </a:r>
-            <a:endParaRPr lang="en-US" dirty="0"/>
+              <a:t>Represents a notable and novel contribution to the field.</a:t>
+            </a:r>
+          </a:p>
+          <a:p>
+            <a:pPr lvl="1"/>
+            <a:r>
+              <a:rPr lang="en-CA" i="1" dirty="0" smtClean="0"/>
+              <a:t>Is already implemented in high-performance C/C++, making deployment possible.</a:t>
+            </a:r>
+            <a:endParaRPr lang="en-US" i="1" dirty="0"/>
           </a:p>
         </p:txBody>
       </p:sp>
@@ -6731,7 +6633,7 @@
           <a:p>
             <a:r>
               <a:rPr lang="en-CA" dirty="0" smtClean="0"/>
-              <a:t>Thank you</a:t>
+              <a:t>Potential Future Work</a:t>
             </a:r>
             <a:endParaRPr lang="en-US" dirty="0"/>
           </a:p>
@@ -6754,7 +6656,35 @@
           <a:p>
             <a:r>
               <a:rPr lang="en-CA" dirty="0" smtClean="0"/>
-              <a:t>Questions</a:t>
+              <a:t>Test on more strictly </a:t>
+            </a:r>
+            <a:r>
+              <a:rPr lang="en-CA" dirty="0" err="1" smtClean="0"/>
+              <a:t>curated</a:t>
+            </a:r>
+            <a:r>
+              <a:rPr lang="en-CA" dirty="0" smtClean="0"/>
+              <a:t> data sets to remove confounding factors.</a:t>
+            </a:r>
+          </a:p>
+          <a:p>
+            <a:r>
+              <a:rPr lang="en-CA" dirty="0" smtClean="0"/>
+              <a:t>Identify ways of improving false positive rate</a:t>
+            </a:r>
+          </a:p>
+          <a:p>
+            <a:pPr lvl="1"/>
+            <a:r>
+              <a:rPr lang="en-CA" dirty="0" smtClean="0"/>
+              <a:t>Potentially with a more tailored metric</a:t>
+            </a:r>
+          </a:p>
+          <a:p>
+            <a:pPr lvl="1"/>
+            <a:r>
+              <a:rPr lang="en-CA" dirty="0" smtClean="0"/>
+              <a:t>Potentially with more temporal knowledge and correlation</a:t>
             </a:r>
             <a:endParaRPr lang="en-US" dirty="0"/>
           </a:p>
@@ -6800,6 +6730,77 @@
           <a:bodyPr/>
           <a:lstStyle/>
           <a:p>
+            <a:r>
+              <a:rPr lang="en-CA" dirty="0" smtClean="0"/>
+              <a:t>Thank you</a:t>
+            </a:r>
+            <a:endParaRPr lang="en-US" dirty="0"/>
+          </a:p>
+        </p:txBody>
+      </p:sp>
+      <p:sp>
+        <p:nvSpPr>
+          <p:cNvPr id="3" name="Content Placeholder 2"/>
+          <p:cNvSpPr>
+            <a:spLocks noGrp="1"/>
+          </p:cNvSpPr>
+          <p:nvPr>
+            <p:ph idx="1"/>
+          </p:nvPr>
+        </p:nvSpPr>
+        <p:spPr/>
+        <p:txBody>
+          <a:bodyPr/>
+          <a:lstStyle/>
+          <a:p>
+            <a:r>
+              <a:rPr lang="en-CA" dirty="0" smtClean="0"/>
+              <a:t>Questions</a:t>
+            </a:r>
+            <a:endParaRPr lang="en-US" dirty="0"/>
+          </a:p>
+        </p:txBody>
+      </p:sp>
+    </p:spTree>
+  </p:cSld>
+  <p:clrMapOvr>
+    <a:masterClrMapping/>
+  </p:clrMapOvr>
+</p:sld>
+</file>
+
+<file path=ppt/slides/slide46.xml><?xml version="1.0" encoding="utf-8"?>
+<p:sld xmlns:a="http://schemas.openxmlformats.org/drawingml/2006/main" xmlns:r="http://schemas.openxmlformats.org/officeDocument/2006/relationships" xmlns:p="http://schemas.openxmlformats.org/presentationml/2006/main">
+  <p:cSld>
+    <p:spTree>
+      <p:nvGrpSpPr>
+        <p:cNvPr id="1" name=""/>
+        <p:cNvGrpSpPr/>
+        <p:nvPr/>
+      </p:nvGrpSpPr>
+      <p:grpSpPr>
+        <a:xfrm>
+          <a:off x="0" y="0"/>
+          <a:ext cx="0" cy="0"/>
+          <a:chOff x="0" y="0"/>
+          <a:chExt cx="0" cy="0"/>
+        </a:xfrm>
+      </p:grpSpPr>
+      <p:sp>
+        <p:nvSpPr>
+          <p:cNvPr id="2" name="Title 1"/>
+          <p:cNvSpPr>
+            <a:spLocks noGrp="1"/>
+          </p:cNvSpPr>
+          <p:nvPr>
+            <p:ph type="title"/>
+          </p:nvPr>
+        </p:nvSpPr>
+        <p:spPr/>
+        <p:txBody>
+          <a:bodyPr/>
+          <a:lstStyle/>
+          <a:p>
             <a:endParaRPr lang="en-US"/>
           </a:p>
         </p:txBody>
@@ -6874,7 +6875,7 @@
             </a:br>
             <a:r>
               <a:rPr lang="en-CA" dirty="0" smtClean="0"/>
-              <a:t>Domain Name System (DNS)</a:t>
+              <a:t>Covert Channels</a:t>
             </a:r>
             <a:endParaRPr lang="en-US" dirty="0"/>
           </a:p>
@@ -6893,65 +6894,39 @@
         <p:spPr/>
         <p:txBody>
           <a:bodyPr>
-            <a:normAutofit fontScale="85000" lnSpcReduction="10000"/>
+            <a:normAutofit/>
           </a:bodyPr>
           <a:lstStyle/>
           <a:p>
             <a:r>
               <a:rPr lang="en-CA" dirty="0" smtClean="0"/>
-              <a:t>Translates text references to other forms of records. For example:</a:t>
+              <a:t>Utilize standard means of transportation in non-standard ways</a:t>
             </a:r>
           </a:p>
           <a:p>
             <a:pPr lvl="1"/>
             <a:r>
               <a:rPr lang="en-CA" dirty="0" smtClean="0"/>
-              <a:t>IP or IPv6 address (A or AAAA)</a:t>
+              <a:t>Often transporting unintended data types over existing protocols</a:t>
             </a:r>
           </a:p>
           <a:p>
             <a:pPr lvl="1"/>
             <a:r>
               <a:rPr lang="en-CA" dirty="0" smtClean="0"/>
-              <a:t>Another domain name (CNAME)</a:t>
-            </a:r>
-          </a:p>
-          <a:p>
-            <a:pPr lvl="1"/>
-            <a:r>
-              <a:rPr lang="en-CA" dirty="0" smtClean="0"/>
-              <a:t>IP address to name (PTR)</a:t>
-            </a:r>
-          </a:p>
-          <a:p>
-            <a:pPr lvl="1"/>
-            <a:r>
-              <a:rPr lang="en-CA" dirty="0" smtClean="0"/>
-              <a:t>Name to bulk data (TXT)</a:t>
-            </a:r>
-          </a:p>
-          <a:p>
-            <a:pPr lvl="1"/>
-            <a:endParaRPr lang="en-CA" dirty="0"/>
-          </a:p>
-          <a:p>
-            <a:r>
-              <a:rPr lang="en-CA" dirty="0" smtClean="0"/>
-              <a:t>Provides the human-interaction layer for the Internet</a:t>
-            </a:r>
-          </a:p>
-          <a:p>
-            <a:r>
-              <a:rPr lang="en-CA" dirty="0" smtClean="0"/>
-              <a:t>Offers a great deal of flexibility for deploying automated services over existing infrastructure</a:t>
-            </a:r>
-          </a:p>
-          <a:p>
-            <a:pPr lvl="1"/>
-            <a:r>
-              <a:rPr lang="en-CA" dirty="0" smtClean="0"/>
-              <a:t>For example: spam, malware, and address blacklists.</a:t>
-            </a:r>
+              <a:t>Occasionally involves new custom protocols built on existing ones</a:t>
+            </a:r>
+          </a:p>
+          <a:p>
+            <a:r>
+              <a:rPr lang="en-CA" dirty="0" smtClean="0"/>
+              <a:t>Intention is rarely benign, often circumventing existing security layers</a:t>
+            </a:r>
+          </a:p>
+          <a:p>
+            <a:endParaRPr lang="en-CA" dirty="0" smtClean="0"/>
+          </a:p>
+          <a:p>
             <a:endParaRPr lang="en-US" dirty="0"/>
           </a:p>
         </p:txBody>
@@ -7026,47 +7001,76 @@
         <p:spPr/>
         <p:txBody>
           <a:bodyPr>
-            <a:normAutofit/>
+            <a:normAutofit fontScale="92500" lnSpcReduction="20000"/>
           </a:bodyPr>
           <a:lstStyle/>
           <a:p>
             <a:r>
               <a:rPr lang="en-CA" dirty="0" smtClean="0"/>
-              <a:t>Utilize standard means of transportation in non-standard ways</a:t>
+              <a:t>May or may not modify the standard protocols in ways that are conforming to specifications.</a:t>
+            </a:r>
+          </a:p>
+          <a:p>
+            <a:r>
+              <a:rPr lang="en-CA" dirty="0" smtClean="0"/>
+              <a:t>May sacrifice ‘common’ features such as </a:t>
+            </a:r>
+            <a:r>
+              <a:rPr lang="en-CA" dirty="0" err="1" smtClean="0"/>
+              <a:t>bidirectionality</a:t>
+            </a:r>
+            <a:endParaRPr lang="en-CA" dirty="0" smtClean="0"/>
+          </a:p>
+          <a:p>
+            <a:pPr>
+              <a:buNone/>
+            </a:pPr>
+            <a:endParaRPr lang="en-CA" dirty="0" smtClean="0"/>
+          </a:p>
+          <a:p>
+            <a:r>
+              <a:rPr lang="en-CA" dirty="0" smtClean="0"/>
+              <a:t>Examples:</a:t>
             </a:r>
           </a:p>
           <a:p>
             <a:pPr lvl="1"/>
             <a:r>
               <a:rPr lang="en-CA" dirty="0" smtClean="0"/>
-              <a:t>Often transporting unintended data types </a:t>
-            </a:r>
-            <a:r>
-              <a:rPr lang="en-CA" dirty="0" smtClean="0"/>
-              <a:t>over existing </a:t>
-            </a:r>
-            <a:r>
-              <a:rPr lang="en-CA" dirty="0" smtClean="0"/>
-              <a:t>protocols</a:t>
+              <a:t>IP timing channels</a:t>
             </a:r>
           </a:p>
           <a:p>
             <a:pPr lvl="1"/>
             <a:r>
               <a:rPr lang="en-CA" dirty="0" smtClean="0"/>
-              <a:t>Occasionally involves new custom protocols built on existing ones</a:t>
-            </a:r>
-          </a:p>
-          <a:p>
-            <a:r>
-              <a:rPr lang="en-CA" dirty="0" smtClean="0"/>
-              <a:t>Intention is rarely benign, often circumventing existing security layers</a:t>
-            </a:r>
-          </a:p>
-          <a:p>
-            <a:endParaRPr lang="en-CA" dirty="0" smtClean="0"/>
-          </a:p>
-          <a:p>
+              <a:t>May use third party services such as Twitter, </a:t>
+            </a:r>
+            <a:r>
+              <a:rPr lang="en-CA" dirty="0" err="1" smtClean="0"/>
+              <a:t>Facebook</a:t>
+            </a:r>
+            <a:r>
+              <a:rPr lang="en-CA" dirty="0" smtClean="0"/>
+              <a:t>, or image hosting providers</a:t>
+            </a:r>
+          </a:p>
+          <a:p>
+            <a:pPr lvl="2"/>
+            <a:r>
+              <a:rPr lang="en-CA" dirty="0" smtClean="0"/>
+              <a:t>Encoding information in JPEG headers</a:t>
+            </a:r>
+          </a:p>
+          <a:p>
+            <a:pPr lvl="1"/>
+            <a:r>
+              <a:rPr lang="en-CA" dirty="0" smtClean="0"/>
+              <a:t>DNS tunnels</a:t>
+            </a:r>
+          </a:p>
+          <a:p>
+            <a:pPr lvl="1"/>
             <a:endParaRPr lang="en-US" dirty="0"/>
           </a:p>
         </p:txBody>
@@ -7122,7 +7126,7 @@
             </a:br>
             <a:r>
               <a:rPr lang="en-CA" dirty="0" smtClean="0"/>
-              <a:t>Covert Channels</a:t>
+              <a:t>Entropy</a:t>
             </a:r>
             <a:endParaRPr lang="en-US" dirty="0"/>
           </a:p>
@@ -7140,86 +7144,67 @@
         </p:nvSpPr>
         <p:spPr/>
         <p:txBody>
-          <a:bodyPr>
-            <a:normAutofit fontScale="92500" lnSpcReduction="20000"/>
-          </a:bodyPr>
-          <a:lstStyle/>
-          <a:p>
-            <a:r>
-              <a:rPr lang="en-CA" dirty="0" smtClean="0"/>
-              <a:t>May or may not modify the standard protocols in ways that are conforming to specifications.</a:t>
-            </a:r>
-          </a:p>
-          <a:p>
-            <a:r>
-              <a:rPr lang="en-CA" dirty="0" smtClean="0"/>
-              <a:t>May sacrifice ‘common’ features such as </a:t>
-            </a:r>
-            <a:r>
-              <a:rPr lang="en-CA" dirty="0" err="1" smtClean="0"/>
-              <a:t>bidirectionality</a:t>
-            </a:r>
+          <a:bodyPr/>
+          <a:lstStyle/>
+          <a:p>
+            <a:r>
+              <a:rPr lang="en-CA" dirty="0" smtClean="0"/>
+              <a:t>Rough measure of the amount of information contained in a collection, </a:t>
+            </a:r>
+            <a:r>
+              <a:rPr lang="en-CA" sz="5000" i="1" dirty="0" smtClean="0">
+                <a:latin typeface="DilleniaUPC" pitchFamily="18" charset="-34"/>
+                <a:cs typeface="DilleniaUPC" pitchFamily="18" charset="-34"/>
+              </a:rPr>
+              <a:t>C:</a:t>
+            </a:r>
+          </a:p>
+          <a:p>
             <a:endParaRPr lang="en-CA" dirty="0" smtClean="0"/>
           </a:p>
           <a:p>
-            <a:pPr>
-              <a:buNone/>
-            </a:pPr>
+            <a:endParaRPr lang="en-CA" dirty="0"/>
+          </a:p>
+          <a:p>
             <a:endParaRPr lang="en-CA" dirty="0" smtClean="0"/>
           </a:p>
           <a:p>
-            <a:r>
-              <a:rPr lang="en-CA" dirty="0" smtClean="0"/>
-              <a:t>Examples:</a:t>
-            </a:r>
-          </a:p>
-          <a:p>
-            <a:pPr lvl="1"/>
-            <a:r>
-              <a:rPr lang="en-CA" dirty="0" smtClean="0"/>
-              <a:t>IP timing channels</a:t>
-            </a:r>
-          </a:p>
-          <a:p>
-            <a:pPr lvl="1"/>
-            <a:r>
-              <a:rPr lang="en-CA" dirty="0" smtClean="0"/>
-              <a:t>May use third party services such as Twitter, </a:t>
-            </a:r>
-            <a:r>
-              <a:rPr lang="en-CA" dirty="0" err="1" smtClean="0"/>
-              <a:t>Facebook</a:t>
-            </a:r>
-            <a:r>
-              <a:rPr lang="en-CA" dirty="0" smtClean="0"/>
-              <a:t>, or image hosting providers</a:t>
-            </a:r>
-          </a:p>
-          <a:p>
-            <a:pPr lvl="2"/>
-            <a:r>
-              <a:rPr lang="en-CA" dirty="0" smtClean="0"/>
-              <a:t>Encoding information in JPEG headers</a:t>
-            </a:r>
-          </a:p>
-          <a:p>
-            <a:pPr lvl="1"/>
-            <a:r>
-              <a:rPr lang="en-CA" dirty="0" smtClean="0"/>
-              <a:t>DNS tunnels</a:t>
-            </a:r>
-          </a:p>
-          <a:p>
-            <a:pPr lvl="1"/>
             <a:endParaRPr lang="en-US" dirty="0"/>
           </a:p>
         </p:txBody>
       </p:sp>
+      <p:graphicFrame>
+        <p:nvGraphicFramePr>
+          <p:cNvPr id="2051" name="Content Placeholder 3"/>
+          <p:cNvGraphicFramePr>
+            <a:graphicFrameLocks noChangeAspect="1"/>
+          </p:cNvGraphicFramePr>
+          <p:nvPr/>
+        </p:nvGraphicFramePr>
+        <p:xfrm>
+          <a:off x="2555776" y="2924944"/>
+          <a:ext cx="3984625" cy="1727200"/>
+        </p:xfrm>
+        <a:graphic>
+          <a:graphicData uri="http://schemas.openxmlformats.org/presentationml/2006/ole">
+            <p:oleObj spid="_x0000_s2051" name="Equation" r:id="rId3" imgW="1523880" imgH="660240" progId="Equation.3">
+              <p:embed/>
+            </p:oleObj>
+          </a:graphicData>
+        </a:graphic>
+      </p:graphicFrame>
     </p:spTree>
   </p:cSld>
   <p:clrMapOvr>
     <a:masterClrMapping/>
   </p:clrMapOvr>
+  <p:timing>
+    <p:tnLst>
+      <p:par>
+        <p:cTn id="1" dur="indefinite" restart="never" nodeType="tmRoot"/>
+      </p:par>
+    </p:tnLst>
+  </p:timing>
 </p:sld>
 </file>
 
@@ -7285,54 +7270,64 @@
         <p:spPr/>
         <p:txBody>
           <a:bodyPr>
-            <a:normAutofit fontScale="92500"/>
+            <a:normAutofit lnSpcReduction="10000"/>
           </a:bodyPr>
           <a:lstStyle/>
           <a:p>
             <a:r>
               <a:rPr lang="en-CA" dirty="0" smtClean="0"/>
-              <a:t>Raw DNS tunnels</a:t>
+              <a:t>Existing implementations are commonplace</a:t>
             </a:r>
           </a:p>
           <a:p>
             <a:pPr lvl="1"/>
             <a:r>
               <a:rPr lang="en-CA" dirty="0" smtClean="0"/>
-              <a:t>Utilize UDP/TCP port 53 for transmitting arbitrary data without respect for DNS protocol specifications</a:t>
+              <a:t>Iodine</a:t>
             </a:r>
           </a:p>
           <a:p>
             <a:pPr lvl="1"/>
             <a:r>
-              <a:rPr lang="en-CA" dirty="0" smtClean="0"/>
-              <a:t>Not difficult to block</a:t>
-            </a:r>
-          </a:p>
-          <a:p>
-            <a:r>
-              <a:rPr lang="en-CA" dirty="0" smtClean="0"/>
-              <a:t>Conforming DNS tunnels</a:t>
-            </a:r>
+              <a:rPr lang="en-CA" dirty="0" err="1" smtClean="0"/>
+              <a:t>OzymanDNS</a:t>
+            </a:r>
+            <a:endParaRPr lang="en-CA" dirty="0" smtClean="0"/>
           </a:p>
           <a:p>
             <a:pPr lvl="1"/>
             <a:r>
               <a:rPr lang="en-CA" dirty="0" smtClean="0"/>
-              <a:t>Makes use of DNS packets that do not violate the protocol specifications to transmit arbitrary data</a:t>
+              <a:t>Dns2tcp</a:t>
             </a:r>
           </a:p>
           <a:p>
             <a:pPr lvl="1"/>
             <a:r>
-              <a:rPr lang="en-CA" dirty="0" smtClean="0"/>
-              <a:t>Can be very difficult to identify and block</a:t>
-            </a:r>
+              <a:rPr lang="en-CA" dirty="0" err="1" smtClean="0"/>
+              <a:t>DNScat</a:t>
+            </a:r>
+            <a:endParaRPr lang="en-CA" dirty="0" smtClean="0"/>
           </a:p>
           <a:p>
             <a:pPr lvl="1"/>
             <a:r>
-              <a:rPr lang="en-CA" dirty="0" smtClean="0"/>
-              <a:t>The focus of this work</a:t>
+              <a:rPr lang="en-CA" dirty="0" err="1" smtClean="0"/>
+              <a:t>DeNiSe</a:t>
+            </a:r>
+            <a:endParaRPr lang="en-CA" dirty="0" smtClean="0"/>
+          </a:p>
+          <a:p>
+            <a:pPr lvl="1"/>
+            <a:r>
+              <a:rPr lang="en-CA" dirty="0" smtClean="0"/>
+              <a:t>PSUDP</a:t>
+            </a:r>
+          </a:p>
+          <a:p>
+            <a:r>
+              <a:rPr lang="en-CA" dirty="0" smtClean="0"/>
+              <a:t>A custom implementation was built to simulate a next-generation tunnel</a:t>
             </a:r>
             <a:endParaRPr lang="en-US" dirty="0"/>
           </a:p>
@@ -7408,64 +7403,54 @@
         <p:spPr/>
         <p:txBody>
           <a:bodyPr>
-            <a:normAutofit lnSpcReduction="10000"/>
+            <a:normAutofit fontScale="92500"/>
           </a:bodyPr>
           <a:lstStyle/>
           <a:p>
             <a:r>
               <a:rPr lang="en-CA" dirty="0" smtClean="0"/>
-              <a:t>Existing implementations are commonplace</a:t>
+              <a:t>Raw DNS tunnels</a:t>
             </a:r>
           </a:p>
           <a:p>
             <a:pPr lvl="1"/>
             <a:r>
               <a:rPr lang="en-CA" dirty="0" smtClean="0"/>
-              <a:t>Iodine</a:t>
+              <a:t>Utilize UDP/TCP port 53 for transmitting arbitrary data without respect for DNS protocol specifications</a:t>
             </a:r>
           </a:p>
           <a:p>
             <a:pPr lvl="1"/>
             <a:r>
-              <a:rPr lang="en-CA" dirty="0" err="1" smtClean="0"/>
-              <a:t>OzymanDNS</a:t>
-            </a:r>
-            <a:endParaRPr lang="en-CA" dirty="0" smtClean="0"/>
+              <a:rPr lang="en-CA" dirty="0" smtClean="0"/>
+              <a:t>Not difficult to block</a:t>
+            </a:r>
+          </a:p>
+          <a:p>
+            <a:r>
+              <a:rPr lang="en-CA" dirty="0" smtClean="0"/>
+              <a:t>Conforming DNS tunnels</a:t>
+            </a:r>
           </a:p>
           <a:p>
             <a:pPr lvl="1"/>
             <a:r>
               <a:rPr lang="en-CA" dirty="0" smtClean="0"/>
-              <a:t>Dns2tcp</a:t>
+              <a:t>Makes use of DNS packets that do not violate the protocol specifications to transmit arbitrary data</a:t>
             </a:r>
           </a:p>
           <a:p>
             <a:pPr lvl="1"/>
             <a:r>
-              <a:rPr lang="en-CA" dirty="0" err="1" smtClean="0"/>
-              <a:t>DNScat</a:t>
-            </a:r>
-            <a:endParaRPr lang="en-CA" dirty="0" smtClean="0"/>
+              <a:rPr lang="en-CA" dirty="0" smtClean="0"/>
+              <a:t>Can be very difficult to identify and block</a:t>
+            </a:r>
           </a:p>
           <a:p>
             <a:pPr lvl="1"/>
             <a:r>
-              <a:rPr lang="en-CA" dirty="0" err="1" smtClean="0"/>
-              <a:t>DeNiSe</a:t>
-            </a:r>
-            <a:endParaRPr lang="en-CA" dirty="0" smtClean="0"/>
-          </a:p>
-          <a:p>
-            <a:pPr lvl="1"/>
-            <a:r>
-              <a:rPr lang="en-CA" dirty="0" smtClean="0"/>
-              <a:t>PSUDP</a:t>
-            </a:r>
-          </a:p>
-          <a:p>
-            <a:r>
-              <a:rPr lang="en-CA" dirty="0" smtClean="0"/>
-              <a:t>A custom implementation was built to simulate a next-generation tunnel</a:t>
+              <a:rPr lang="en-CA" dirty="0" smtClean="0"/>
+              <a:t>The focus of this work</a:t>
             </a:r>
             <a:endParaRPr lang="en-US" dirty="0"/>
           </a:p>

</xml_diff>

<commit_message>
Exported, going to bed.
</commit_message>
<xml_diff>
--- a/Defense.pptx
+++ b/Defense.pptx
@@ -3289,6 +3289,13 @@
   <p:clrMapOvr>
     <a:masterClrMapping/>
   </p:clrMapOvr>
+  <p:timing>
+    <p:tnLst>
+      <p:par>
+        <p:cTn id="1" dur="indefinite" restart="never" nodeType="tmRoot"/>
+      </p:par>
+    </p:tnLst>
+  </p:timing>
 </p:sld>
 </file>
 
@@ -3410,6 +3417,13 @@
   <p:clrMapOvr>
     <a:masterClrMapping/>
   </p:clrMapOvr>
+  <p:timing>
+    <p:tnLst>
+      <p:par>
+        <p:cTn id="1" dur="indefinite" restart="never" nodeType="tmRoot"/>
+      </p:par>
+    </p:tnLst>
+  </p:timing>
 </p:sld>
 </file>
 
@@ -3501,6 +3515,13 @@
   <p:clrMapOvr>
     <a:masterClrMapping/>
   </p:clrMapOvr>
+  <p:timing>
+    <p:tnLst>
+      <p:par>
+        <p:cTn id="1" dur="indefinite" restart="never" nodeType="tmRoot"/>
+      </p:par>
+    </p:tnLst>
+  </p:timing>
 </p:sld>
 </file>
 
@@ -3627,6 +3648,13 @@
   <p:clrMapOvr>
     <a:masterClrMapping/>
   </p:clrMapOvr>
+  <p:timing>
+    <p:tnLst>
+      <p:par>
+        <p:cTn id="1" dur="indefinite" restart="never" nodeType="tmRoot"/>
+      </p:par>
+    </p:tnLst>
+  </p:timing>
 </p:sld>
 </file>
 
@@ -3727,6 +3755,13 @@
   <p:clrMapOvr>
     <a:masterClrMapping/>
   </p:clrMapOvr>
+  <p:timing>
+    <p:tnLst>
+      <p:par>
+        <p:cTn id="1" dur="indefinite" restart="never" nodeType="tmRoot"/>
+      </p:par>
+    </p:tnLst>
+  </p:timing>
 </p:sld>
 </file>
 
@@ -3833,6 +3868,13 @@
   <p:clrMapOvr>
     <a:masterClrMapping/>
   </p:clrMapOvr>
+  <p:timing>
+    <p:tnLst>
+      <p:par>
+        <p:cTn id="1" dur="indefinite" restart="never" nodeType="tmRoot"/>
+      </p:par>
+    </p:tnLst>
+  </p:timing>
 </p:sld>
 </file>
 
@@ -3944,6 +3986,13 @@
   <p:clrMapOvr>
     <a:masterClrMapping/>
   </p:clrMapOvr>
+  <p:timing>
+    <p:tnLst>
+      <p:par>
+        <p:cTn id="1" dur="indefinite" restart="never" nodeType="tmRoot"/>
+      </p:par>
+    </p:tnLst>
+  </p:timing>
 </p:sld>
 </file>
 
@@ -4081,6 +4130,13 @@
   <p:clrMapOvr>
     <a:masterClrMapping/>
   </p:clrMapOvr>
+  <p:timing>
+    <p:tnLst>
+      <p:par>
+        <p:cTn id="1" dur="indefinite" restart="never" nodeType="tmRoot"/>
+      </p:par>
+    </p:tnLst>
+  </p:timing>
 </p:sld>
 </file>
 
@@ -4179,6 +4235,13 @@
   <p:clrMapOvr>
     <a:masterClrMapping/>
   </p:clrMapOvr>
+  <p:timing>
+    <p:tnLst>
+      <p:par>
+        <p:cTn id="1" dur="indefinite" restart="never" nodeType="tmRoot"/>
+      </p:par>
+    </p:tnLst>
+  </p:timing>
 </p:sld>
 </file>
 
@@ -5274,8 +5337,13 @@
           <a:p>
             <a:r>
               <a:rPr lang="en-CA" dirty="0" smtClean="0"/>
-              <a:t>Be able to identify DNS tunnels that do not violate DNS RFCs or specifications in near real time with high accuracy.</a:t>
-            </a:r>
+              <a:t>Be able to identify DNS tunnels that do not violate DNS RFCs or specifications in near real time with high </a:t>
+            </a:r>
+            <a:r>
+              <a:rPr lang="en-CA" dirty="0" smtClean="0"/>
+              <a:t>accuracy on commodity hardware.</a:t>
+            </a:r>
+            <a:endParaRPr lang="en-CA" dirty="0" smtClean="0"/>
           </a:p>
           <a:p>
             <a:pPr lvl="1"/>
@@ -6244,6 +6312,13 @@
   <p:clrMapOvr>
     <a:masterClrMapping/>
   </p:clrMapOvr>
+  <p:timing>
+    <p:tnLst>
+      <p:par>
+        <p:cTn id="1" dur="indefinite" restart="never" nodeType="tmRoot"/>
+      </p:par>
+    </p:tnLst>
+  </p:timing>
 </p:sld>
 </file>
 
@@ -6936,6 +7011,13 @@
   <p:clrMapOvr>
     <a:masterClrMapping/>
   </p:clrMapOvr>
+  <p:timing>
+    <p:tnLst>
+      <p:par>
+        <p:cTn id="1" dur="indefinite" restart="never" nodeType="tmRoot"/>
+      </p:par>
+    </p:tnLst>
+  </p:timing>
 </p:sld>
 </file>
 
@@ -7080,6 +7162,13 @@
   <p:clrMapOvr>
     <a:masterClrMapping/>
   </p:clrMapOvr>
+  <p:timing>
+    <p:tnLst>
+      <p:par>
+        <p:cTn id="1" dur="indefinite" restart="never" nodeType="tmRoot"/>
+      </p:par>
+    </p:tnLst>
+  </p:timing>
 </p:sld>
 </file>
 
@@ -7338,6 +7427,13 @@
   <p:clrMapOvr>
     <a:masterClrMapping/>
   </p:clrMapOvr>
+  <p:timing>
+    <p:tnLst>
+      <p:par>
+        <p:cTn id="1" dur="indefinite" restart="never" nodeType="tmRoot"/>
+      </p:par>
+    </p:tnLst>
+  </p:timing>
 </p:sld>
 </file>
 
@@ -7461,6 +7557,13 @@
   <p:clrMapOvr>
     <a:masterClrMapping/>
   </p:clrMapOvr>
+  <p:timing>
+    <p:tnLst>
+      <p:par>
+        <p:cTn id="1" dur="indefinite" restart="never" nodeType="tmRoot"/>
+      </p:par>
+    </p:tnLst>
+  </p:timing>
 </p:sld>
 </file>
 

</xml_diff>